<commit_message>
ppt has new figure, start of avcits graph
</commit_message>
<xml_diff>
--- a/GSRExploratory.pptx
+++ b/GSRExploratory.pptx
@@ -11,8 +11,8 @@
     <p:sldId id="277" r:id="rId5"/>
     <p:sldId id="276" r:id="rId6"/>
     <p:sldId id="274" r:id="rId7"/>
-    <p:sldId id="275" r:id="rId8"/>
-    <p:sldId id="270" r:id="rId9"/>
+    <p:sldId id="278" r:id="rId8"/>
+    <p:sldId id="275" r:id="rId9"/>
     <p:sldId id="265" r:id="rId10"/>
     <p:sldId id="273" r:id="rId11"/>
     <p:sldId id="271" r:id="rId12"/>
@@ -135,41 +135,41 @@
 <file path=ppt/changesInfos/changesInfo1.xml><?xml version="1.0" encoding="utf-8"?>
 <pc:chgInfo xmlns:a="http://schemas.openxmlformats.org/drawingml/2006/main" xmlns:r="http://schemas.openxmlformats.org/officeDocument/2006/relationships" xmlns:ac="http://schemas.microsoft.com/office/drawing/2013/main/command" xmlns:pc="http://schemas.microsoft.com/office/powerpoint/2013/main/command">
   <pc:docChgLst>
-    <pc:chgData name="Guest User" userId="S::urn:spo:anon#ea516d5bfbddd5fd83341af53625b03d3f67b2595679e445efc4f5857a366070::" providerId="AD" clId="Web-{25346240-C5B6-850E-D09C-CB0969BBF519}"/>
+    <pc:chgData name="Huang, Lucy Yaoyuan" userId="S::u251639@bcm.edu::8d578496-9457-459c-a11f-92df8b250202" providerId="AD" clId="Web-{AF2C5F12-4717-BC24-9526-1BD85B43B8D8}"/>
     <pc:docChg chg="modSld">
-      <pc:chgData name="Guest User" userId="S::urn:spo:anon#ea516d5bfbddd5fd83341af53625b03d3f67b2595679e445efc4f5857a366070::" providerId="AD" clId="Web-{25346240-C5B6-850E-D09C-CB0969BBF519}" dt="2023-07-19T19:06:50.547" v="4" actId="14100"/>
+      <pc:chgData name="Huang, Lucy Yaoyuan" userId="S::u251639@bcm.edu::8d578496-9457-459c-a11f-92df8b250202" providerId="AD" clId="Web-{AF2C5F12-4717-BC24-9526-1BD85B43B8D8}" dt="2023-07-21T01:13:10.269" v="1" actId="20577"/>
       <pc:docMkLst>
         <pc:docMk/>
       </pc:docMkLst>
-      <pc:sldChg chg="modSp">
-        <pc:chgData name="Guest User" userId="S::urn:spo:anon#ea516d5bfbddd5fd83341af53625b03d3f67b2595679e445efc4f5857a366070::" providerId="AD" clId="Web-{25346240-C5B6-850E-D09C-CB0969BBF519}" dt="2023-07-19T19:05:02.368" v="2" actId="1076"/>
+      <pc:sldChg chg="delSp">
+        <pc:chgData name="Huang, Lucy Yaoyuan" userId="S::u251639@bcm.edu::8d578496-9457-459c-a11f-92df8b250202" providerId="AD" clId="Web-{AF2C5F12-4717-BC24-9526-1BD85B43B8D8}" dt="2023-07-21T01:11:17.219" v="0"/>
         <pc:sldMkLst>
           <pc:docMk/>
           <pc:sldMk cId="3569370174" sldId="260"/>
         </pc:sldMkLst>
-        <pc:picChg chg="mod">
-          <ac:chgData name="Guest User" userId="S::urn:spo:anon#ea516d5bfbddd5fd83341af53625b03d3f67b2595679e445efc4f5857a366070::" providerId="AD" clId="Web-{25346240-C5B6-850E-D09C-CB0969BBF519}" dt="2023-07-19T19:05:02.368" v="2" actId="1076"/>
-          <ac:picMkLst>
+        <pc:spChg chg="del">
+          <ac:chgData name="Huang, Lucy Yaoyuan" userId="S::u251639@bcm.edu::8d578496-9457-459c-a11f-92df8b250202" providerId="AD" clId="Web-{AF2C5F12-4717-BC24-9526-1BD85B43B8D8}" dt="2023-07-21T01:11:17.219" v="0"/>
+          <ac:spMkLst>
             <pc:docMk/>
             <pc:sldMk cId="3569370174" sldId="260"/>
-            <ac:picMk id="6" creationId="{52F29D42-4552-DAB9-6317-7FBACA44894B}"/>
-          </ac:picMkLst>
-        </pc:picChg>
+            <ac:spMk id="3" creationId="{DF3FAA24-5F7B-EFF7-903F-394870F19223}"/>
+          </ac:spMkLst>
+        </pc:spChg>
       </pc:sldChg>
       <pc:sldChg chg="modSp">
-        <pc:chgData name="Guest User" userId="S::urn:spo:anon#ea516d5bfbddd5fd83341af53625b03d3f67b2595679e445efc4f5857a366070::" providerId="AD" clId="Web-{25346240-C5B6-850E-D09C-CB0969BBF519}" dt="2023-07-19T19:06:50.547" v="4" actId="14100"/>
+        <pc:chgData name="Huang, Lucy Yaoyuan" userId="S::u251639@bcm.edu::8d578496-9457-459c-a11f-92df8b250202" providerId="AD" clId="Web-{AF2C5F12-4717-BC24-9526-1BD85B43B8D8}" dt="2023-07-21T01:13:10.269" v="1" actId="20577"/>
         <pc:sldMkLst>
           <pc:docMk/>
-          <pc:sldMk cId="1111217609" sldId="261"/>
+          <pc:sldMk cId="3258022718" sldId="263"/>
         </pc:sldMkLst>
-        <pc:picChg chg="mod">
-          <ac:chgData name="Guest User" userId="S::urn:spo:anon#ea516d5bfbddd5fd83341af53625b03d3f67b2595679e445efc4f5857a366070::" providerId="AD" clId="Web-{25346240-C5B6-850E-D09C-CB0969BBF519}" dt="2023-07-19T19:06:50.547" v="4" actId="14100"/>
-          <ac:picMkLst>
-            <pc:docMk/>
-            <pc:sldMk cId="1111217609" sldId="261"/>
-            <ac:picMk id="4" creationId="{B7167C50-499F-75A3-DC5B-A351D0A7C7A1}"/>
-          </ac:picMkLst>
-        </pc:picChg>
+        <pc:spChg chg="mod">
+          <ac:chgData name="Huang, Lucy Yaoyuan" userId="S::u251639@bcm.edu::8d578496-9457-459c-a11f-92df8b250202" providerId="AD" clId="Web-{AF2C5F12-4717-BC24-9526-1BD85B43B8D8}" dt="2023-07-21T01:13:10.269" v="1" actId="20577"/>
+          <ac:spMkLst>
+            <pc:docMk/>
+            <pc:sldMk cId="3258022718" sldId="263"/>
+            <ac:spMk id="2" creationId="{1F0C129A-B46B-8D5E-E8CC-F44C8BBA237D}"/>
+          </ac:spMkLst>
+        </pc:spChg>
       </pc:sldChg>
     </pc:docChg>
   </pc:docChgLst>
@@ -1162,6 +1162,194 @@
             <pc:docMk/>
             <pc:sldMk cId="1692230384" sldId="276"/>
             <ac:picMk id="5" creationId="{C2752F19-5C9E-2563-6C64-8EB7735F3D81}"/>
+          </ac:picMkLst>
+        </pc:picChg>
+      </pc:sldChg>
+    </pc:docChg>
+  </pc:docChgLst>
+  <pc:docChgLst>
+    <pc:chgData name="Lucy Huang" userId="8d578496-9457-459c-a11f-92df8b250202" providerId="ADAL" clId="{C6727DD8-56ED-44ED-A31E-F6094BE8C3E3}"/>
+    <pc:docChg chg="undo custSel addSld modSld sldOrd">
+      <pc:chgData name="Lucy Huang" userId="8d578496-9457-459c-a11f-92df8b250202" providerId="ADAL" clId="{C6727DD8-56ED-44ED-A31E-F6094BE8C3E3}" dt="2023-07-19T21:02:58.210" v="187" actId="208"/>
+      <pc:docMkLst>
+        <pc:docMk/>
+      </pc:docMkLst>
+      <pc:sldChg chg="delSp modSp mod">
+        <pc:chgData name="Lucy Huang" userId="8d578496-9457-459c-a11f-92df8b250202" providerId="ADAL" clId="{C6727DD8-56ED-44ED-A31E-F6094BE8C3E3}" dt="2023-07-19T20:49:11.332" v="108" actId="21"/>
+        <pc:sldMkLst>
+          <pc:docMk/>
+          <pc:sldMk cId="3621920733" sldId="257"/>
+        </pc:sldMkLst>
+        <pc:spChg chg="mod">
+          <ac:chgData name="Lucy Huang" userId="8d578496-9457-459c-a11f-92df8b250202" providerId="ADAL" clId="{C6727DD8-56ED-44ED-A31E-F6094BE8C3E3}" dt="2023-07-19T20:01:45.303" v="48" actId="20577"/>
+          <ac:spMkLst>
+            <pc:docMk/>
+            <pc:sldMk cId="3621920733" sldId="257"/>
+            <ac:spMk id="2" creationId="{BB02845D-2E6F-9B04-E0E2-2E6F20EC4038}"/>
+          </ac:spMkLst>
+        </pc:spChg>
+        <pc:picChg chg="del">
+          <ac:chgData name="Lucy Huang" userId="8d578496-9457-459c-a11f-92df8b250202" providerId="ADAL" clId="{C6727DD8-56ED-44ED-A31E-F6094BE8C3E3}" dt="2023-07-19T20:49:11.332" v="108" actId="21"/>
+          <ac:picMkLst>
+            <pc:docMk/>
+            <pc:sldMk cId="3621920733" sldId="257"/>
+            <ac:picMk id="4" creationId="{653D21CA-1FAB-D551-7915-26558C74C20B}"/>
+          </ac:picMkLst>
+        </pc:picChg>
+      </pc:sldChg>
+      <pc:sldChg chg="addSp delSp modSp mod ord setBg">
+        <pc:chgData name="Lucy Huang" userId="8d578496-9457-459c-a11f-92df8b250202" providerId="ADAL" clId="{C6727DD8-56ED-44ED-A31E-F6094BE8C3E3}" dt="2023-07-19T21:02:58.210" v="187" actId="208"/>
+        <pc:sldMkLst>
+          <pc:docMk/>
+          <pc:sldMk cId="3819636605" sldId="259"/>
+        </pc:sldMkLst>
+        <pc:spChg chg="mod">
+          <ac:chgData name="Lucy Huang" userId="8d578496-9457-459c-a11f-92df8b250202" providerId="ADAL" clId="{C6727DD8-56ED-44ED-A31E-F6094BE8C3E3}" dt="2023-07-19T20:56:20.634" v="154" actId="26606"/>
+          <ac:spMkLst>
+            <pc:docMk/>
+            <pc:sldMk cId="3819636605" sldId="259"/>
+            <ac:spMk id="2" creationId="{45F25EE0-4A40-BD9F-FC4A-8FCCD3962D82}"/>
+          </ac:spMkLst>
+        </pc:spChg>
+        <pc:spChg chg="del">
+          <ac:chgData name="Lucy Huang" userId="8d578496-9457-459c-a11f-92df8b250202" providerId="ADAL" clId="{C6727DD8-56ED-44ED-A31E-F6094BE8C3E3}" dt="2023-07-19T20:53:38.493" v="110" actId="931"/>
+          <ac:spMkLst>
+            <pc:docMk/>
+            <pc:sldMk cId="3819636605" sldId="259"/>
+            <ac:spMk id="3" creationId="{9C91B660-27F1-8211-49FB-3FC4A6FCAFB1}"/>
+          </ac:spMkLst>
+        </pc:spChg>
+        <pc:spChg chg="add del mod">
+          <ac:chgData name="Lucy Huang" userId="8d578496-9457-459c-a11f-92df8b250202" providerId="ADAL" clId="{C6727DD8-56ED-44ED-A31E-F6094BE8C3E3}" dt="2023-07-19T21:01:29.553" v="170" actId="931"/>
+          <ac:spMkLst>
+            <pc:docMk/>
+            <pc:sldMk cId="3819636605" sldId="259"/>
+            <ac:spMk id="12" creationId="{1E442BF0-692F-F5F3-8D64-CB4635A12B3E}"/>
+          </ac:spMkLst>
+        </pc:spChg>
+        <pc:spChg chg="add del">
+          <ac:chgData name="Lucy Huang" userId="8d578496-9457-459c-a11f-92df8b250202" providerId="ADAL" clId="{C6727DD8-56ED-44ED-A31E-F6094BE8C3E3}" dt="2023-07-19T20:56:20.634" v="154" actId="26606"/>
+          <ac:spMkLst>
+            <pc:docMk/>
+            <pc:sldMk cId="3819636605" sldId="259"/>
+            <ac:spMk id="14" creationId="{9F2927B6-D13D-B867-8DE7-6FE6685BDBA0}"/>
+          </ac:spMkLst>
+        </pc:spChg>
+        <pc:spChg chg="add mod">
+          <ac:chgData name="Lucy Huang" userId="8d578496-9457-459c-a11f-92df8b250202" providerId="ADAL" clId="{C6727DD8-56ED-44ED-A31E-F6094BE8C3E3}" dt="2023-07-19T21:02:58.210" v="187" actId="208"/>
+          <ac:spMkLst>
+            <pc:docMk/>
+            <pc:sldMk cId="3819636605" sldId="259"/>
+            <ac:spMk id="16" creationId="{4BF8B23F-1E17-1F09-72DA-5ADA0FCEB63D}"/>
+          </ac:spMkLst>
+        </pc:spChg>
+        <pc:picChg chg="del">
+          <ac:chgData name="Lucy Huang" userId="8d578496-9457-459c-a11f-92df8b250202" providerId="ADAL" clId="{C6727DD8-56ED-44ED-A31E-F6094BE8C3E3}" dt="2023-07-19T20:49:12.515" v="109" actId="21"/>
+          <ac:picMkLst>
+            <pc:docMk/>
+            <pc:sldMk cId="3819636605" sldId="259"/>
+            <ac:picMk id="4" creationId="{DDC4C5D6-C764-9A39-CA82-577C8C74C140}"/>
+          </ac:picMkLst>
+        </pc:picChg>
+        <pc:picChg chg="add del mod ord">
+          <ac:chgData name="Lucy Huang" userId="8d578496-9457-459c-a11f-92df8b250202" providerId="ADAL" clId="{C6727DD8-56ED-44ED-A31E-F6094BE8C3E3}" dt="2023-07-19T21:01:18.645" v="169" actId="21"/>
+          <ac:picMkLst>
+            <pc:docMk/>
+            <pc:sldMk cId="3819636605" sldId="259"/>
+            <ac:picMk id="6" creationId="{C36A8B36-E864-438F-C3F7-78072CE97327}"/>
+          </ac:picMkLst>
+        </pc:picChg>
+        <pc:picChg chg="add del mod">
+          <ac:chgData name="Lucy Huang" userId="8d578496-9457-459c-a11f-92df8b250202" providerId="ADAL" clId="{C6727DD8-56ED-44ED-A31E-F6094BE8C3E3}" dt="2023-07-19T20:56:22.663" v="155" actId="21"/>
+          <ac:picMkLst>
+            <pc:docMk/>
+            <pc:sldMk cId="3819636605" sldId="259"/>
+            <ac:picMk id="8" creationId="{F8A059A5-B3DF-10C0-D4D8-0729D2EFDD17}"/>
+          </ac:picMkLst>
+        </pc:picChg>
+        <pc:picChg chg="add del mod">
+          <ac:chgData name="Lucy Huang" userId="8d578496-9457-459c-a11f-92df8b250202" providerId="ADAL" clId="{C6727DD8-56ED-44ED-A31E-F6094BE8C3E3}" dt="2023-07-19T21:01:43.384" v="177" actId="21"/>
+          <ac:picMkLst>
+            <pc:docMk/>
+            <pc:sldMk cId="3819636605" sldId="259"/>
+            <ac:picMk id="10" creationId="{284C9A4B-3621-D4CD-F6A5-6DA9BEA0F88A}"/>
+          </ac:picMkLst>
+        </pc:picChg>
+        <pc:picChg chg="add mod">
+          <ac:chgData name="Lucy Huang" userId="8d578496-9457-459c-a11f-92df8b250202" providerId="ADAL" clId="{C6727DD8-56ED-44ED-A31E-F6094BE8C3E3}" dt="2023-07-19T21:01:47.406" v="178" actId="14100"/>
+          <ac:picMkLst>
+            <pc:docMk/>
+            <pc:sldMk cId="3819636605" sldId="259"/>
+            <ac:picMk id="15" creationId="{71E9C057-8966-632E-7DBB-43CE9425D066}"/>
+          </ac:picMkLst>
+        </pc:picChg>
+        <pc:picChg chg="add mod">
+          <ac:chgData name="Lucy Huang" userId="8d578496-9457-459c-a11f-92df8b250202" providerId="ADAL" clId="{C6727DD8-56ED-44ED-A31E-F6094BE8C3E3}" dt="2023-07-19T21:02:28.015" v="186" actId="1076"/>
+          <ac:picMkLst>
+            <pc:docMk/>
+            <pc:sldMk cId="3819636605" sldId="259"/>
+            <ac:picMk id="17" creationId="{FC45A1E9-5555-4626-E7D1-A89F60192ABE}"/>
+          </ac:picMkLst>
+        </pc:picChg>
+      </pc:sldChg>
+      <pc:sldChg chg="addSp modSp mod ord">
+        <pc:chgData name="Lucy Huang" userId="8d578496-9457-459c-a11f-92df8b250202" providerId="ADAL" clId="{C6727DD8-56ED-44ED-A31E-F6094BE8C3E3}" dt="2023-07-19T20:02:32.276" v="104" actId="1076"/>
+        <pc:sldMkLst>
+          <pc:docMk/>
+          <pc:sldMk cId="3569370174" sldId="260"/>
+        </pc:sldMkLst>
+        <pc:spChg chg="add mod">
+          <ac:chgData name="Lucy Huang" userId="8d578496-9457-459c-a11f-92df8b250202" providerId="ADAL" clId="{C6727DD8-56ED-44ED-A31E-F6094BE8C3E3}" dt="2023-07-19T20:02:32.276" v="104" actId="1076"/>
+          <ac:spMkLst>
+            <pc:docMk/>
+            <pc:sldMk cId="3569370174" sldId="260"/>
+            <ac:spMk id="3" creationId="{DF3FAA24-5F7B-EFF7-903F-394870F19223}"/>
+          </ac:spMkLst>
+        </pc:spChg>
+      </pc:sldChg>
+      <pc:sldChg chg="addSp delSp modSp mod ord">
+        <pc:chgData name="Lucy Huang" userId="8d578496-9457-459c-a11f-92df8b250202" providerId="ADAL" clId="{C6727DD8-56ED-44ED-A31E-F6094BE8C3E3}" dt="2023-07-19T20:03:30.426" v="107"/>
+        <pc:sldMkLst>
+          <pc:docMk/>
+          <pc:sldMk cId="1111217609" sldId="261"/>
+        </pc:sldMkLst>
+        <pc:spChg chg="add del mod">
+          <ac:chgData name="Lucy Huang" userId="8d578496-9457-459c-a11f-92df8b250202" providerId="ADAL" clId="{C6727DD8-56ED-44ED-A31E-F6094BE8C3E3}" dt="2023-07-19T20:02:27.477" v="102" actId="478"/>
+          <ac:spMkLst>
+            <pc:docMk/>
+            <pc:sldMk cId="1111217609" sldId="261"/>
+            <ac:spMk id="5" creationId="{C6AE9E2D-657A-2961-BEBF-9240B5F62E40}"/>
+          </ac:spMkLst>
+        </pc:spChg>
+        <pc:spChg chg="add del mod">
+          <ac:chgData name="Lucy Huang" userId="8d578496-9457-459c-a11f-92df8b250202" providerId="ADAL" clId="{C6727DD8-56ED-44ED-A31E-F6094BE8C3E3}" dt="2023-07-19T20:03:30.426" v="107"/>
+          <ac:spMkLst>
+            <pc:docMk/>
+            <pc:sldMk cId="1111217609" sldId="261"/>
+            <ac:spMk id="6" creationId="{0425C3F2-B552-800C-C7B8-D149E9972BA0}"/>
+          </ac:spMkLst>
+        </pc:spChg>
+      </pc:sldChg>
+      <pc:sldChg chg="addSp delSp modSp new mod">
+        <pc:chgData name="Lucy Huang" userId="8d578496-9457-459c-a11f-92df8b250202" providerId="ADAL" clId="{C6727DD8-56ED-44ED-A31E-F6094BE8C3E3}" dt="2023-07-19T21:02:17.690" v="183" actId="21"/>
+        <pc:sldMkLst>
+          <pc:docMk/>
+          <pc:sldMk cId="1706519594" sldId="262"/>
+        </pc:sldMkLst>
+        <pc:spChg chg="mod">
+          <ac:chgData name="Lucy Huang" userId="8d578496-9457-459c-a11f-92df8b250202" providerId="ADAL" clId="{C6727DD8-56ED-44ED-A31E-F6094BE8C3E3}" dt="2023-07-19T20:01:57.400" v="81" actId="20577"/>
+          <ac:spMkLst>
+            <pc:docMk/>
+            <pc:sldMk cId="1706519594" sldId="262"/>
+            <ac:spMk id="2" creationId="{84E77D92-D745-3C0C-538A-E38E4EA5D7A2}"/>
+          </ac:spMkLst>
+        </pc:spChg>
+        <pc:picChg chg="add del mod">
+          <ac:chgData name="Lucy Huang" userId="8d578496-9457-459c-a11f-92df8b250202" providerId="ADAL" clId="{C6727DD8-56ED-44ED-A31E-F6094BE8C3E3}" dt="2023-07-19T21:02:17.690" v="183" actId="21"/>
+          <ac:picMkLst>
+            <pc:docMk/>
+            <pc:sldMk cId="1706519594" sldId="262"/>
+            <ac:picMk id="4" creationId="{A04024EA-2615-1FBC-75AA-44A0620A5EC3}"/>
           </ac:picMkLst>
         </pc:picChg>
       </pc:sldChg>
@@ -1222,229 +1410,41 @@
     </pc:docChg>
   </pc:docChgLst>
   <pc:docChgLst>
-    <pc:chgData name="Lucy Huang" userId="8d578496-9457-459c-a11f-92df8b250202" providerId="ADAL" clId="{C6727DD8-56ED-44ED-A31E-F6094BE8C3E3}"/>
-    <pc:docChg chg="undo custSel addSld modSld sldOrd">
-      <pc:chgData name="Lucy Huang" userId="8d578496-9457-459c-a11f-92df8b250202" providerId="ADAL" clId="{C6727DD8-56ED-44ED-A31E-F6094BE8C3E3}" dt="2023-07-19T21:02:58.210" v="187" actId="208"/>
+    <pc:chgData name="Guest User" userId="S::urn:spo:anon#ea516d5bfbddd5fd83341af53625b03d3f67b2595679e445efc4f5857a366070::" providerId="AD" clId="Web-{25346240-C5B6-850E-D09C-CB0969BBF519}"/>
+    <pc:docChg chg="modSld">
+      <pc:chgData name="Guest User" userId="S::urn:spo:anon#ea516d5bfbddd5fd83341af53625b03d3f67b2595679e445efc4f5857a366070::" providerId="AD" clId="Web-{25346240-C5B6-850E-D09C-CB0969BBF519}" dt="2023-07-19T19:06:50.547" v="4" actId="14100"/>
       <pc:docMkLst>
         <pc:docMk/>
       </pc:docMkLst>
-      <pc:sldChg chg="delSp modSp mod">
-        <pc:chgData name="Lucy Huang" userId="8d578496-9457-459c-a11f-92df8b250202" providerId="ADAL" clId="{C6727DD8-56ED-44ED-A31E-F6094BE8C3E3}" dt="2023-07-19T20:49:11.332" v="108" actId="21"/>
-        <pc:sldMkLst>
-          <pc:docMk/>
-          <pc:sldMk cId="3621920733" sldId="257"/>
-        </pc:sldMkLst>
-        <pc:spChg chg="mod">
-          <ac:chgData name="Lucy Huang" userId="8d578496-9457-459c-a11f-92df8b250202" providerId="ADAL" clId="{C6727DD8-56ED-44ED-A31E-F6094BE8C3E3}" dt="2023-07-19T20:01:45.303" v="48" actId="20577"/>
-          <ac:spMkLst>
-            <pc:docMk/>
-            <pc:sldMk cId="3621920733" sldId="257"/>
-            <ac:spMk id="2" creationId="{BB02845D-2E6F-9B04-E0E2-2E6F20EC4038}"/>
-          </ac:spMkLst>
-        </pc:spChg>
-        <pc:picChg chg="del">
-          <ac:chgData name="Lucy Huang" userId="8d578496-9457-459c-a11f-92df8b250202" providerId="ADAL" clId="{C6727DD8-56ED-44ED-A31E-F6094BE8C3E3}" dt="2023-07-19T20:49:11.332" v="108" actId="21"/>
-          <ac:picMkLst>
-            <pc:docMk/>
-            <pc:sldMk cId="3621920733" sldId="257"/>
-            <ac:picMk id="4" creationId="{653D21CA-1FAB-D551-7915-26558C74C20B}"/>
-          </ac:picMkLst>
-        </pc:picChg>
-      </pc:sldChg>
-      <pc:sldChg chg="addSp delSp modSp mod ord setBg">
-        <pc:chgData name="Lucy Huang" userId="8d578496-9457-459c-a11f-92df8b250202" providerId="ADAL" clId="{C6727DD8-56ED-44ED-A31E-F6094BE8C3E3}" dt="2023-07-19T21:02:58.210" v="187" actId="208"/>
-        <pc:sldMkLst>
-          <pc:docMk/>
-          <pc:sldMk cId="3819636605" sldId="259"/>
-        </pc:sldMkLst>
-        <pc:spChg chg="mod">
-          <ac:chgData name="Lucy Huang" userId="8d578496-9457-459c-a11f-92df8b250202" providerId="ADAL" clId="{C6727DD8-56ED-44ED-A31E-F6094BE8C3E3}" dt="2023-07-19T20:56:20.634" v="154" actId="26606"/>
-          <ac:spMkLst>
-            <pc:docMk/>
-            <pc:sldMk cId="3819636605" sldId="259"/>
-            <ac:spMk id="2" creationId="{45F25EE0-4A40-BD9F-FC4A-8FCCD3962D82}"/>
-          </ac:spMkLst>
-        </pc:spChg>
-        <pc:spChg chg="del">
-          <ac:chgData name="Lucy Huang" userId="8d578496-9457-459c-a11f-92df8b250202" providerId="ADAL" clId="{C6727DD8-56ED-44ED-A31E-F6094BE8C3E3}" dt="2023-07-19T20:53:38.493" v="110" actId="931"/>
-          <ac:spMkLst>
-            <pc:docMk/>
-            <pc:sldMk cId="3819636605" sldId="259"/>
-            <ac:spMk id="3" creationId="{9C91B660-27F1-8211-49FB-3FC4A6FCAFB1}"/>
-          </ac:spMkLst>
-        </pc:spChg>
-        <pc:spChg chg="add del mod">
-          <ac:chgData name="Lucy Huang" userId="8d578496-9457-459c-a11f-92df8b250202" providerId="ADAL" clId="{C6727DD8-56ED-44ED-A31E-F6094BE8C3E3}" dt="2023-07-19T21:01:29.553" v="170" actId="931"/>
-          <ac:spMkLst>
-            <pc:docMk/>
-            <pc:sldMk cId="3819636605" sldId="259"/>
-            <ac:spMk id="12" creationId="{1E442BF0-692F-F5F3-8D64-CB4635A12B3E}"/>
-          </ac:spMkLst>
-        </pc:spChg>
-        <pc:spChg chg="add del">
-          <ac:chgData name="Lucy Huang" userId="8d578496-9457-459c-a11f-92df8b250202" providerId="ADAL" clId="{C6727DD8-56ED-44ED-A31E-F6094BE8C3E3}" dt="2023-07-19T20:56:20.634" v="154" actId="26606"/>
-          <ac:spMkLst>
-            <pc:docMk/>
-            <pc:sldMk cId="3819636605" sldId="259"/>
-            <ac:spMk id="14" creationId="{9F2927B6-D13D-B867-8DE7-6FE6685BDBA0}"/>
-          </ac:spMkLst>
-        </pc:spChg>
-        <pc:spChg chg="add mod">
-          <ac:chgData name="Lucy Huang" userId="8d578496-9457-459c-a11f-92df8b250202" providerId="ADAL" clId="{C6727DD8-56ED-44ED-A31E-F6094BE8C3E3}" dt="2023-07-19T21:02:58.210" v="187" actId="208"/>
-          <ac:spMkLst>
-            <pc:docMk/>
-            <pc:sldMk cId="3819636605" sldId="259"/>
-            <ac:spMk id="16" creationId="{4BF8B23F-1E17-1F09-72DA-5ADA0FCEB63D}"/>
-          </ac:spMkLst>
-        </pc:spChg>
-        <pc:picChg chg="del">
-          <ac:chgData name="Lucy Huang" userId="8d578496-9457-459c-a11f-92df8b250202" providerId="ADAL" clId="{C6727DD8-56ED-44ED-A31E-F6094BE8C3E3}" dt="2023-07-19T20:49:12.515" v="109" actId="21"/>
-          <ac:picMkLst>
-            <pc:docMk/>
-            <pc:sldMk cId="3819636605" sldId="259"/>
-            <ac:picMk id="4" creationId="{DDC4C5D6-C764-9A39-CA82-577C8C74C140}"/>
-          </ac:picMkLst>
-        </pc:picChg>
-        <pc:picChg chg="add del mod ord">
-          <ac:chgData name="Lucy Huang" userId="8d578496-9457-459c-a11f-92df8b250202" providerId="ADAL" clId="{C6727DD8-56ED-44ED-A31E-F6094BE8C3E3}" dt="2023-07-19T21:01:18.645" v="169" actId="21"/>
-          <ac:picMkLst>
-            <pc:docMk/>
-            <pc:sldMk cId="3819636605" sldId="259"/>
-            <ac:picMk id="6" creationId="{C36A8B36-E864-438F-C3F7-78072CE97327}"/>
-          </ac:picMkLst>
-        </pc:picChg>
-        <pc:picChg chg="add del mod">
-          <ac:chgData name="Lucy Huang" userId="8d578496-9457-459c-a11f-92df8b250202" providerId="ADAL" clId="{C6727DD8-56ED-44ED-A31E-F6094BE8C3E3}" dt="2023-07-19T20:56:22.663" v="155" actId="21"/>
-          <ac:picMkLst>
-            <pc:docMk/>
-            <pc:sldMk cId="3819636605" sldId="259"/>
-            <ac:picMk id="8" creationId="{F8A059A5-B3DF-10C0-D4D8-0729D2EFDD17}"/>
-          </ac:picMkLst>
-        </pc:picChg>
-        <pc:picChg chg="add del mod">
-          <ac:chgData name="Lucy Huang" userId="8d578496-9457-459c-a11f-92df8b250202" providerId="ADAL" clId="{C6727DD8-56ED-44ED-A31E-F6094BE8C3E3}" dt="2023-07-19T21:01:43.384" v="177" actId="21"/>
-          <ac:picMkLst>
-            <pc:docMk/>
-            <pc:sldMk cId="3819636605" sldId="259"/>
-            <ac:picMk id="10" creationId="{284C9A4B-3621-D4CD-F6A5-6DA9BEA0F88A}"/>
-          </ac:picMkLst>
-        </pc:picChg>
-        <pc:picChg chg="add mod">
-          <ac:chgData name="Lucy Huang" userId="8d578496-9457-459c-a11f-92df8b250202" providerId="ADAL" clId="{C6727DD8-56ED-44ED-A31E-F6094BE8C3E3}" dt="2023-07-19T21:01:47.406" v="178" actId="14100"/>
-          <ac:picMkLst>
-            <pc:docMk/>
-            <pc:sldMk cId="3819636605" sldId="259"/>
-            <ac:picMk id="15" creationId="{71E9C057-8966-632E-7DBB-43CE9425D066}"/>
-          </ac:picMkLst>
-        </pc:picChg>
-        <pc:picChg chg="add mod">
-          <ac:chgData name="Lucy Huang" userId="8d578496-9457-459c-a11f-92df8b250202" providerId="ADAL" clId="{C6727DD8-56ED-44ED-A31E-F6094BE8C3E3}" dt="2023-07-19T21:02:28.015" v="186" actId="1076"/>
-          <ac:picMkLst>
-            <pc:docMk/>
-            <pc:sldMk cId="3819636605" sldId="259"/>
-            <ac:picMk id="17" creationId="{FC45A1E9-5555-4626-E7D1-A89F60192ABE}"/>
-          </ac:picMkLst>
-        </pc:picChg>
-      </pc:sldChg>
-      <pc:sldChg chg="addSp modSp mod ord">
-        <pc:chgData name="Lucy Huang" userId="8d578496-9457-459c-a11f-92df8b250202" providerId="ADAL" clId="{C6727DD8-56ED-44ED-A31E-F6094BE8C3E3}" dt="2023-07-19T20:02:32.276" v="104" actId="1076"/>
+      <pc:sldChg chg="modSp">
+        <pc:chgData name="Guest User" userId="S::urn:spo:anon#ea516d5bfbddd5fd83341af53625b03d3f67b2595679e445efc4f5857a366070::" providerId="AD" clId="Web-{25346240-C5B6-850E-D09C-CB0969BBF519}" dt="2023-07-19T19:05:02.368" v="2" actId="1076"/>
         <pc:sldMkLst>
           <pc:docMk/>
           <pc:sldMk cId="3569370174" sldId="260"/>
         </pc:sldMkLst>
-        <pc:spChg chg="add mod">
-          <ac:chgData name="Lucy Huang" userId="8d578496-9457-459c-a11f-92df8b250202" providerId="ADAL" clId="{C6727DD8-56ED-44ED-A31E-F6094BE8C3E3}" dt="2023-07-19T20:02:32.276" v="104" actId="1076"/>
-          <ac:spMkLst>
+        <pc:picChg chg="mod">
+          <ac:chgData name="Guest User" userId="S::urn:spo:anon#ea516d5bfbddd5fd83341af53625b03d3f67b2595679e445efc4f5857a366070::" providerId="AD" clId="Web-{25346240-C5B6-850E-D09C-CB0969BBF519}" dt="2023-07-19T19:05:02.368" v="2" actId="1076"/>
+          <ac:picMkLst>
             <pc:docMk/>
             <pc:sldMk cId="3569370174" sldId="260"/>
-            <ac:spMk id="3" creationId="{DF3FAA24-5F7B-EFF7-903F-394870F19223}"/>
-          </ac:spMkLst>
-        </pc:spChg>
+            <ac:picMk id="6" creationId="{52F29D42-4552-DAB9-6317-7FBACA44894B}"/>
+          </ac:picMkLst>
+        </pc:picChg>
       </pc:sldChg>
-      <pc:sldChg chg="addSp delSp modSp mod ord">
-        <pc:chgData name="Lucy Huang" userId="8d578496-9457-459c-a11f-92df8b250202" providerId="ADAL" clId="{C6727DD8-56ED-44ED-A31E-F6094BE8C3E3}" dt="2023-07-19T20:03:30.426" v="107"/>
+      <pc:sldChg chg="modSp">
+        <pc:chgData name="Guest User" userId="S::urn:spo:anon#ea516d5bfbddd5fd83341af53625b03d3f67b2595679e445efc4f5857a366070::" providerId="AD" clId="Web-{25346240-C5B6-850E-D09C-CB0969BBF519}" dt="2023-07-19T19:06:50.547" v="4" actId="14100"/>
         <pc:sldMkLst>
           <pc:docMk/>
           <pc:sldMk cId="1111217609" sldId="261"/>
         </pc:sldMkLst>
-        <pc:spChg chg="add del mod">
-          <ac:chgData name="Lucy Huang" userId="8d578496-9457-459c-a11f-92df8b250202" providerId="ADAL" clId="{C6727DD8-56ED-44ED-A31E-F6094BE8C3E3}" dt="2023-07-19T20:02:27.477" v="102" actId="478"/>
-          <ac:spMkLst>
+        <pc:picChg chg="mod">
+          <ac:chgData name="Guest User" userId="S::urn:spo:anon#ea516d5bfbddd5fd83341af53625b03d3f67b2595679e445efc4f5857a366070::" providerId="AD" clId="Web-{25346240-C5B6-850E-D09C-CB0969BBF519}" dt="2023-07-19T19:06:50.547" v="4" actId="14100"/>
+          <ac:picMkLst>
             <pc:docMk/>
             <pc:sldMk cId="1111217609" sldId="261"/>
-            <ac:spMk id="5" creationId="{C6AE9E2D-657A-2961-BEBF-9240B5F62E40}"/>
-          </ac:spMkLst>
-        </pc:spChg>
-        <pc:spChg chg="add del mod">
-          <ac:chgData name="Lucy Huang" userId="8d578496-9457-459c-a11f-92df8b250202" providerId="ADAL" clId="{C6727DD8-56ED-44ED-A31E-F6094BE8C3E3}" dt="2023-07-19T20:03:30.426" v="107"/>
-          <ac:spMkLst>
-            <pc:docMk/>
-            <pc:sldMk cId="1111217609" sldId="261"/>
-            <ac:spMk id="6" creationId="{0425C3F2-B552-800C-C7B8-D149E9972BA0}"/>
-          </ac:spMkLst>
-        </pc:spChg>
-      </pc:sldChg>
-      <pc:sldChg chg="addSp delSp modSp new mod">
-        <pc:chgData name="Lucy Huang" userId="8d578496-9457-459c-a11f-92df8b250202" providerId="ADAL" clId="{C6727DD8-56ED-44ED-A31E-F6094BE8C3E3}" dt="2023-07-19T21:02:17.690" v="183" actId="21"/>
-        <pc:sldMkLst>
-          <pc:docMk/>
-          <pc:sldMk cId="1706519594" sldId="262"/>
-        </pc:sldMkLst>
-        <pc:spChg chg="mod">
-          <ac:chgData name="Lucy Huang" userId="8d578496-9457-459c-a11f-92df8b250202" providerId="ADAL" clId="{C6727DD8-56ED-44ED-A31E-F6094BE8C3E3}" dt="2023-07-19T20:01:57.400" v="81" actId="20577"/>
-          <ac:spMkLst>
-            <pc:docMk/>
-            <pc:sldMk cId="1706519594" sldId="262"/>
-            <ac:spMk id="2" creationId="{84E77D92-D745-3C0C-538A-E38E4EA5D7A2}"/>
-          </ac:spMkLst>
-        </pc:spChg>
-        <pc:picChg chg="add del mod">
-          <ac:chgData name="Lucy Huang" userId="8d578496-9457-459c-a11f-92df8b250202" providerId="ADAL" clId="{C6727DD8-56ED-44ED-A31E-F6094BE8C3E3}" dt="2023-07-19T21:02:17.690" v="183" actId="21"/>
-          <ac:picMkLst>
-            <pc:docMk/>
-            <pc:sldMk cId="1706519594" sldId="262"/>
-            <ac:picMk id="4" creationId="{A04024EA-2615-1FBC-75AA-44A0620A5EC3}"/>
+            <ac:picMk id="4" creationId="{B7167C50-499F-75A3-DC5B-A351D0A7C7A1}"/>
           </ac:picMkLst>
         </pc:picChg>
-      </pc:sldChg>
-    </pc:docChg>
-  </pc:docChgLst>
-  <pc:docChgLst>
-    <pc:chgData name="Huang, Lucy Yaoyuan" userId="S::u251639@bcm.edu::8d578496-9457-459c-a11f-92df8b250202" providerId="AD" clId="Web-{AF2C5F12-4717-BC24-9526-1BD85B43B8D8}"/>
-    <pc:docChg chg="modSld">
-      <pc:chgData name="Huang, Lucy Yaoyuan" userId="S::u251639@bcm.edu::8d578496-9457-459c-a11f-92df8b250202" providerId="AD" clId="Web-{AF2C5F12-4717-BC24-9526-1BD85B43B8D8}" dt="2023-07-21T01:13:10.269" v="1" actId="20577"/>
-      <pc:docMkLst>
-        <pc:docMk/>
-      </pc:docMkLst>
-      <pc:sldChg chg="delSp">
-        <pc:chgData name="Huang, Lucy Yaoyuan" userId="S::u251639@bcm.edu::8d578496-9457-459c-a11f-92df8b250202" providerId="AD" clId="Web-{AF2C5F12-4717-BC24-9526-1BD85B43B8D8}" dt="2023-07-21T01:11:17.219" v="0"/>
-        <pc:sldMkLst>
-          <pc:docMk/>
-          <pc:sldMk cId="3569370174" sldId="260"/>
-        </pc:sldMkLst>
-        <pc:spChg chg="del">
-          <ac:chgData name="Huang, Lucy Yaoyuan" userId="S::u251639@bcm.edu::8d578496-9457-459c-a11f-92df8b250202" providerId="AD" clId="Web-{AF2C5F12-4717-BC24-9526-1BD85B43B8D8}" dt="2023-07-21T01:11:17.219" v="0"/>
-          <ac:spMkLst>
-            <pc:docMk/>
-            <pc:sldMk cId="3569370174" sldId="260"/>
-            <ac:spMk id="3" creationId="{DF3FAA24-5F7B-EFF7-903F-394870F19223}"/>
-          </ac:spMkLst>
-        </pc:spChg>
-      </pc:sldChg>
-      <pc:sldChg chg="modSp">
-        <pc:chgData name="Huang, Lucy Yaoyuan" userId="S::u251639@bcm.edu::8d578496-9457-459c-a11f-92df8b250202" providerId="AD" clId="Web-{AF2C5F12-4717-BC24-9526-1BD85B43B8D8}" dt="2023-07-21T01:13:10.269" v="1" actId="20577"/>
-        <pc:sldMkLst>
-          <pc:docMk/>
-          <pc:sldMk cId="3258022718" sldId="263"/>
-        </pc:sldMkLst>
-        <pc:spChg chg="mod">
-          <ac:chgData name="Huang, Lucy Yaoyuan" userId="S::u251639@bcm.edu::8d578496-9457-459c-a11f-92df8b250202" providerId="AD" clId="Web-{AF2C5F12-4717-BC24-9526-1BD85B43B8D8}" dt="2023-07-21T01:13:10.269" v="1" actId="20577"/>
-          <ac:spMkLst>
-            <pc:docMk/>
-            <pc:sldMk cId="3258022718" sldId="263"/>
-            <ac:spMk id="2" creationId="{1F0C129A-B46B-8D5E-E8CC-F44C8BBA237D}"/>
-          </ac:spMkLst>
-        </pc:spChg>
       </pc:sldChg>
     </pc:docChg>
   </pc:docChgLst>
@@ -2264,7 +2264,7 @@
           <a:p>
             <a:fld id="{F81EA58A-236B-4351-AA1B-97F3A2A984DC}" type="datetimeFigureOut">
               <a:rPr lang="en-US" smtClean="0"/>
-              <a:t>8/3/2023</a:t>
+              <a:t>8/9/2023</a:t>
             </a:fld>
             <a:endParaRPr lang="en-US"/>
           </a:p>
@@ -2514,7 +2514,7 @@
           <a:p>
             <a:fld id="{F81EA58A-236B-4351-AA1B-97F3A2A984DC}" type="datetimeFigureOut">
               <a:rPr lang="en-US" smtClean="0"/>
-              <a:t>8/3/2023</a:t>
+              <a:t>8/9/2023</a:t>
             </a:fld>
             <a:endParaRPr lang="en-US"/>
           </a:p>
@@ -2827,7 +2827,7 @@
           <a:p>
             <a:fld id="{F81EA58A-236B-4351-AA1B-97F3A2A984DC}" type="datetimeFigureOut">
               <a:rPr lang="en-US" smtClean="0"/>
-              <a:t>8/3/2023</a:t>
+              <a:t>8/9/2023</a:t>
             </a:fld>
             <a:endParaRPr lang="en-US"/>
           </a:p>
@@ -3159,7 +3159,7 @@
           <a:p>
             <a:fld id="{F81EA58A-236B-4351-AA1B-97F3A2A984DC}" type="datetimeFigureOut">
               <a:rPr lang="en-US" smtClean="0"/>
-              <a:t>8/3/2023</a:t>
+              <a:t>8/9/2023</a:t>
             </a:fld>
             <a:endParaRPr lang="en-US"/>
           </a:p>
@@ -3472,7 +3472,7 @@
           <a:p>
             <a:fld id="{F81EA58A-236B-4351-AA1B-97F3A2A984DC}" type="datetimeFigureOut">
               <a:rPr lang="en-US" smtClean="0"/>
-              <a:t>8/3/2023</a:t>
+              <a:t>8/9/2023</a:t>
             </a:fld>
             <a:endParaRPr lang="en-US"/>
           </a:p>
@@ -3864,7 +3864,7 @@
           <a:p>
             <a:fld id="{F81EA58A-236B-4351-AA1B-97F3A2A984DC}" type="datetimeFigureOut">
               <a:rPr lang="en-US" smtClean="0"/>
-              <a:t>8/3/2023</a:t>
+              <a:t>8/9/2023</a:t>
             </a:fld>
             <a:endParaRPr lang="en-US"/>
           </a:p>
@@ -4032,7 +4032,7 @@
           <a:p>
             <a:fld id="{F81EA58A-236B-4351-AA1B-97F3A2A984DC}" type="datetimeFigureOut">
               <a:rPr lang="en-US" smtClean="0"/>
-              <a:t>8/3/2023</a:t>
+              <a:t>8/9/2023</a:t>
             </a:fld>
             <a:endParaRPr lang="en-US"/>
           </a:p>
@@ -4210,7 +4210,7 @@
           <a:p>
             <a:fld id="{F81EA58A-236B-4351-AA1B-97F3A2A984DC}" type="datetimeFigureOut">
               <a:rPr lang="en-US" smtClean="0"/>
-              <a:t>8/3/2023</a:t>
+              <a:t>8/9/2023</a:t>
             </a:fld>
             <a:endParaRPr lang="en-US"/>
           </a:p>
@@ -4378,7 +4378,7 @@
           <a:p>
             <a:fld id="{F81EA58A-236B-4351-AA1B-97F3A2A984DC}" type="datetimeFigureOut">
               <a:rPr lang="en-US" smtClean="0"/>
-              <a:t>8/3/2023</a:t>
+              <a:t>8/9/2023</a:t>
             </a:fld>
             <a:endParaRPr lang="en-US"/>
           </a:p>
@@ -4624,7 +4624,7 @@
           <a:p>
             <a:fld id="{F81EA58A-236B-4351-AA1B-97F3A2A984DC}" type="datetimeFigureOut">
               <a:rPr lang="en-US" smtClean="0"/>
-              <a:t>8/3/2023</a:t>
+              <a:t>8/9/2023</a:t>
             </a:fld>
             <a:endParaRPr lang="en-US"/>
           </a:p>
@@ -4853,7 +4853,7 @@
           <a:p>
             <a:fld id="{F81EA58A-236B-4351-AA1B-97F3A2A984DC}" type="datetimeFigureOut">
               <a:rPr lang="en-US" smtClean="0"/>
-              <a:t>8/3/2023</a:t>
+              <a:t>8/9/2023</a:t>
             </a:fld>
             <a:endParaRPr lang="en-US"/>
           </a:p>
@@ -5224,7 +5224,7 @@
           <a:p>
             <a:fld id="{F81EA58A-236B-4351-AA1B-97F3A2A984DC}" type="datetimeFigureOut">
               <a:rPr lang="en-US" smtClean="0"/>
-              <a:t>8/3/2023</a:t>
+              <a:t>8/9/2023</a:t>
             </a:fld>
             <a:endParaRPr lang="en-US"/>
           </a:p>
@@ -5346,7 +5346,7 @@
           <a:p>
             <a:fld id="{F81EA58A-236B-4351-AA1B-97F3A2A984DC}" type="datetimeFigureOut">
               <a:rPr lang="en-US" smtClean="0"/>
-              <a:t>8/3/2023</a:t>
+              <a:t>8/9/2023</a:t>
             </a:fld>
             <a:endParaRPr lang="en-US"/>
           </a:p>
@@ -5441,7 +5441,7 @@
           <a:p>
             <a:fld id="{F81EA58A-236B-4351-AA1B-97F3A2A984DC}" type="datetimeFigureOut">
               <a:rPr lang="en-US" smtClean="0"/>
-              <a:t>8/3/2023</a:t>
+              <a:t>8/9/2023</a:t>
             </a:fld>
             <a:endParaRPr lang="en-US"/>
           </a:p>
@@ -5694,7 +5694,7 @@
           <a:p>
             <a:fld id="{F81EA58A-236B-4351-AA1B-97F3A2A984DC}" type="datetimeFigureOut">
               <a:rPr lang="en-US" smtClean="0"/>
-              <a:t>8/3/2023</a:t>
+              <a:t>8/9/2023</a:t>
             </a:fld>
             <a:endParaRPr lang="en-US"/>
           </a:p>
@@ -5997,7 +5997,7 @@
           <a:p>
             <a:fld id="{F81EA58A-236B-4351-AA1B-97F3A2A984DC}" type="datetimeFigureOut">
               <a:rPr lang="en-US" smtClean="0"/>
-              <a:t>8/3/2023</a:t>
+              <a:t>8/9/2023</a:t>
             </a:fld>
             <a:endParaRPr lang="en-US"/>
           </a:p>
@@ -6697,7 +6697,7 @@
           <a:p>
             <a:fld id="{F81EA58A-236B-4351-AA1B-97F3A2A984DC}" type="datetimeFigureOut">
               <a:rPr lang="en-US" smtClean="0"/>
-              <a:t>8/3/2023</a:t>
+              <a:t>8/9/2023</a:t>
             </a:fld>
             <a:endParaRPr lang="en-US"/>
           </a:p>
@@ -8067,6 +8067,131 @@
           <p:cNvPr id="2" name="Title 1">
             <a:extLst>
               <a:ext uri="{FF2B5EF4-FFF2-40B4-BE49-F238E27FC236}">
+                <a16:creationId xmlns:a16="http://schemas.microsoft.com/office/drawing/2014/main" id="{8BB3DD29-ABE6-8A5B-E160-F583233DE005}"/>
+              </a:ext>
+            </a:extLst>
+          </p:cNvPr>
+          <p:cNvSpPr>
+            <a:spLocks noGrp="1"/>
+          </p:cNvSpPr>
+          <p:nvPr>
+            <p:ph type="title"/>
+          </p:nvPr>
+        </p:nvSpPr>
+        <p:spPr/>
+        <p:txBody>
+          <a:bodyPr/>
+          <a:lstStyle/>
+          <a:p>
+            <a:endParaRPr lang="en-US"/>
+          </a:p>
+        </p:txBody>
+      </p:sp>
+      <p:pic>
+        <p:nvPicPr>
+          <p:cNvPr id="5" name="Content Placeholder 4" descr="A graph of a graph showing a number of black dots&#10;&#10;Description automatically generated">
+            <a:extLst>
+              <a:ext uri="{FF2B5EF4-FFF2-40B4-BE49-F238E27FC236}">
+                <a16:creationId xmlns:a16="http://schemas.microsoft.com/office/drawing/2014/main" id="{CA142DBB-2EB1-D659-2F16-A6E6F89F19E2}"/>
+              </a:ext>
+            </a:extLst>
+          </p:cNvPr>
+          <p:cNvPicPr>
+            <a:picLocks noGrp="1" noChangeAspect="1"/>
+          </p:cNvPicPr>
+          <p:nvPr>
+            <p:ph idx="1"/>
+          </p:nvPr>
+        </p:nvPicPr>
+        <p:blipFill>
+          <a:blip r:embed="rId2">
+            <a:extLst>
+              <a:ext uri="{28A0092B-C50C-407E-A947-70E740481C1C}">
+                <a14:useLocalDpi xmlns:a14="http://schemas.microsoft.com/office/drawing/2010/main" val="0"/>
+              </a:ext>
+            </a:extLst>
+          </a:blip>
+          <a:stretch>
+            <a:fillRect/>
+          </a:stretch>
+        </p:blipFill>
+        <p:spPr>
+          <a:xfrm>
+            <a:off x="513067" y="305155"/>
+            <a:ext cx="8566293" cy="6397486"/>
+          </a:xfrm>
+        </p:spPr>
+      </p:pic>
+      <p:sp>
+        <p:nvSpPr>
+          <p:cNvPr id="6" name="TextBox 5">
+            <a:extLst>
+              <a:ext uri="{FF2B5EF4-FFF2-40B4-BE49-F238E27FC236}">
+                <a16:creationId xmlns:a16="http://schemas.microsoft.com/office/drawing/2014/main" id="{17FFD8C0-591A-BDCF-FEBC-5517963E1259}"/>
+              </a:ext>
+            </a:extLst>
+          </p:cNvPr>
+          <p:cNvSpPr txBox="1"/>
+          <p:nvPr/>
+        </p:nvSpPr>
+        <p:spPr>
+          <a:xfrm>
+            <a:off x="6096000" y="1154097"/>
+            <a:ext cx="2356735" cy="369332"/>
+          </a:xfrm>
+          <a:prstGeom prst="rect">
+            <a:avLst/>
+          </a:prstGeom>
+          <a:noFill/>
+        </p:spPr>
+        <p:txBody>
+          <a:bodyPr wrap="none" rtlCol="0">
+            <a:spAutoFit/>
+          </a:bodyPr>
+          <a:lstStyle/>
+          <a:p>
+            <a:r>
+              <a:rPr lang="en-US" dirty="0"/>
+              <a:t>Ask about 0 dropping</a:t>
+            </a:r>
+          </a:p>
+        </p:txBody>
+      </p:sp>
+    </p:spTree>
+    <p:extLst>
+      <p:ext uri="{BB962C8B-B14F-4D97-AF65-F5344CB8AC3E}">
+        <p14:creationId xmlns:p14="http://schemas.microsoft.com/office/powerpoint/2010/main" val="3143633826"/>
+      </p:ext>
+    </p:extLst>
+  </p:cSld>
+  <p:clrMapOvr>
+    <a:masterClrMapping/>
+  </p:clrMapOvr>
+</p:sld>
+</file>
+
+<file path=ppt/slides/slide8.xml><?xml version="1.0" encoding="utf-8"?>
+<p:sld xmlns:a="http://schemas.openxmlformats.org/drawingml/2006/main" xmlns:r="http://schemas.openxmlformats.org/officeDocument/2006/relationships" xmlns:p="http://schemas.openxmlformats.org/presentationml/2006/main">
+  <p:cSld>
+    <p:spTree>
+      <p:nvGrpSpPr>
+        <p:cNvPr id="1" name=""/>
+        <p:cNvGrpSpPr/>
+        <p:nvPr/>
+      </p:nvGrpSpPr>
+      <p:grpSpPr>
+        <a:xfrm>
+          <a:off x="0" y="0"/>
+          <a:ext cx="0" cy="0"/>
+          <a:chOff x="0" y="0"/>
+          <a:chExt cx="0" cy="0"/>
+        </a:xfrm>
+      </p:grpSpPr>
+      <p:sp>
+        <p:nvSpPr>
+          <p:cNvPr id="2" name="Title 1">
+            <a:extLst>
+              <a:ext uri="{FF2B5EF4-FFF2-40B4-BE49-F238E27FC236}">
                 <a16:creationId xmlns:a16="http://schemas.microsoft.com/office/drawing/2014/main" id="{0AD2B499-B286-64E7-20F9-9E43648984DB}"/>
               </a:ext>
             </a:extLst>
@@ -8161,96 +8286,6 @@
 </p:sld>
 </file>
 
-<file path=ppt/slides/slide8.xml><?xml version="1.0" encoding="utf-8"?>
-<p:sld xmlns:a="http://schemas.openxmlformats.org/drawingml/2006/main" xmlns:r="http://schemas.openxmlformats.org/officeDocument/2006/relationships" xmlns:p="http://schemas.openxmlformats.org/presentationml/2006/main">
-  <p:cSld>
-    <p:spTree>
-      <p:nvGrpSpPr>
-        <p:cNvPr id="1" name=""/>
-        <p:cNvGrpSpPr/>
-        <p:nvPr/>
-      </p:nvGrpSpPr>
-      <p:grpSpPr>
-        <a:xfrm>
-          <a:off x="0" y="0"/>
-          <a:ext cx="0" cy="0"/>
-          <a:chOff x="0" y="0"/>
-          <a:chExt cx="0" cy="0"/>
-        </a:xfrm>
-      </p:grpSpPr>
-      <p:sp>
-        <p:nvSpPr>
-          <p:cNvPr id="2" name="Title 1">
-            <a:extLst>
-              <a:ext uri="{FF2B5EF4-FFF2-40B4-BE49-F238E27FC236}">
-                <a16:creationId xmlns:a16="http://schemas.microsoft.com/office/drawing/2014/main" id="{570223BB-D315-D6F1-31BD-536E33E1C0B1}"/>
-              </a:ext>
-            </a:extLst>
-          </p:cNvPr>
-          <p:cNvSpPr>
-            <a:spLocks noGrp="1"/>
-          </p:cNvSpPr>
-          <p:nvPr>
-            <p:ph type="title"/>
-          </p:nvPr>
-        </p:nvSpPr>
-        <p:spPr/>
-        <p:txBody>
-          <a:bodyPr/>
-          <a:lstStyle/>
-          <a:p>
-            <a:endParaRPr lang="en-US"/>
-          </a:p>
-        </p:txBody>
-      </p:sp>
-      <p:pic>
-        <p:nvPicPr>
-          <p:cNvPr id="7" name="Content Placeholder 6" descr="A graph of different colored squares&#10;&#10;Description automatically generated">
-            <a:extLst>
-              <a:ext uri="{FF2B5EF4-FFF2-40B4-BE49-F238E27FC236}">
-                <a16:creationId xmlns:a16="http://schemas.microsoft.com/office/drawing/2014/main" id="{4B5599B9-3CE5-29B1-B8EC-597ED224AA96}"/>
-              </a:ext>
-            </a:extLst>
-          </p:cNvPr>
-          <p:cNvPicPr>
-            <a:picLocks noGrp="1" noChangeAspect="1"/>
-          </p:cNvPicPr>
-          <p:nvPr>
-            <p:ph idx="1"/>
-          </p:nvPr>
-        </p:nvPicPr>
-        <p:blipFill>
-          <a:blip r:embed="rId2">
-            <a:extLst>
-              <a:ext uri="{28A0092B-C50C-407E-A947-70E740481C1C}">
-                <a14:useLocalDpi xmlns:a14="http://schemas.microsoft.com/office/drawing/2010/main" val="0"/>
-              </a:ext>
-            </a:extLst>
-          </a:blip>
-          <a:stretch>
-            <a:fillRect/>
-          </a:stretch>
-        </p:blipFill>
-        <p:spPr>
-          <a:xfrm>
-            <a:off x="303217" y="431817"/>
-            <a:ext cx="9793064" cy="5994366"/>
-          </a:xfrm>
-        </p:spPr>
-      </p:pic>
-    </p:spTree>
-    <p:extLst>
-      <p:ext uri="{BB962C8B-B14F-4D97-AF65-F5344CB8AC3E}">
-        <p14:creationId xmlns:p14="http://schemas.microsoft.com/office/powerpoint/2010/main" val="1697230990"/>
-      </p:ext>
-    </p:extLst>
-  </p:cSld>
-  <p:clrMapOvr>
-    <a:masterClrMapping/>
-  </p:clrMapOvr>
-</p:sld>
-</file>
-
 <file path=ppt/slides/slide9.xml><?xml version="1.0" encoding="utf-8"?>
 <p:sld xmlns:a="http://schemas.openxmlformats.org/drawingml/2006/main" xmlns:r="http://schemas.openxmlformats.org/officeDocument/2006/relationships" xmlns:p="http://schemas.openxmlformats.org/presentationml/2006/main">
   <p:cSld>
@@ -8321,10 +8356,10 @@
   <a:themeElements>
     <a:clrScheme name="Facet">
       <a:dk1>
-        <a:sysClr val="windowText" lastClr="000000"/>
+        <a:sysClr val="windowText" lastClr="FFFFFF"/>
       </a:dk1>
       <a:lt1>
-        <a:sysClr val="window" lastClr="FFFFFF"/>
+        <a:sysClr val="window" lastClr="000000"/>
       </a:lt1>
       <a:dk2>
         <a:srgbClr val="2C3C43"/>

</xml_diff>

<commit_message>
Made good combined plot
</commit_message>
<xml_diff>
--- a/GSRExploratory.pptx
+++ b/GSRExploratory.pptx
@@ -7,16 +7,12 @@
   <p:sldIdLst>
     <p:sldId id="256" r:id="rId2"/>
     <p:sldId id="259" r:id="rId3"/>
-    <p:sldId id="272" r:id="rId4"/>
-    <p:sldId id="277" r:id="rId5"/>
-    <p:sldId id="276" r:id="rId6"/>
-    <p:sldId id="274" r:id="rId7"/>
-    <p:sldId id="278" r:id="rId8"/>
-    <p:sldId id="275" r:id="rId9"/>
-    <p:sldId id="265" r:id="rId10"/>
-    <p:sldId id="273" r:id="rId11"/>
-    <p:sldId id="271" r:id="rId12"/>
-    <p:sldId id="260" r:id="rId13"/>
+    <p:sldId id="279" r:id="rId4"/>
+    <p:sldId id="278" r:id="rId5"/>
+    <p:sldId id="265" r:id="rId6"/>
+    <p:sldId id="273" r:id="rId7"/>
+    <p:sldId id="271" r:id="rId8"/>
+    <p:sldId id="260" r:id="rId9"/>
   </p:sldIdLst>
   <p:sldSz cx="12192000" cy="6858000"/>
   <p:notesSz cx="6858000" cy="9144000"/>
@@ -7287,303 +7283,6 @@
 </p:sld>
 </file>
 
-<file path=ppt/slides/slide10.xml><?xml version="1.0" encoding="utf-8"?>
-<p:sld xmlns:a="http://schemas.openxmlformats.org/drawingml/2006/main" xmlns:r="http://schemas.openxmlformats.org/officeDocument/2006/relationships" xmlns:p="http://schemas.openxmlformats.org/presentationml/2006/main">
-  <p:cSld>
-    <p:spTree>
-      <p:nvGrpSpPr>
-        <p:cNvPr id="1" name=""/>
-        <p:cNvGrpSpPr/>
-        <p:nvPr/>
-      </p:nvGrpSpPr>
-      <p:grpSpPr>
-        <a:xfrm>
-          <a:off x="0" y="0"/>
-          <a:ext cx="0" cy="0"/>
-          <a:chOff x="0" y="0"/>
-          <a:chExt cx="0" cy="0"/>
-        </a:xfrm>
-      </p:grpSpPr>
-      <p:sp>
-        <p:nvSpPr>
-          <p:cNvPr id="2" name="Title 1">
-            <a:extLst>
-              <a:ext uri="{FF2B5EF4-FFF2-40B4-BE49-F238E27FC236}">
-                <a16:creationId xmlns:a16="http://schemas.microsoft.com/office/drawing/2014/main" id="{DE04C1EC-3EDB-9E8F-837C-5C5ACDB195D8}"/>
-              </a:ext>
-            </a:extLst>
-          </p:cNvPr>
-          <p:cNvSpPr>
-            <a:spLocks noGrp="1"/>
-          </p:cNvSpPr>
-          <p:nvPr>
-            <p:ph type="title"/>
-          </p:nvPr>
-        </p:nvSpPr>
-        <p:spPr/>
-        <p:txBody>
-          <a:bodyPr/>
-          <a:lstStyle/>
-          <a:p>
-            <a:endParaRPr lang="en-US"/>
-          </a:p>
-        </p:txBody>
-      </p:sp>
-      <p:sp>
-        <p:nvSpPr>
-          <p:cNvPr id="3" name="Content Placeholder 2">
-            <a:extLst>
-              <a:ext uri="{FF2B5EF4-FFF2-40B4-BE49-F238E27FC236}">
-                <a16:creationId xmlns:a16="http://schemas.microsoft.com/office/drawing/2014/main" id="{15509778-4A84-BEDA-E5A1-4679D01280F6}"/>
-              </a:ext>
-            </a:extLst>
-          </p:cNvPr>
-          <p:cNvSpPr>
-            <a:spLocks noGrp="1"/>
-          </p:cNvSpPr>
-          <p:nvPr>
-            <p:ph idx="1"/>
-          </p:nvPr>
-        </p:nvSpPr>
-        <p:spPr/>
-        <p:txBody>
-          <a:bodyPr/>
-          <a:lstStyle/>
-          <a:p>
-            <a:endParaRPr lang="en-US"/>
-          </a:p>
-        </p:txBody>
-      </p:sp>
-      <p:pic>
-        <p:nvPicPr>
-          <p:cNvPr id="4" name="Picture 3" descr="A graph with a line and dots&#10;&#10;Description automatically generated">
-            <a:extLst>
-              <a:ext uri="{FF2B5EF4-FFF2-40B4-BE49-F238E27FC236}">
-                <a16:creationId xmlns:a16="http://schemas.microsoft.com/office/drawing/2014/main" id="{C85BC685-7127-87B2-0FE1-7421E3BE6049}"/>
-              </a:ext>
-            </a:extLst>
-          </p:cNvPr>
-          <p:cNvPicPr>
-            <a:picLocks noChangeAspect="1"/>
-          </p:cNvPicPr>
-          <p:nvPr/>
-        </p:nvPicPr>
-        <p:blipFill>
-          <a:blip r:embed="rId2">
-            <a:extLst>
-              <a:ext uri="{28A0092B-C50C-407E-A947-70E740481C1C}">
-                <a14:useLocalDpi xmlns:a14="http://schemas.microsoft.com/office/drawing/2010/main" val="0"/>
-              </a:ext>
-            </a:extLst>
-          </a:blip>
-          <a:stretch>
-            <a:fillRect/>
-          </a:stretch>
-        </p:blipFill>
-        <p:spPr>
-          <a:xfrm>
-            <a:off x="300981" y="87616"/>
-            <a:ext cx="8316486" cy="5658640"/>
-          </a:xfrm>
-          <a:prstGeom prst="rect">
-            <a:avLst/>
-          </a:prstGeom>
-        </p:spPr>
-      </p:pic>
-    </p:spTree>
-    <p:extLst>
-      <p:ext uri="{BB962C8B-B14F-4D97-AF65-F5344CB8AC3E}">
-        <p14:creationId xmlns:p14="http://schemas.microsoft.com/office/powerpoint/2010/main" val="1101351860"/>
-      </p:ext>
-    </p:extLst>
-  </p:cSld>
-  <p:clrMapOvr>
-    <a:masterClrMapping/>
-  </p:clrMapOvr>
-</p:sld>
-</file>
-
-<file path=ppt/slides/slide11.xml><?xml version="1.0" encoding="utf-8"?>
-<p:sld xmlns:a="http://schemas.openxmlformats.org/drawingml/2006/main" xmlns:r="http://schemas.openxmlformats.org/officeDocument/2006/relationships" xmlns:p="http://schemas.openxmlformats.org/presentationml/2006/main">
-  <p:cSld>
-    <p:spTree>
-      <p:nvGrpSpPr>
-        <p:cNvPr id="1" name=""/>
-        <p:cNvGrpSpPr/>
-        <p:nvPr/>
-      </p:nvGrpSpPr>
-      <p:grpSpPr>
-        <a:xfrm>
-          <a:off x="0" y="0"/>
-          <a:ext cx="0" cy="0"/>
-          <a:chOff x="0" y="0"/>
-          <a:chExt cx="0" cy="0"/>
-        </a:xfrm>
-      </p:grpSpPr>
-      <p:sp>
-        <p:nvSpPr>
-          <p:cNvPr id="2" name="Title 1">
-            <a:extLst>
-              <a:ext uri="{FF2B5EF4-FFF2-40B4-BE49-F238E27FC236}">
-                <a16:creationId xmlns:a16="http://schemas.microsoft.com/office/drawing/2014/main" id="{BA781410-7EA5-850C-2187-531EC075D04C}"/>
-              </a:ext>
-            </a:extLst>
-          </p:cNvPr>
-          <p:cNvSpPr>
-            <a:spLocks noGrp="1"/>
-          </p:cNvSpPr>
-          <p:nvPr>
-            <p:ph type="title"/>
-          </p:nvPr>
-        </p:nvSpPr>
-        <p:spPr/>
-        <p:txBody>
-          <a:bodyPr/>
-          <a:lstStyle/>
-          <a:p>
-            <a:endParaRPr lang="en-US"/>
-          </a:p>
-        </p:txBody>
-      </p:sp>
-      <p:pic>
-        <p:nvPicPr>
-          <p:cNvPr id="11" name="Content Placeholder 10" descr="A chart with text and numbers&#10;&#10;Description automatically generated">
-            <a:extLst>
-              <a:ext uri="{FF2B5EF4-FFF2-40B4-BE49-F238E27FC236}">
-                <a16:creationId xmlns:a16="http://schemas.microsoft.com/office/drawing/2014/main" id="{0F9B9D3A-C768-50CD-ABFB-A36F03099935}"/>
-              </a:ext>
-            </a:extLst>
-          </p:cNvPr>
-          <p:cNvPicPr>
-            <a:picLocks noGrp="1" noChangeAspect="1"/>
-          </p:cNvPicPr>
-          <p:nvPr>
-            <p:ph idx="1"/>
-          </p:nvPr>
-        </p:nvPicPr>
-        <p:blipFill>
-          <a:blip r:embed="rId2">
-            <a:extLst>
-              <a:ext uri="{28A0092B-C50C-407E-A947-70E740481C1C}">
-                <a14:useLocalDpi xmlns:a14="http://schemas.microsoft.com/office/drawing/2010/main" val="0"/>
-              </a:ext>
-            </a:extLst>
-          </a:blip>
-          <a:stretch>
-            <a:fillRect/>
-          </a:stretch>
-        </p:blipFill>
-        <p:spPr>
-          <a:xfrm>
-            <a:off x="294951" y="222060"/>
-            <a:ext cx="9505984" cy="6467989"/>
-          </a:xfrm>
-        </p:spPr>
-      </p:pic>
-    </p:spTree>
-    <p:extLst>
-      <p:ext uri="{BB962C8B-B14F-4D97-AF65-F5344CB8AC3E}">
-        <p14:creationId xmlns:p14="http://schemas.microsoft.com/office/powerpoint/2010/main" val="2354495484"/>
-      </p:ext>
-    </p:extLst>
-  </p:cSld>
-  <p:clrMapOvr>
-    <a:masterClrMapping/>
-  </p:clrMapOvr>
-</p:sld>
-</file>
-
-<file path=ppt/slides/slide12.xml><?xml version="1.0" encoding="utf-8"?>
-<p:sld xmlns:a="http://schemas.openxmlformats.org/drawingml/2006/main" xmlns:r="http://schemas.openxmlformats.org/officeDocument/2006/relationships" xmlns:p="http://schemas.openxmlformats.org/presentationml/2006/main">
-  <p:cSld>
-    <p:spTree>
-      <p:nvGrpSpPr>
-        <p:cNvPr id="1" name=""/>
-        <p:cNvGrpSpPr/>
-        <p:nvPr/>
-      </p:nvGrpSpPr>
-      <p:grpSpPr>
-        <a:xfrm>
-          <a:off x="0" y="0"/>
-          <a:ext cx="0" cy="0"/>
-          <a:chOff x="0" y="0"/>
-          <a:chExt cx="0" cy="0"/>
-        </a:xfrm>
-      </p:grpSpPr>
-      <p:sp>
-        <p:nvSpPr>
-          <p:cNvPr id="2" name="Title 1">
-            <a:extLst>
-              <a:ext uri="{FF2B5EF4-FFF2-40B4-BE49-F238E27FC236}">
-                <a16:creationId xmlns:a16="http://schemas.microsoft.com/office/drawing/2014/main" id="{3896878C-053E-531C-5E86-5976AF8E2F82}"/>
-              </a:ext>
-            </a:extLst>
-          </p:cNvPr>
-          <p:cNvSpPr>
-            <a:spLocks noGrp="1"/>
-          </p:cNvSpPr>
-          <p:nvPr>
-            <p:ph type="title"/>
-          </p:nvPr>
-        </p:nvSpPr>
-        <p:spPr/>
-        <p:txBody>
-          <a:bodyPr/>
-          <a:lstStyle/>
-          <a:p>
-            <a:endParaRPr lang="en-US"/>
-          </a:p>
-        </p:txBody>
-      </p:sp>
-      <p:pic>
-        <p:nvPicPr>
-          <p:cNvPr id="4" name="Picture 3" descr="A graph of a graph showing a line&#10;&#10;Description automatically generated">
-            <a:extLst>
-              <a:ext uri="{FF2B5EF4-FFF2-40B4-BE49-F238E27FC236}">
-                <a16:creationId xmlns:a16="http://schemas.microsoft.com/office/drawing/2014/main" id="{92763E31-E572-38DB-7355-57B92F4942AF}"/>
-              </a:ext>
-            </a:extLst>
-          </p:cNvPr>
-          <p:cNvPicPr>
-            <a:picLocks noChangeAspect="1"/>
-          </p:cNvPicPr>
-          <p:nvPr/>
-        </p:nvPicPr>
-        <p:blipFill>
-          <a:blip r:embed="rId2">
-            <a:extLst>
-              <a:ext uri="{28A0092B-C50C-407E-A947-70E740481C1C}">
-                <a14:useLocalDpi xmlns:a14="http://schemas.microsoft.com/office/drawing/2010/main" val="0"/>
-              </a:ext>
-            </a:extLst>
-          </a:blip>
-          <a:stretch>
-            <a:fillRect/>
-          </a:stretch>
-        </p:blipFill>
-        <p:spPr>
-          <a:xfrm>
-            <a:off x="182108" y="133336"/>
-            <a:ext cx="9746087" cy="6631358"/>
-          </a:xfrm>
-          <a:prstGeom prst="rect">
-            <a:avLst/>
-          </a:prstGeom>
-        </p:spPr>
-      </p:pic>
-    </p:spTree>
-    <p:extLst>
-      <p:ext uri="{BB962C8B-B14F-4D97-AF65-F5344CB8AC3E}">
-        <p14:creationId xmlns:p14="http://schemas.microsoft.com/office/powerpoint/2010/main" val="3569370174"/>
-      </p:ext>
-    </p:extLst>
-  </p:cSld>
-  <p:clrMapOvr>
-    <a:masterClrMapping/>
-  </p:clrMapOvr>
-</p:sld>
-</file>
-
 <file path=ppt/slides/slide2.xml><?xml version="1.0" encoding="utf-8"?>
 <p:sld xmlns:a="http://schemas.openxmlformats.org/drawingml/2006/main" xmlns:r="http://schemas.openxmlformats.org/officeDocument/2006/relationships" xmlns:p="http://schemas.openxmlformats.org/presentationml/2006/main">
   <p:cSld>
@@ -7707,7 +7406,7 @@
           <p:cNvPr id="2" name="Title 1">
             <a:extLst>
               <a:ext uri="{FF2B5EF4-FFF2-40B4-BE49-F238E27FC236}">
-                <a16:creationId xmlns:a16="http://schemas.microsoft.com/office/drawing/2014/main" id="{4302107A-3A46-5DAE-1592-ABFC4520F91F}"/>
+                <a16:creationId xmlns:a16="http://schemas.microsoft.com/office/drawing/2014/main" id="{8D0CBF5E-B549-19A4-B31F-39FD77059C8F}"/>
               </a:ext>
             </a:extLst>
           </p:cNvPr>
@@ -7729,10 +7428,10 @@
       </p:sp>
       <p:pic>
         <p:nvPicPr>
-          <p:cNvPr id="7" name="Content Placeholder 6" descr="A graph showing different colored lines&#10;&#10;Description automatically generated">
+          <p:cNvPr id="9" name="Content Placeholder 8" descr="A graph of different colored lines&#10;&#10;Description automatically generated">
             <a:extLst>
               <a:ext uri="{FF2B5EF4-FFF2-40B4-BE49-F238E27FC236}">
-                <a16:creationId xmlns:a16="http://schemas.microsoft.com/office/drawing/2014/main" id="{7170FF35-653D-0B0D-6727-5B51AFA295E3}"/>
+                <a16:creationId xmlns:a16="http://schemas.microsoft.com/office/drawing/2014/main" id="{6B945048-BC51-E122-3024-16D0BD141C07}"/>
               </a:ext>
             </a:extLst>
           </p:cNvPr>
@@ -7757,15 +7456,15 @@
         </p:blipFill>
         <p:spPr>
           <a:xfrm>
-            <a:off x="340538" y="238482"/>
-            <a:ext cx="10036963" cy="6143657"/>
+            <a:off x="89903" y="154235"/>
+            <a:ext cx="8991953" cy="6587855"/>
           </a:xfrm>
         </p:spPr>
       </p:pic>
     </p:spTree>
     <p:extLst>
       <p:ext uri="{BB962C8B-B14F-4D97-AF65-F5344CB8AC3E}">
-        <p14:creationId xmlns:p14="http://schemas.microsoft.com/office/powerpoint/2010/main" val="3633582858"/>
+        <p14:creationId xmlns:p14="http://schemas.microsoft.com/office/powerpoint/2010/main" val="3045049786"/>
       </p:ext>
     </p:extLst>
   </p:cSld>
@@ -7797,276 +7496,6 @@
           <p:cNvPr id="2" name="Title 1">
             <a:extLst>
               <a:ext uri="{FF2B5EF4-FFF2-40B4-BE49-F238E27FC236}">
-                <a16:creationId xmlns:a16="http://schemas.microsoft.com/office/drawing/2014/main" id="{29D96E52-8A24-3AF9-C46B-E9A3586B66D0}"/>
-              </a:ext>
-            </a:extLst>
-          </p:cNvPr>
-          <p:cNvSpPr>
-            <a:spLocks noGrp="1"/>
-          </p:cNvSpPr>
-          <p:nvPr>
-            <p:ph type="title"/>
-          </p:nvPr>
-        </p:nvSpPr>
-        <p:spPr/>
-        <p:txBody>
-          <a:bodyPr/>
-          <a:lstStyle/>
-          <a:p>
-            <a:endParaRPr lang="en-US"/>
-          </a:p>
-        </p:txBody>
-      </p:sp>
-      <p:pic>
-        <p:nvPicPr>
-          <p:cNvPr id="7" name="Content Placeholder 6" descr="A graph of different colored lines&#10;&#10;Description automatically generated">
-            <a:extLst>
-              <a:ext uri="{FF2B5EF4-FFF2-40B4-BE49-F238E27FC236}">
-                <a16:creationId xmlns:a16="http://schemas.microsoft.com/office/drawing/2014/main" id="{0DC48CD6-1C07-2AB0-57D4-566CA2ABCB19}"/>
-              </a:ext>
-            </a:extLst>
-          </p:cNvPr>
-          <p:cNvPicPr>
-            <a:picLocks noGrp="1" noChangeAspect="1"/>
-          </p:cNvPicPr>
-          <p:nvPr>
-            <p:ph idx="1"/>
-          </p:nvPr>
-        </p:nvPicPr>
-        <p:blipFill>
-          <a:blip r:embed="rId2">
-            <a:extLst>
-              <a:ext uri="{28A0092B-C50C-407E-A947-70E740481C1C}">
-                <a14:useLocalDpi xmlns:a14="http://schemas.microsoft.com/office/drawing/2010/main" val="0"/>
-              </a:ext>
-            </a:extLst>
-          </a:blip>
-          <a:stretch>
-            <a:fillRect/>
-          </a:stretch>
-        </p:blipFill>
-        <p:spPr>
-          <a:xfrm>
-            <a:off x="269950" y="78669"/>
-            <a:ext cx="10714448" cy="6555595"/>
-          </a:xfrm>
-        </p:spPr>
-      </p:pic>
-    </p:spTree>
-    <p:extLst>
-      <p:ext uri="{BB962C8B-B14F-4D97-AF65-F5344CB8AC3E}">
-        <p14:creationId xmlns:p14="http://schemas.microsoft.com/office/powerpoint/2010/main" val="2159866637"/>
-      </p:ext>
-    </p:extLst>
-  </p:cSld>
-  <p:clrMapOvr>
-    <a:masterClrMapping/>
-  </p:clrMapOvr>
-</p:sld>
-</file>
-
-<file path=ppt/slides/slide5.xml><?xml version="1.0" encoding="utf-8"?>
-<p:sld xmlns:a="http://schemas.openxmlformats.org/drawingml/2006/main" xmlns:r="http://schemas.openxmlformats.org/officeDocument/2006/relationships" xmlns:p="http://schemas.openxmlformats.org/presentationml/2006/main">
-  <p:cSld>
-    <p:spTree>
-      <p:nvGrpSpPr>
-        <p:cNvPr id="1" name=""/>
-        <p:cNvGrpSpPr/>
-        <p:nvPr/>
-      </p:nvGrpSpPr>
-      <p:grpSpPr>
-        <a:xfrm>
-          <a:off x="0" y="0"/>
-          <a:ext cx="0" cy="0"/>
-          <a:chOff x="0" y="0"/>
-          <a:chExt cx="0" cy="0"/>
-        </a:xfrm>
-      </p:grpSpPr>
-      <p:sp>
-        <p:nvSpPr>
-          <p:cNvPr id="2" name="Title 1">
-            <a:extLst>
-              <a:ext uri="{FF2B5EF4-FFF2-40B4-BE49-F238E27FC236}">
-                <a16:creationId xmlns:a16="http://schemas.microsoft.com/office/drawing/2014/main" id="{6CF6CB8D-7EE5-E221-1DF5-31BE0D56F9A1}"/>
-              </a:ext>
-            </a:extLst>
-          </p:cNvPr>
-          <p:cNvSpPr>
-            <a:spLocks noGrp="1"/>
-          </p:cNvSpPr>
-          <p:nvPr>
-            <p:ph type="title"/>
-          </p:nvPr>
-        </p:nvSpPr>
-        <p:spPr/>
-        <p:txBody>
-          <a:bodyPr/>
-          <a:lstStyle/>
-          <a:p>
-            <a:endParaRPr lang="en-US"/>
-          </a:p>
-        </p:txBody>
-      </p:sp>
-      <p:pic>
-        <p:nvPicPr>
-          <p:cNvPr id="5" name="Content Placeholder 4" descr="A graph of different colored lines&#10;&#10;Description automatically generated">
-            <a:extLst>
-              <a:ext uri="{FF2B5EF4-FFF2-40B4-BE49-F238E27FC236}">
-                <a16:creationId xmlns:a16="http://schemas.microsoft.com/office/drawing/2014/main" id="{C2752F19-5C9E-2563-6C64-8EB7735F3D81}"/>
-              </a:ext>
-            </a:extLst>
-          </p:cNvPr>
-          <p:cNvPicPr>
-            <a:picLocks noGrp="1" noChangeAspect="1"/>
-          </p:cNvPicPr>
-          <p:nvPr>
-            <p:ph idx="1"/>
-          </p:nvPr>
-        </p:nvPicPr>
-        <p:blipFill>
-          <a:blip r:embed="rId2">
-            <a:extLst>
-              <a:ext uri="{28A0092B-C50C-407E-A947-70E740481C1C}">
-                <a14:useLocalDpi xmlns:a14="http://schemas.microsoft.com/office/drawing/2010/main" val="0"/>
-              </a:ext>
-            </a:extLst>
-          </a:blip>
-          <a:stretch>
-            <a:fillRect/>
-          </a:stretch>
-        </p:blipFill>
-        <p:spPr>
-          <a:xfrm>
-            <a:off x="397268" y="609600"/>
-            <a:ext cx="9670291" cy="5919216"/>
-          </a:xfrm>
-        </p:spPr>
-      </p:pic>
-    </p:spTree>
-    <p:extLst>
-      <p:ext uri="{BB962C8B-B14F-4D97-AF65-F5344CB8AC3E}">
-        <p14:creationId xmlns:p14="http://schemas.microsoft.com/office/powerpoint/2010/main" val="1692230384"/>
-      </p:ext>
-    </p:extLst>
-  </p:cSld>
-  <p:clrMapOvr>
-    <a:masterClrMapping/>
-  </p:clrMapOvr>
-</p:sld>
-</file>
-
-<file path=ppt/slides/slide6.xml><?xml version="1.0" encoding="utf-8"?>
-<p:sld xmlns:a="http://schemas.openxmlformats.org/drawingml/2006/main" xmlns:r="http://schemas.openxmlformats.org/officeDocument/2006/relationships" xmlns:p="http://schemas.openxmlformats.org/presentationml/2006/main">
-  <p:cSld>
-    <p:spTree>
-      <p:nvGrpSpPr>
-        <p:cNvPr id="1" name=""/>
-        <p:cNvGrpSpPr/>
-        <p:nvPr/>
-      </p:nvGrpSpPr>
-      <p:grpSpPr>
-        <a:xfrm>
-          <a:off x="0" y="0"/>
-          <a:ext cx="0" cy="0"/>
-          <a:chOff x="0" y="0"/>
-          <a:chExt cx="0" cy="0"/>
-        </a:xfrm>
-      </p:grpSpPr>
-      <p:sp>
-        <p:nvSpPr>
-          <p:cNvPr id="2" name="Title 1">
-            <a:extLst>
-              <a:ext uri="{FF2B5EF4-FFF2-40B4-BE49-F238E27FC236}">
-                <a16:creationId xmlns:a16="http://schemas.microsoft.com/office/drawing/2014/main" id="{22E1B499-142B-98B8-FE4F-43A8004A88B8}"/>
-              </a:ext>
-            </a:extLst>
-          </p:cNvPr>
-          <p:cNvSpPr>
-            <a:spLocks noGrp="1"/>
-          </p:cNvSpPr>
-          <p:nvPr>
-            <p:ph type="title"/>
-          </p:nvPr>
-        </p:nvSpPr>
-        <p:spPr/>
-        <p:txBody>
-          <a:bodyPr/>
-          <a:lstStyle/>
-          <a:p>
-            <a:endParaRPr lang="en-US"/>
-          </a:p>
-        </p:txBody>
-      </p:sp>
-      <p:pic>
-        <p:nvPicPr>
-          <p:cNvPr id="10" name="Content Placeholder 9" descr="A graph of different colored lines&#10;&#10;Description automatically generated">
-            <a:extLst>
-              <a:ext uri="{FF2B5EF4-FFF2-40B4-BE49-F238E27FC236}">
-                <a16:creationId xmlns:a16="http://schemas.microsoft.com/office/drawing/2014/main" id="{E7046B8C-D7F2-691D-ACCC-5D762452374F}"/>
-              </a:ext>
-            </a:extLst>
-          </p:cNvPr>
-          <p:cNvPicPr>
-            <a:picLocks noGrp="1" noChangeAspect="1"/>
-          </p:cNvPicPr>
-          <p:nvPr>
-            <p:ph idx="1"/>
-          </p:nvPr>
-        </p:nvPicPr>
-        <p:blipFill>
-          <a:blip r:embed="rId2">
-            <a:extLst>
-              <a:ext uri="{28A0092B-C50C-407E-A947-70E740481C1C}">
-                <a14:useLocalDpi xmlns:a14="http://schemas.microsoft.com/office/drawing/2010/main" val="0"/>
-              </a:ext>
-            </a:extLst>
-          </a:blip>
-          <a:stretch>
-            <a:fillRect/>
-          </a:stretch>
-        </p:blipFill>
-        <p:spPr>
-          <a:xfrm>
-            <a:off x="360692" y="441516"/>
-            <a:ext cx="10109217" cy="6187884"/>
-          </a:xfrm>
-        </p:spPr>
-      </p:pic>
-    </p:spTree>
-    <p:extLst>
-      <p:ext uri="{BB962C8B-B14F-4D97-AF65-F5344CB8AC3E}">
-        <p14:creationId xmlns:p14="http://schemas.microsoft.com/office/powerpoint/2010/main" val="3591010953"/>
-      </p:ext>
-    </p:extLst>
-  </p:cSld>
-  <p:clrMapOvr>
-    <a:masterClrMapping/>
-  </p:clrMapOvr>
-</p:sld>
-</file>
-
-<file path=ppt/slides/slide7.xml><?xml version="1.0" encoding="utf-8"?>
-<p:sld xmlns:a="http://schemas.openxmlformats.org/drawingml/2006/main" xmlns:r="http://schemas.openxmlformats.org/officeDocument/2006/relationships" xmlns:p="http://schemas.openxmlformats.org/presentationml/2006/main">
-  <p:cSld>
-    <p:spTree>
-      <p:nvGrpSpPr>
-        <p:cNvPr id="1" name=""/>
-        <p:cNvGrpSpPr/>
-        <p:nvPr/>
-      </p:nvGrpSpPr>
-      <p:grpSpPr>
-        <a:xfrm>
-          <a:off x="0" y="0"/>
-          <a:ext cx="0" cy="0"/>
-          <a:chOff x="0" y="0"/>
-          <a:chExt cx="0" cy="0"/>
-        </a:xfrm>
-      </p:grpSpPr>
-      <p:sp>
-        <p:nvSpPr>
-          <p:cNvPr id="2" name="Title 1">
-            <a:extLst>
-              <a:ext uri="{FF2B5EF4-FFF2-40B4-BE49-F238E27FC236}">
                 <a16:creationId xmlns:a16="http://schemas.microsoft.com/office/drawing/2014/main" id="{8BB3DD29-ABE6-8A5B-E160-F583233DE005}"/>
               </a:ext>
             </a:extLst>
@@ -8170,123 +7599,7 @@
 </p:sld>
 </file>
 
-<file path=ppt/slides/slide8.xml><?xml version="1.0" encoding="utf-8"?>
-<p:sld xmlns:a="http://schemas.openxmlformats.org/drawingml/2006/main" xmlns:r="http://schemas.openxmlformats.org/officeDocument/2006/relationships" xmlns:p="http://schemas.openxmlformats.org/presentationml/2006/main">
-  <p:cSld>
-    <p:spTree>
-      <p:nvGrpSpPr>
-        <p:cNvPr id="1" name=""/>
-        <p:cNvGrpSpPr/>
-        <p:nvPr/>
-      </p:nvGrpSpPr>
-      <p:grpSpPr>
-        <a:xfrm>
-          <a:off x="0" y="0"/>
-          <a:ext cx="0" cy="0"/>
-          <a:chOff x="0" y="0"/>
-          <a:chExt cx="0" cy="0"/>
-        </a:xfrm>
-      </p:grpSpPr>
-      <p:sp>
-        <p:nvSpPr>
-          <p:cNvPr id="2" name="Title 1">
-            <a:extLst>
-              <a:ext uri="{FF2B5EF4-FFF2-40B4-BE49-F238E27FC236}">
-                <a16:creationId xmlns:a16="http://schemas.microsoft.com/office/drawing/2014/main" id="{0AD2B499-B286-64E7-20F9-9E43648984DB}"/>
-              </a:ext>
-            </a:extLst>
-          </p:cNvPr>
-          <p:cNvSpPr>
-            <a:spLocks noGrp="1"/>
-          </p:cNvSpPr>
-          <p:nvPr>
-            <p:ph type="title"/>
-          </p:nvPr>
-        </p:nvSpPr>
-        <p:spPr/>
-        <p:txBody>
-          <a:bodyPr/>
-          <a:lstStyle/>
-          <a:p>
-            <a:endParaRPr lang="en-US"/>
-          </a:p>
-        </p:txBody>
-      </p:sp>
-      <p:sp>
-        <p:nvSpPr>
-          <p:cNvPr id="3" name="Content Placeholder 2">
-            <a:extLst>
-              <a:ext uri="{FF2B5EF4-FFF2-40B4-BE49-F238E27FC236}">
-                <a16:creationId xmlns:a16="http://schemas.microsoft.com/office/drawing/2014/main" id="{8211BC14-5B15-8A43-F78D-9A0D2AEB0750}"/>
-              </a:ext>
-            </a:extLst>
-          </p:cNvPr>
-          <p:cNvSpPr>
-            <a:spLocks noGrp="1"/>
-          </p:cNvSpPr>
-          <p:nvPr>
-            <p:ph idx="1"/>
-          </p:nvPr>
-        </p:nvSpPr>
-        <p:spPr/>
-        <p:txBody>
-          <a:bodyPr/>
-          <a:lstStyle/>
-          <a:p>
-            <a:endParaRPr lang="en-US"/>
-          </a:p>
-        </p:txBody>
-      </p:sp>
-      <p:pic>
-        <p:nvPicPr>
-          <p:cNvPr id="4" name="Picture 3" descr="A graph showing different colored lines&#10;&#10;Description automatically generated">
-            <a:extLst>
-              <a:ext uri="{FF2B5EF4-FFF2-40B4-BE49-F238E27FC236}">
-                <a16:creationId xmlns:a16="http://schemas.microsoft.com/office/drawing/2014/main" id="{BD47BA79-A7FA-CC7D-2C21-93B130DACA70}"/>
-              </a:ext>
-            </a:extLst>
-          </p:cNvPr>
-          <p:cNvPicPr>
-            <a:picLocks noChangeAspect="1"/>
-          </p:cNvPicPr>
-          <p:nvPr/>
-        </p:nvPicPr>
-        <p:blipFill>
-          <a:blip r:embed="rId2">
-            <a:extLst>
-              <a:ext uri="{28A0092B-C50C-407E-A947-70E740481C1C}">
-                <a14:useLocalDpi xmlns:a14="http://schemas.microsoft.com/office/drawing/2010/main" val="0"/>
-              </a:ext>
-            </a:extLst>
-          </a:blip>
-          <a:stretch>
-            <a:fillRect/>
-          </a:stretch>
-        </p:blipFill>
-        <p:spPr>
-          <a:xfrm>
-            <a:off x="393870" y="490127"/>
-            <a:ext cx="9602540" cy="5877745"/>
-          </a:xfrm>
-          <a:prstGeom prst="rect">
-            <a:avLst/>
-          </a:prstGeom>
-        </p:spPr>
-      </p:pic>
-    </p:spTree>
-    <p:extLst>
-      <p:ext uri="{BB962C8B-B14F-4D97-AF65-F5344CB8AC3E}">
-        <p14:creationId xmlns:p14="http://schemas.microsoft.com/office/powerpoint/2010/main" val="3939932716"/>
-      </p:ext>
-    </p:extLst>
-  </p:cSld>
-  <p:clrMapOvr>
-    <a:masterClrMapping/>
-  </p:clrMapOvr>
-</p:sld>
-</file>
-
-<file path=ppt/slides/slide9.xml><?xml version="1.0" encoding="utf-8"?>
+<file path=ppt/slides/slide5.xml><?xml version="1.0" encoding="utf-8"?>
 <p:sld xmlns:a="http://schemas.openxmlformats.org/drawingml/2006/main" xmlns:r="http://schemas.openxmlformats.org/officeDocument/2006/relationships" xmlns:p="http://schemas.openxmlformats.org/presentationml/2006/main">
   <p:cSld>
     <p:spTree>
@@ -8342,6 +7655,303 @@
     <p:extLst>
       <p:ext uri="{BB962C8B-B14F-4D97-AF65-F5344CB8AC3E}">
         <p14:creationId xmlns:p14="http://schemas.microsoft.com/office/powerpoint/2010/main" val="3440815627"/>
+      </p:ext>
+    </p:extLst>
+  </p:cSld>
+  <p:clrMapOvr>
+    <a:masterClrMapping/>
+  </p:clrMapOvr>
+</p:sld>
+</file>
+
+<file path=ppt/slides/slide6.xml><?xml version="1.0" encoding="utf-8"?>
+<p:sld xmlns:a="http://schemas.openxmlformats.org/drawingml/2006/main" xmlns:r="http://schemas.openxmlformats.org/officeDocument/2006/relationships" xmlns:p="http://schemas.openxmlformats.org/presentationml/2006/main">
+  <p:cSld>
+    <p:spTree>
+      <p:nvGrpSpPr>
+        <p:cNvPr id="1" name=""/>
+        <p:cNvGrpSpPr/>
+        <p:nvPr/>
+      </p:nvGrpSpPr>
+      <p:grpSpPr>
+        <a:xfrm>
+          <a:off x="0" y="0"/>
+          <a:ext cx="0" cy="0"/>
+          <a:chOff x="0" y="0"/>
+          <a:chExt cx="0" cy="0"/>
+        </a:xfrm>
+      </p:grpSpPr>
+      <p:sp>
+        <p:nvSpPr>
+          <p:cNvPr id="2" name="Title 1">
+            <a:extLst>
+              <a:ext uri="{FF2B5EF4-FFF2-40B4-BE49-F238E27FC236}">
+                <a16:creationId xmlns:a16="http://schemas.microsoft.com/office/drawing/2014/main" id="{DE04C1EC-3EDB-9E8F-837C-5C5ACDB195D8}"/>
+              </a:ext>
+            </a:extLst>
+          </p:cNvPr>
+          <p:cNvSpPr>
+            <a:spLocks noGrp="1"/>
+          </p:cNvSpPr>
+          <p:nvPr>
+            <p:ph type="title"/>
+          </p:nvPr>
+        </p:nvSpPr>
+        <p:spPr/>
+        <p:txBody>
+          <a:bodyPr/>
+          <a:lstStyle/>
+          <a:p>
+            <a:endParaRPr lang="en-US"/>
+          </a:p>
+        </p:txBody>
+      </p:sp>
+      <p:sp>
+        <p:nvSpPr>
+          <p:cNvPr id="3" name="Content Placeholder 2">
+            <a:extLst>
+              <a:ext uri="{FF2B5EF4-FFF2-40B4-BE49-F238E27FC236}">
+                <a16:creationId xmlns:a16="http://schemas.microsoft.com/office/drawing/2014/main" id="{15509778-4A84-BEDA-E5A1-4679D01280F6}"/>
+              </a:ext>
+            </a:extLst>
+          </p:cNvPr>
+          <p:cNvSpPr>
+            <a:spLocks noGrp="1"/>
+          </p:cNvSpPr>
+          <p:nvPr>
+            <p:ph idx="1"/>
+          </p:nvPr>
+        </p:nvSpPr>
+        <p:spPr/>
+        <p:txBody>
+          <a:bodyPr/>
+          <a:lstStyle/>
+          <a:p>
+            <a:endParaRPr lang="en-US"/>
+          </a:p>
+        </p:txBody>
+      </p:sp>
+      <p:pic>
+        <p:nvPicPr>
+          <p:cNvPr id="4" name="Picture 3" descr="A graph with a line and dots&#10;&#10;Description automatically generated">
+            <a:extLst>
+              <a:ext uri="{FF2B5EF4-FFF2-40B4-BE49-F238E27FC236}">
+                <a16:creationId xmlns:a16="http://schemas.microsoft.com/office/drawing/2014/main" id="{C85BC685-7127-87B2-0FE1-7421E3BE6049}"/>
+              </a:ext>
+            </a:extLst>
+          </p:cNvPr>
+          <p:cNvPicPr>
+            <a:picLocks noChangeAspect="1"/>
+          </p:cNvPicPr>
+          <p:nvPr/>
+        </p:nvPicPr>
+        <p:blipFill>
+          <a:blip r:embed="rId2">
+            <a:extLst>
+              <a:ext uri="{28A0092B-C50C-407E-A947-70E740481C1C}">
+                <a14:useLocalDpi xmlns:a14="http://schemas.microsoft.com/office/drawing/2010/main" val="0"/>
+              </a:ext>
+            </a:extLst>
+          </a:blip>
+          <a:stretch>
+            <a:fillRect/>
+          </a:stretch>
+        </p:blipFill>
+        <p:spPr>
+          <a:xfrm>
+            <a:off x="300981" y="87616"/>
+            <a:ext cx="8316486" cy="5658640"/>
+          </a:xfrm>
+          <a:prstGeom prst="rect">
+            <a:avLst/>
+          </a:prstGeom>
+        </p:spPr>
+      </p:pic>
+    </p:spTree>
+    <p:extLst>
+      <p:ext uri="{BB962C8B-B14F-4D97-AF65-F5344CB8AC3E}">
+        <p14:creationId xmlns:p14="http://schemas.microsoft.com/office/powerpoint/2010/main" val="1101351860"/>
+      </p:ext>
+    </p:extLst>
+  </p:cSld>
+  <p:clrMapOvr>
+    <a:masterClrMapping/>
+  </p:clrMapOvr>
+</p:sld>
+</file>
+
+<file path=ppt/slides/slide7.xml><?xml version="1.0" encoding="utf-8"?>
+<p:sld xmlns:a="http://schemas.openxmlformats.org/drawingml/2006/main" xmlns:r="http://schemas.openxmlformats.org/officeDocument/2006/relationships" xmlns:p="http://schemas.openxmlformats.org/presentationml/2006/main">
+  <p:cSld>
+    <p:spTree>
+      <p:nvGrpSpPr>
+        <p:cNvPr id="1" name=""/>
+        <p:cNvGrpSpPr/>
+        <p:nvPr/>
+      </p:nvGrpSpPr>
+      <p:grpSpPr>
+        <a:xfrm>
+          <a:off x="0" y="0"/>
+          <a:ext cx="0" cy="0"/>
+          <a:chOff x="0" y="0"/>
+          <a:chExt cx="0" cy="0"/>
+        </a:xfrm>
+      </p:grpSpPr>
+      <p:sp>
+        <p:nvSpPr>
+          <p:cNvPr id="2" name="Title 1">
+            <a:extLst>
+              <a:ext uri="{FF2B5EF4-FFF2-40B4-BE49-F238E27FC236}">
+                <a16:creationId xmlns:a16="http://schemas.microsoft.com/office/drawing/2014/main" id="{BA781410-7EA5-850C-2187-531EC075D04C}"/>
+              </a:ext>
+            </a:extLst>
+          </p:cNvPr>
+          <p:cNvSpPr>
+            <a:spLocks noGrp="1"/>
+          </p:cNvSpPr>
+          <p:nvPr>
+            <p:ph type="title"/>
+          </p:nvPr>
+        </p:nvSpPr>
+        <p:spPr/>
+        <p:txBody>
+          <a:bodyPr/>
+          <a:lstStyle/>
+          <a:p>
+            <a:endParaRPr lang="en-US"/>
+          </a:p>
+        </p:txBody>
+      </p:sp>
+      <p:pic>
+        <p:nvPicPr>
+          <p:cNvPr id="11" name="Content Placeholder 10" descr="A chart with text and numbers&#10;&#10;Description automatically generated">
+            <a:extLst>
+              <a:ext uri="{FF2B5EF4-FFF2-40B4-BE49-F238E27FC236}">
+                <a16:creationId xmlns:a16="http://schemas.microsoft.com/office/drawing/2014/main" id="{0F9B9D3A-C768-50CD-ABFB-A36F03099935}"/>
+              </a:ext>
+            </a:extLst>
+          </p:cNvPr>
+          <p:cNvPicPr>
+            <a:picLocks noGrp="1" noChangeAspect="1"/>
+          </p:cNvPicPr>
+          <p:nvPr>
+            <p:ph idx="1"/>
+          </p:nvPr>
+        </p:nvPicPr>
+        <p:blipFill>
+          <a:blip r:embed="rId2">
+            <a:extLst>
+              <a:ext uri="{28A0092B-C50C-407E-A947-70E740481C1C}">
+                <a14:useLocalDpi xmlns:a14="http://schemas.microsoft.com/office/drawing/2010/main" val="0"/>
+              </a:ext>
+            </a:extLst>
+          </a:blip>
+          <a:stretch>
+            <a:fillRect/>
+          </a:stretch>
+        </p:blipFill>
+        <p:spPr>
+          <a:xfrm>
+            <a:off x="294951" y="222060"/>
+            <a:ext cx="9505984" cy="6467989"/>
+          </a:xfrm>
+        </p:spPr>
+      </p:pic>
+    </p:spTree>
+    <p:extLst>
+      <p:ext uri="{BB962C8B-B14F-4D97-AF65-F5344CB8AC3E}">
+        <p14:creationId xmlns:p14="http://schemas.microsoft.com/office/powerpoint/2010/main" val="2354495484"/>
+      </p:ext>
+    </p:extLst>
+  </p:cSld>
+  <p:clrMapOvr>
+    <a:masterClrMapping/>
+  </p:clrMapOvr>
+</p:sld>
+</file>
+
+<file path=ppt/slides/slide8.xml><?xml version="1.0" encoding="utf-8"?>
+<p:sld xmlns:a="http://schemas.openxmlformats.org/drawingml/2006/main" xmlns:r="http://schemas.openxmlformats.org/officeDocument/2006/relationships" xmlns:p="http://schemas.openxmlformats.org/presentationml/2006/main">
+  <p:cSld>
+    <p:spTree>
+      <p:nvGrpSpPr>
+        <p:cNvPr id="1" name=""/>
+        <p:cNvGrpSpPr/>
+        <p:nvPr/>
+      </p:nvGrpSpPr>
+      <p:grpSpPr>
+        <a:xfrm>
+          <a:off x="0" y="0"/>
+          <a:ext cx="0" cy="0"/>
+          <a:chOff x="0" y="0"/>
+          <a:chExt cx="0" cy="0"/>
+        </a:xfrm>
+      </p:grpSpPr>
+      <p:sp>
+        <p:nvSpPr>
+          <p:cNvPr id="2" name="Title 1">
+            <a:extLst>
+              <a:ext uri="{FF2B5EF4-FFF2-40B4-BE49-F238E27FC236}">
+                <a16:creationId xmlns:a16="http://schemas.microsoft.com/office/drawing/2014/main" id="{3896878C-053E-531C-5E86-5976AF8E2F82}"/>
+              </a:ext>
+            </a:extLst>
+          </p:cNvPr>
+          <p:cNvSpPr>
+            <a:spLocks noGrp="1"/>
+          </p:cNvSpPr>
+          <p:nvPr>
+            <p:ph type="title"/>
+          </p:nvPr>
+        </p:nvSpPr>
+        <p:spPr/>
+        <p:txBody>
+          <a:bodyPr/>
+          <a:lstStyle/>
+          <a:p>
+            <a:endParaRPr lang="en-US"/>
+          </a:p>
+        </p:txBody>
+      </p:sp>
+      <p:pic>
+        <p:nvPicPr>
+          <p:cNvPr id="4" name="Picture 3" descr="A graph of a graph showing a line&#10;&#10;Description automatically generated">
+            <a:extLst>
+              <a:ext uri="{FF2B5EF4-FFF2-40B4-BE49-F238E27FC236}">
+                <a16:creationId xmlns:a16="http://schemas.microsoft.com/office/drawing/2014/main" id="{92763E31-E572-38DB-7355-57B92F4942AF}"/>
+              </a:ext>
+            </a:extLst>
+          </p:cNvPr>
+          <p:cNvPicPr>
+            <a:picLocks noChangeAspect="1"/>
+          </p:cNvPicPr>
+          <p:nvPr/>
+        </p:nvPicPr>
+        <p:blipFill>
+          <a:blip r:embed="rId2">
+            <a:extLst>
+              <a:ext uri="{28A0092B-C50C-407E-A947-70E740481C1C}">
+                <a14:useLocalDpi xmlns:a14="http://schemas.microsoft.com/office/drawing/2010/main" val="0"/>
+              </a:ext>
+            </a:extLst>
+          </a:blip>
+          <a:stretch>
+            <a:fillRect/>
+          </a:stretch>
+        </p:blipFill>
+        <p:spPr>
+          <a:xfrm>
+            <a:off x="182108" y="133336"/>
+            <a:ext cx="9746087" cy="6631358"/>
+          </a:xfrm>
+          <a:prstGeom prst="rect">
+            <a:avLst/>
+          </a:prstGeom>
+        </p:spPr>
+      </p:pic>
+    </p:spTree>
+    <p:extLst>
+      <p:ext uri="{BB962C8B-B14F-4D97-AF65-F5344CB8AC3E}">
+        <p14:creationId xmlns:p14="http://schemas.microsoft.com/office/powerpoint/2010/main" val="3569370174"/>
       </p:ext>
     </p:extLst>
   </p:cSld>

</xml_diff>

<commit_message>
Add lifespan over time graph and code
</commit_message>
<xml_diff>
--- a/GSRExploratory.pptx
+++ b/GSRExploratory.pptx
@@ -10,10 +10,11 @@
     <p:sldId id="279" r:id="rId4"/>
     <p:sldId id="278" r:id="rId5"/>
     <p:sldId id="280" r:id="rId6"/>
-    <p:sldId id="265" r:id="rId7"/>
-    <p:sldId id="273" r:id="rId8"/>
-    <p:sldId id="271" r:id="rId9"/>
-    <p:sldId id="260" r:id="rId10"/>
+    <p:sldId id="281" r:id="rId7"/>
+    <p:sldId id="265" r:id="rId8"/>
+    <p:sldId id="273" r:id="rId9"/>
+    <p:sldId id="271" r:id="rId10"/>
+    <p:sldId id="260" r:id="rId11"/>
   </p:sldIdLst>
   <p:sldSz cx="12192000" cy="6858000"/>
   <p:notesSz cx="6858000" cy="9144000"/>
@@ -872,7 +873,7 @@
           <a:p>
             <a:fld id="{F81EA58A-236B-4351-AA1B-97F3A2A984DC}" type="datetimeFigureOut">
               <a:rPr lang="en-US" smtClean="0"/>
-              <a:t>8/10/2023</a:t>
+              <a:t>8/11/2023</a:t>
             </a:fld>
             <a:endParaRPr lang="en-US"/>
           </a:p>
@@ -1122,7 +1123,7 @@
           <a:p>
             <a:fld id="{F81EA58A-236B-4351-AA1B-97F3A2A984DC}" type="datetimeFigureOut">
               <a:rPr lang="en-US" smtClean="0"/>
-              <a:t>8/10/2023</a:t>
+              <a:t>8/11/2023</a:t>
             </a:fld>
             <a:endParaRPr lang="en-US"/>
           </a:p>
@@ -1435,7 +1436,7 @@
           <a:p>
             <a:fld id="{F81EA58A-236B-4351-AA1B-97F3A2A984DC}" type="datetimeFigureOut">
               <a:rPr lang="en-US" smtClean="0"/>
-              <a:t>8/10/2023</a:t>
+              <a:t>8/11/2023</a:t>
             </a:fld>
             <a:endParaRPr lang="en-US"/>
           </a:p>
@@ -1767,7 +1768,7 @@
           <a:p>
             <a:fld id="{F81EA58A-236B-4351-AA1B-97F3A2A984DC}" type="datetimeFigureOut">
               <a:rPr lang="en-US" smtClean="0"/>
-              <a:t>8/10/2023</a:t>
+              <a:t>8/11/2023</a:t>
             </a:fld>
             <a:endParaRPr lang="en-US"/>
           </a:p>
@@ -2080,7 +2081,7 @@
           <a:p>
             <a:fld id="{F81EA58A-236B-4351-AA1B-97F3A2A984DC}" type="datetimeFigureOut">
               <a:rPr lang="en-US" smtClean="0"/>
-              <a:t>8/10/2023</a:t>
+              <a:t>8/11/2023</a:t>
             </a:fld>
             <a:endParaRPr lang="en-US"/>
           </a:p>
@@ -2472,7 +2473,7 @@
           <a:p>
             <a:fld id="{F81EA58A-236B-4351-AA1B-97F3A2A984DC}" type="datetimeFigureOut">
               <a:rPr lang="en-US" smtClean="0"/>
-              <a:t>8/10/2023</a:t>
+              <a:t>8/11/2023</a:t>
             </a:fld>
             <a:endParaRPr lang="en-US"/>
           </a:p>
@@ -2640,7 +2641,7 @@
           <a:p>
             <a:fld id="{F81EA58A-236B-4351-AA1B-97F3A2A984DC}" type="datetimeFigureOut">
               <a:rPr lang="en-US" smtClean="0"/>
-              <a:t>8/10/2023</a:t>
+              <a:t>8/11/2023</a:t>
             </a:fld>
             <a:endParaRPr lang="en-US"/>
           </a:p>
@@ -2818,7 +2819,7 @@
           <a:p>
             <a:fld id="{F81EA58A-236B-4351-AA1B-97F3A2A984DC}" type="datetimeFigureOut">
               <a:rPr lang="en-US" smtClean="0"/>
-              <a:t>8/10/2023</a:t>
+              <a:t>8/11/2023</a:t>
             </a:fld>
             <a:endParaRPr lang="en-US"/>
           </a:p>
@@ -2986,7 +2987,7 @@
           <a:p>
             <a:fld id="{F81EA58A-236B-4351-AA1B-97F3A2A984DC}" type="datetimeFigureOut">
               <a:rPr lang="en-US" smtClean="0"/>
-              <a:t>8/10/2023</a:t>
+              <a:t>8/11/2023</a:t>
             </a:fld>
             <a:endParaRPr lang="en-US"/>
           </a:p>
@@ -3232,7 +3233,7 @@
           <a:p>
             <a:fld id="{F81EA58A-236B-4351-AA1B-97F3A2A984DC}" type="datetimeFigureOut">
               <a:rPr lang="en-US" smtClean="0"/>
-              <a:t>8/10/2023</a:t>
+              <a:t>8/11/2023</a:t>
             </a:fld>
             <a:endParaRPr lang="en-US"/>
           </a:p>
@@ -3461,7 +3462,7 @@
           <a:p>
             <a:fld id="{F81EA58A-236B-4351-AA1B-97F3A2A984DC}" type="datetimeFigureOut">
               <a:rPr lang="en-US" smtClean="0"/>
-              <a:t>8/10/2023</a:t>
+              <a:t>8/11/2023</a:t>
             </a:fld>
             <a:endParaRPr lang="en-US"/>
           </a:p>
@@ -3832,7 +3833,7 @@
           <a:p>
             <a:fld id="{F81EA58A-236B-4351-AA1B-97F3A2A984DC}" type="datetimeFigureOut">
               <a:rPr lang="en-US" smtClean="0"/>
-              <a:t>8/10/2023</a:t>
+              <a:t>8/11/2023</a:t>
             </a:fld>
             <a:endParaRPr lang="en-US"/>
           </a:p>
@@ -3954,7 +3955,7 @@
           <a:p>
             <a:fld id="{F81EA58A-236B-4351-AA1B-97F3A2A984DC}" type="datetimeFigureOut">
               <a:rPr lang="en-US" smtClean="0"/>
-              <a:t>8/10/2023</a:t>
+              <a:t>8/11/2023</a:t>
             </a:fld>
             <a:endParaRPr lang="en-US"/>
           </a:p>
@@ -4049,7 +4050,7 @@
           <a:p>
             <a:fld id="{F81EA58A-236B-4351-AA1B-97F3A2A984DC}" type="datetimeFigureOut">
               <a:rPr lang="en-US" smtClean="0"/>
-              <a:t>8/10/2023</a:t>
+              <a:t>8/11/2023</a:t>
             </a:fld>
             <a:endParaRPr lang="en-US"/>
           </a:p>
@@ -4302,7 +4303,7 @@
           <a:p>
             <a:fld id="{F81EA58A-236B-4351-AA1B-97F3A2A984DC}" type="datetimeFigureOut">
               <a:rPr lang="en-US" smtClean="0"/>
-              <a:t>8/10/2023</a:t>
+              <a:t>8/11/2023</a:t>
             </a:fld>
             <a:endParaRPr lang="en-US"/>
           </a:p>
@@ -4605,7 +4606,7 @@
           <a:p>
             <a:fld id="{F81EA58A-236B-4351-AA1B-97F3A2A984DC}" type="datetimeFigureOut">
               <a:rPr lang="en-US" smtClean="0"/>
-              <a:t>8/10/2023</a:t>
+              <a:t>8/11/2023</a:t>
             </a:fld>
             <a:endParaRPr lang="en-US"/>
           </a:p>
@@ -5305,7 +5306,7 @@
           <a:p>
             <a:fld id="{F81EA58A-236B-4351-AA1B-97F3A2A984DC}" type="datetimeFigureOut">
               <a:rPr lang="en-US" smtClean="0"/>
-              <a:t>8/10/2023</a:t>
+              <a:t>8/11/2023</a:t>
             </a:fld>
             <a:endParaRPr lang="en-US"/>
           </a:p>
@@ -5895,6 +5896,97 @@
 </p:sld>
 </file>
 
+<file path=ppt/slides/slide10.xml><?xml version="1.0" encoding="utf-8"?>
+<p:sld xmlns:a="http://schemas.openxmlformats.org/drawingml/2006/main" xmlns:r="http://schemas.openxmlformats.org/officeDocument/2006/relationships" xmlns:p="http://schemas.openxmlformats.org/presentationml/2006/main">
+  <p:cSld>
+    <p:spTree>
+      <p:nvGrpSpPr>
+        <p:cNvPr id="1" name=""/>
+        <p:cNvGrpSpPr/>
+        <p:nvPr/>
+      </p:nvGrpSpPr>
+      <p:grpSpPr>
+        <a:xfrm>
+          <a:off x="0" y="0"/>
+          <a:ext cx="0" cy="0"/>
+          <a:chOff x="0" y="0"/>
+          <a:chExt cx="0" cy="0"/>
+        </a:xfrm>
+      </p:grpSpPr>
+      <p:sp>
+        <p:nvSpPr>
+          <p:cNvPr id="2" name="Title 1">
+            <a:extLst>
+              <a:ext uri="{FF2B5EF4-FFF2-40B4-BE49-F238E27FC236}">
+                <a16:creationId xmlns:a16="http://schemas.microsoft.com/office/drawing/2014/main" id="{3896878C-053E-531C-5E86-5976AF8E2F82}"/>
+              </a:ext>
+            </a:extLst>
+          </p:cNvPr>
+          <p:cNvSpPr>
+            <a:spLocks noGrp="1"/>
+          </p:cNvSpPr>
+          <p:nvPr>
+            <p:ph type="title"/>
+          </p:nvPr>
+        </p:nvSpPr>
+        <p:spPr/>
+        <p:txBody>
+          <a:bodyPr/>
+          <a:lstStyle/>
+          <a:p>
+            <a:endParaRPr lang="en-US"/>
+          </a:p>
+        </p:txBody>
+      </p:sp>
+      <p:pic>
+        <p:nvPicPr>
+          <p:cNvPr id="4" name="Picture 3" descr="A graph of a graph showing a line&#10;&#10;Description automatically generated">
+            <a:extLst>
+              <a:ext uri="{FF2B5EF4-FFF2-40B4-BE49-F238E27FC236}">
+                <a16:creationId xmlns:a16="http://schemas.microsoft.com/office/drawing/2014/main" id="{92763E31-E572-38DB-7355-57B92F4942AF}"/>
+              </a:ext>
+            </a:extLst>
+          </p:cNvPr>
+          <p:cNvPicPr>
+            <a:picLocks noChangeAspect="1"/>
+          </p:cNvPicPr>
+          <p:nvPr/>
+        </p:nvPicPr>
+        <p:blipFill>
+          <a:blip r:embed="rId2">
+            <a:extLst>
+              <a:ext uri="{28A0092B-C50C-407E-A947-70E740481C1C}">
+                <a14:useLocalDpi xmlns:a14="http://schemas.microsoft.com/office/drawing/2010/main" val="0"/>
+              </a:ext>
+            </a:extLst>
+          </a:blip>
+          <a:stretch>
+            <a:fillRect/>
+          </a:stretch>
+        </p:blipFill>
+        <p:spPr>
+          <a:xfrm>
+            <a:off x="182108" y="133336"/>
+            <a:ext cx="9746087" cy="6631358"/>
+          </a:xfrm>
+          <a:prstGeom prst="rect">
+            <a:avLst/>
+          </a:prstGeom>
+        </p:spPr>
+      </p:pic>
+    </p:spTree>
+    <p:extLst>
+      <p:ext uri="{BB962C8B-B14F-4D97-AF65-F5344CB8AC3E}">
+        <p14:creationId xmlns:p14="http://schemas.microsoft.com/office/powerpoint/2010/main" val="3569370174"/>
+      </p:ext>
+    </p:extLst>
+  </p:cSld>
+  <p:clrMapOvr>
+    <a:masterClrMapping/>
+  </p:clrMapOvr>
+</p:sld>
+</file>
+
 <file path=ppt/slides/slide2.xml><?xml version="1.0" encoding="utf-8"?>
 <p:sld xmlns:a="http://schemas.openxmlformats.org/drawingml/2006/main" xmlns:r="http://schemas.openxmlformats.org/officeDocument/2006/relationships" xmlns:p="http://schemas.openxmlformats.org/presentationml/2006/main">
   <p:cSld>
@@ -6318,6 +6410,96 @@
           <a:chExt cx="0" cy="0"/>
         </a:xfrm>
       </p:grpSpPr>
+      <p:sp>
+        <p:nvSpPr>
+          <p:cNvPr id="2" name="Title 1">
+            <a:extLst>
+              <a:ext uri="{FF2B5EF4-FFF2-40B4-BE49-F238E27FC236}">
+                <a16:creationId xmlns:a16="http://schemas.microsoft.com/office/drawing/2014/main" id="{3584690D-4D81-045E-387A-BDDE698D06D5}"/>
+              </a:ext>
+            </a:extLst>
+          </p:cNvPr>
+          <p:cNvSpPr>
+            <a:spLocks noGrp="1"/>
+          </p:cNvSpPr>
+          <p:nvPr>
+            <p:ph type="title"/>
+          </p:nvPr>
+        </p:nvSpPr>
+        <p:spPr/>
+        <p:txBody>
+          <a:bodyPr/>
+          <a:lstStyle/>
+          <a:p>
+            <a:endParaRPr lang="en-US"/>
+          </a:p>
+        </p:txBody>
+      </p:sp>
+      <p:pic>
+        <p:nvPicPr>
+          <p:cNvPr id="5" name="Content Placeholder 4" descr="A graph of a graph showing the difference between a number of columns&#10;&#10;Description automatically generated with medium confidence">
+            <a:extLst>
+              <a:ext uri="{FF2B5EF4-FFF2-40B4-BE49-F238E27FC236}">
+                <a16:creationId xmlns:a16="http://schemas.microsoft.com/office/drawing/2014/main" id="{CA6392D0-50E3-A840-7042-F666F6CEED8B}"/>
+              </a:ext>
+            </a:extLst>
+          </p:cNvPr>
+          <p:cNvPicPr>
+            <a:picLocks noGrp="1" noChangeAspect="1"/>
+          </p:cNvPicPr>
+          <p:nvPr>
+            <p:ph idx="1"/>
+          </p:nvPr>
+        </p:nvPicPr>
+        <p:blipFill>
+          <a:blip r:embed="rId2">
+            <a:extLst>
+              <a:ext uri="{28A0092B-C50C-407E-A947-70E740481C1C}">
+                <a14:useLocalDpi xmlns:a14="http://schemas.microsoft.com/office/drawing/2010/main" val="0"/>
+              </a:ext>
+            </a:extLst>
+          </a:blip>
+          <a:stretch>
+            <a:fillRect/>
+          </a:stretch>
+        </p:blipFill>
+        <p:spPr>
+          <a:xfrm>
+            <a:off x="302430" y="276370"/>
+            <a:ext cx="10826552" cy="6115194"/>
+          </a:xfrm>
+        </p:spPr>
+      </p:pic>
+    </p:spTree>
+    <p:extLst>
+      <p:ext uri="{BB962C8B-B14F-4D97-AF65-F5344CB8AC3E}">
+        <p14:creationId xmlns:p14="http://schemas.microsoft.com/office/powerpoint/2010/main" val="177671733"/>
+      </p:ext>
+    </p:extLst>
+  </p:cSld>
+  <p:clrMapOvr>
+    <a:masterClrMapping/>
+  </p:clrMapOvr>
+</p:sld>
+</file>
+
+<file path=ppt/slides/slide7.xml><?xml version="1.0" encoding="utf-8"?>
+<p:sld xmlns:a="http://schemas.openxmlformats.org/drawingml/2006/main" xmlns:r="http://schemas.openxmlformats.org/officeDocument/2006/relationships" xmlns:p="http://schemas.openxmlformats.org/presentationml/2006/main">
+  <p:cSld>
+    <p:spTree>
+      <p:nvGrpSpPr>
+        <p:cNvPr id="1" name=""/>
+        <p:cNvGrpSpPr/>
+        <p:nvPr/>
+      </p:nvGrpSpPr>
+      <p:grpSpPr>
+        <a:xfrm>
+          <a:off x="0" y="0"/>
+          <a:ext cx="0" cy="0"/>
+          <a:chOff x="0" y="0"/>
+          <a:chExt cx="0" cy="0"/>
+        </a:xfrm>
+      </p:grpSpPr>
       <p:pic>
         <p:nvPicPr>
           <p:cNvPr id="8" name="Content Placeholder 7" descr="A graph with lines and numbers&#10;&#10;Description automatically generated">
@@ -6366,122 +6548,6 @@
 </p:sld>
 </file>
 
-<file path=ppt/slides/slide7.xml><?xml version="1.0" encoding="utf-8"?>
-<p:sld xmlns:a="http://schemas.openxmlformats.org/drawingml/2006/main" xmlns:r="http://schemas.openxmlformats.org/officeDocument/2006/relationships" xmlns:p="http://schemas.openxmlformats.org/presentationml/2006/main">
-  <p:cSld>
-    <p:spTree>
-      <p:nvGrpSpPr>
-        <p:cNvPr id="1" name=""/>
-        <p:cNvGrpSpPr/>
-        <p:nvPr/>
-      </p:nvGrpSpPr>
-      <p:grpSpPr>
-        <a:xfrm>
-          <a:off x="0" y="0"/>
-          <a:ext cx="0" cy="0"/>
-          <a:chOff x="0" y="0"/>
-          <a:chExt cx="0" cy="0"/>
-        </a:xfrm>
-      </p:grpSpPr>
-      <p:sp>
-        <p:nvSpPr>
-          <p:cNvPr id="2" name="Title 1">
-            <a:extLst>
-              <a:ext uri="{FF2B5EF4-FFF2-40B4-BE49-F238E27FC236}">
-                <a16:creationId xmlns:a16="http://schemas.microsoft.com/office/drawing/2014/main" id="{DE04C1EC-3EDB-9E8F-837C-5C5ACDB195D8}"/>
-              </a:ext>
-            </a:extLst>
-          </p:cNvPr>
-          <p:cNvSpPr>
-            <a:spLocks noGrp="1"/>
-          </p:cNvSpPr>
-          <p:nvPr>
-            <p:ph type="title"/>
-          </p:nvPr>
-        </p:nvSpPr>
-        <p:spPr/>
-        <p:txBody>
-          <a:bodyPr/>
-          <a:lstStyle/>
-          <a:p>
-            <a:endParaRPr lang="en-US"/>
-          </a:p>
-        </p:txBody>
-      </p:sp>
-      <p:sp>
-        <p:nvSpPr>
-          <p:cNvPr id="3" name="Content Placeholder 2">
-            <a:extLst>
-              <a:ext uri="{FF2B5EF4-FFF2-40B4-BE49-F238E27FC236}">
-                <a16:creationId xmlns:a16="http://schemas.microsoft.com/office/drawing/2014/main" id="{15509778-4A84-BEDA-E5A1-4679D01280F6}"/>
-              </a:ext>
-            </a:extLst>
-          </p:cNvPr>
-          <p:cNvSpPr>
-            <a:spLocks noGrp="1"/>
-          </p:cNvSpPr>
-          <p:nvPr>
-            <p:ph idx="1"/>
-          </p:nvPr>
-        </p:nvSpPr>
-        <p:spPr/>
-        <p:txBody>
-          <a:bodyPr/>
-          <a:lstStyle/>
-          <a:p>
-            <a:endParaRPr lang="en-US"/>
-          </a:p>
-        </p:txBody>
-      </p:sp>
-      <p:pic>
-        <p:nvPicPr>
-          <p:cNvPr id="4" name="Picture 3" descr="A graph with a line and dots&#10;&#10;Description automatically generated">
-            <a:extLst>
-              <a:ext uri="{FF2B5EF4-FFF2-40B4-BE49-F238E27FC236}">
-                <a16:creationId xmlns:a16="http://schemas.microsoft.com/office/drawing/2014/main" id="{C85BC685-7127-87B2-0FE1-7421E3BE6049}"/>
-              </a:ext>
-            </a:extLst>
-          </p:cNvPr>
-          <p:cNvPicPr>
-            <a:picLocks noChangeAspect="1"/>
-          </p:cNvPicPr>
-          <p:nvPr/>
-        </p:nvPicPr>
-        <p:blipFill>
-          <a:blip r:embed="rId2">
-            <a:extLst>
-              <a:ext uri="{28A0092B-C50C-407E-A947-70E740481C1C}">
-                <a14:useLocalDpi xmlns:a14="http://schemas.microsoft.com/office/drawing/2010/main" val="0"/>
-              </a:ext>
-            </a:extLst>
-          </a:blip>
-          <a:stretch>
-            <a:fillRect/>
-          </a:stretch>
-        </p:blipFill>
-        <p:spPr>
-          <a:xfrm>
-            <a:off x="300981" y="87616"/>
-            <a:ext cx="8316486" cy="5658640"/>
-          </a:xfrm>
-          <a:prstGeom prst="rect">
-            <a:avLst/>
-          </a:prstGeom>
-        </p:spPr>
-      </p:pic>
-    </p:spTree>
-    <p:extLst>
-      <p:ext uri="{BB962C8B-B14F-4D97-AF65-F5344CB8AC3E}">
-        <p14:creationId xmlns:p14="http://schemas.microsoft.com/office/powerpoint/2010/main" val="1101351860"/>
-      </p:ext>
-    </p:extLst>
-  </p:cSld>
-  <p:clrMapOvr>
-    <a:masterClrMapping/>
-  </p:clrMapOvr>
-</p:sld>
-</file>
-
 <file path=ppt/slides/slide8.xml><?xml version="1.0" encoding="utf-8"?>
 <p:sld xmlns:a="http://schemas.openxmlformats.org/drawingml/2006/main" xmlns:r="http://schemas.openxmlformats.org/officeDocument/2006/relationships" xmlns:p="http://schemas.openxmlformats.org/presentationml/2006/main">
   <p:cSld>
@@ -6504,7 +6570,7 @@
           <p:cNvPr id="2" name="Title 1">
             <a:extLst>
               <a:ext uri="{FF2B5EF4-FFF2-40B4-BE49-F238E27FC236}">
-                <a16:creationId xmlns:a16="http://schemas.microsoft.com/office/drawing/2014/main" id="{BA781410-7EA5-850C-2187-531EC075D04C}"/>
+                <a16:creationId xmlns:a16="http://schemas.microsoft.com/office/drawing/2014/main" id="{DE04C1EC-3EDB-9E8F-837C-5C5ACDB195D8}"/>
               </a:ext>
             </a:extLst>
           </p:cNvPr>
@@ -6526,10 +6592,10 @@
       </p:sp>
       <p:pic>
         <p:nvPicPr>
-          <p:cNvPr id="11" name="Content Placeholder 10" descr="A chart with text and numbers&#10;&#10;Description automatically generated">
+          <p:cNvPr id="6" name="Content Placeholder 5" descr="A graph with a line and dots&#10;&#10;Description automatically generated">
             <a:extLst>
               <a:ext uri="{FF2B5EF4-FFF2-40B4-BE49-F238E27FC236}">
-                <a16:creationId xmlns:a16="http://schemas.microsoft.com/office/drawing/2014/main" id="{0F9B9D3A-C768-50CD-ABFB-A36F03099935}"/>
+                <a16:creationId xmlns:a16="http://schemas.microsoft.com/office/drawing/2014/main" id="{71EAF9B6-4B0B-B4CB-057A-6A6B4DBDA708}"/>
               </a:ext>
             </a:extLst>
           </p:cNvPr>
@@ -6554,15 +6620,15 @@
         </p:blipFill>
         <p:spPr>
           <a:xfrm>
-            <a:off x="294951" y="222060"/>
-            <a:ext cx="9505984" cy="6467989"/>
+            <a:off x="221675" y="167481"/>
+            <a:ext cx="10299828" cy="5817683"/>
           </a:xfrm>
         </p:spPr>
       </p:pic>
     </p:spTree>
     <p:extLst>
       <p:ext uri="{BB962C8B-B14F-4D97-AF65-F5344CB8AC3E}">
-        <p14:creationId xmlns:p14="http://schemas.microsoft.com/office/powerpoint/2010/main" val="2354495484"/>
+        <p14:creationId xmlns:p14="http://schemas.microsoft.com/office/powerpoint/2010/main" val="1101351860"/>
       </p:ext>
     </p:extLst>
   </p:cSld>
@@ -6594,7 +6660,7 @@
           <p:cNvPr id="2" name="Title 1">
             <a:extLst>
               <a:ext uri="{FF2B5EF4-FFF2-40B4-BE49-F238E27FC236}">
-                <a16:creationId xmlns:a16="http://schemas.microsoft.com/office/drawing/2014/main" id="{3896878C-053E-531C-5E86-5976AF8E2F82}"/>
+                <a16:creationId xmlns:a16="http://schemas.microsoft.com/office/drawing/2014/main" id="{BA781410-7EA5-850C-2187-531EC075D04C}"/>
               </a:ext>
             </a:extLst>
           </p:cNvPr>
@@ -6616,17 +6682,19 @@
       </p:sp>
       <p:pic>
         <p:nvPicPr>
-          <p:cNvPr id="4" name="Picture 3" descr="A graph of a graph showing a line&#10;&#10;Description automatically generated">
+          <p:cNvPr id="11" name="Content Placeholder 10" descr="A chart with text and numbers&#10;&#10;Description automatically generated">
             <a:extLst>
               <a:ext uri="{FF2B5EF4-FFF2-40B4-BE49-F238E27FC236}">
-                <a16:creationId xmlns:a16="http://schemas.microsoft.com/office/drawing/2014/main" id="{92763E31-E572-38DB-7355-57B92F4942AF}"/>
+                <a16:creationId xmlns:a16="http://schemas.microsoft.com/office/drawing/2014/main" id="{0F9B9D3A-C768-50CD-ABFB-A36F03099935}"/>
               </a:ext>
             </a:extLst>
           </p:cNvPr>
           <p:cNvPicPr>
-            <a:picLocks noChangeAspect="1"/>
+            <a:picLocks noGrp="1" noChangeAspect="1"/>
           </p:cNvPicPr>
-          <p:nvPr/>
+          <p:nvPr>
+            <p:ph idx="1"/>
+          </p:nvPr>
         </p:nvPicPr>
         <p:blipFill>
           <a:blip r:embed="rId2">
@@ -6642,18 +6710,15 @@
         </p:blipFill>
         <p:spPr>
           <a:xfrm>
-            <a:off x="182108" y="133336"/>
-            <a:ext cx="9746087" cy="6631358"/>
+            <a:off x="294951" y="222060"/>
+            <a:ext cx="9505984" cy="6467989"/>
           </a:xfrm>
-          <a:prstGeom prst="rect">
-            <a:avLst/>
-          </a:prstGeom>
         </p:spPr>
       </p:pic>
     </p:spTree>
     <p:extLst>
       <p:ext uri="{BB962C8B-B14F-4D97-AF65-F5344CB8AC3E}">
-        <p14:creationId xmlns:p14="http://schemas.microsoft.com/office/powerpoint/2010/main" val="3569370174"/>
+        <p14:creationId xmlns:p14="http://schemas.microsoft.com/office/powerpoint/2010/main" val="2354495484"/>
       </p:ext>
     </p:extLst>
   </p:cSld>

</xml_diff>

<commit_message>
Added labels to combined_good
</commit_message>
<xml_diff>
--- a/GSRExploratory.pptx
+++ b/GSRExploratory.pptx
@@ -6132,10 +6132,10 @@
       </p:sp>
       <p:pic>
         <p:nvPicPr>
-          <p:cNvPr id="6" name="Content Placeholder 5" descr="A graph of different colored lines&#10;&#10;Description automatically generated">
+          <p:cNvPr id="7" name="Content Placeholder 6" descr="A graph of different colored lines&#10;&#10;Description automatically generated">
             <a:extLst>
               <a:ext uri="{FF2B5EF4-FFF2-40B4-BE49-F238E27FC236}">
-                <a16:creationId xmlns:a16="http://schemas.microsoft.com/office/drawing/2014/main" id="{1B2E858C-1E05-32EF-4B1F-84AF79D634AC}"/>
+                <a16:creationId xmlns:a16="http://schemas.microsoft.com/office/drawing/2014/main" id="{ED501EE9-1261-96B7-7AD6-49D6B42EF07F}"/>
               </a:ext>
             </a:extLst>
           </p:cNvPr>
@@ -6160,8 +6160,8 @@
         </p:blipFill>
         <p:spPr>
           <a:xfrm>
-            <a:off x="382866" y="287400"/>
-            <a:ext cx="8477646" cy="6211054"/>
+            <a:off x="237776" y="202479"/>
+            <a:ext cx="11431589" cy="6456939"/>
           </a:xfrm>
         </p:spPr>
       </p:pic>

</xml_diff>

<commit_message>
Add new figures, lifespan/avcits
</commit_message>
<xml_diff>
--- a/GSRExploratory.pptx
+++ b/GSRExploratory.pptx
@@ -9,12 +9,17 @@
     <p:sldId id="259" r:id="rId3"/>
     <p:sldId id="279" r:id="rId4"/>
     <p:sldId id="278" r:id="rId5"/>
-    <p:sldId id="280" r:id="rId6"/>
-    <p:sldId id="281" r:id="rId7"/>
-    <p:sldId id="265" r:id="rId8"/>
-    <p:sldId id="273" r:id="rId9"/>
-    <p:sldId id="271" r:id="rId10"/>
-    <p:sldId id="260" r:id="rId11"/>
+    <p:sldId id="285" r:id="rId6"/>
+    <p:sldId id="286" r:id="rId7"/>
+    <p:sldId id="282" r:id="rId8"/>
+    <p:sldId id="280" r:id="rId9"/>
+    <p:sldId id="284" r:id="rId10"/>
+    <p:sldId id="283" r:id="rId11"/>
+    <p:sldId id="281" r:id="rId12"/>
+    <p:sldId id="265" r:id="rId13"/>
+    <p:sldId id="273" r:id="rId14"/>
+    <p:sldId id="271" r:id="rId15"/>
+    <p:sldId id="260" r:id="rId16"/>
   </p:sldIdLst>
   <p:sldSz cx="12192000" cy="6858000"/>
   <p:notesSz cx="6858000" cy="9144000"/>
@@ -873,7 +878,7 @@
           <a:p>
             <a:fld id="{F81EA58A-236B-4351-AA1B-97F3A2A984DC}" type="datetimeFigureOut">
               <a:rPr lang="en-US" smtClean="0"/>
-              <a:t>8/11/2023</a:t>
+              <a:t>8/15/2023</a:t>
             </a:fld>
             <a:endParaRPr lang="en-US"/>
           </a:p>
@@ -1123,7 +1128,7 @@
           <a:p>
             <a:fld id="{F81EA58A-236B-4351-AA1B-97F3A2A984DC}" type="datetimeFigureOut">
               <a:rPr lang="en-US" smtClean="0"/>
-              <a:t>8/11/2023</a:t>
+              <a:t>8/15/2023</a:t>
             </a:fld>
             <a:endParaRPr lang="en-US"/>
           </a:p>
@@ -1436,7 +1441,7 @@
           <a:p>
             <a:fld id="{F81EA58A-236B-4351-AA1B-97F3A2A984DC}" type="datetimeFigureOut">
               <a:rPr lang="en-US" smtClean="0"/>
-              <a:t>8/11/2023</a:t>
+              <a:t>8/15/2023</a:t>
             </a:fld>
             <a:endParaRPr lang="en-US"/>
           </a:p>
@@ -1768,7 +1773,7 @@
           <a:p>
             <a:fld id="{F81EA58A-236B-4351-AA1B-97F3A2A984DC}" type="datetimeFigureOut">
               <a:rPr lang="en-US" smtClean="0"/>
-              <a:t>8/11/2023</a:t>
+              <a:t>8/15/2023</a:t>
             </a:fld>
             <a:endParaRPr lang="en-US"/>
           </a:p>
@@ -2081,7 +2086,7 @@
           <a:p>
             <a:fld id="{F81EA58A-236B-4351-AA1B-97F3A2A984DC}" type="datetimeFigureOut">
               <a:rPr lang="en-US" smtClean="0"/>
-              <a:t>8/11/2023</a:t>
+              <a:t>8/15/2023</a:t>
             </a:fld>
             <a:endParaRPr lang="en-US"/>
           </a:p>
@@ -2473,7 +2478,7 @@
           <a:p>
             <a:fld id="{F81EA58A-236B-4351-AA1B-97F3A2A984DC}" type="datetimeFigureOut">
               <a:rPr lang="en-US" smtClean="0"/>
-              <a:t>8/11/2023</a:t>
+              <a:t>8/15/2023</a:t>
             </a:fld>
             <a:endParaRPr lang="en-US"/>
           </a:p>
@@ -2641,7 +2646,7 @@
           <a:p>
             <a:fld id="{F81EA58A-236B-4351-AA1B-97F3A2A984DC}" type="datetimeFigureOut">
               <a:rPr lang="en-US" smtClean="0"/>
-              <a:t>8/11/2023</a:t>
+              <a:t>8/15/2023</a:t>
             </a:fld>
             <a:endParaRPr lang="en-US"/>
           </a:p>
@@ -2819,7 +2824,7 @@
           <a:p>
             <a:fld id="{F81EA58A-236B-4351-AA1B-97F3A2A984DC}" type="datetimeFigureOut">
               <a:rPr lang="en-US" smtClean="0"/>
-              <a:t>8/11/2023</a:t>
+              <a:t>8/15/2023</a:t>
             </a:fld>
             <a:endParaRPr lang="en-US"/>
           </a:p>
@@ -2987,7 +2992,7 @@
           <a:p>
             <a:fld id="{F81EA58A-236B-4351-AA1B-97F3A2A984DC}" type="datetimeFigureOut">
               <a:rPr lang="en-US" smtClean="0"/>
-              <a:t>8/11/2023</a:t>
+              <a:t>8/15/2023</a:t>
             </a:fld>
             <a:endParaRPr lang="en-US"/>
           </a:p>
@@ -3233,7 +3238,7 @@
           <a:p>
             <a:fld id="{F81EA58A-236B-4351-AA1B-97F3A2A984DC}" type="datetimeFigureOut">
               <a:rPr lang="en-US" smtClean="0"/>
-              <a:t>8/11/2023</a:t>
+              <a:t>8/15/2023</a:t>
             </a:fld>
             <a:endParaRPr lang="en-US"/>
           </a:p>
@@ -3462,7 +3467,7 @@
           <a:p>
             <a:fld id="{F81EA58A-236B-4351-AA1B-97F3A2A984DC}" type="datetimeFigureOut">
               <a:rPr lang="en-US" smtClean="0"/>
-              <a:t>8/11/2023</a:t>
+              <a:t>8/15/2023</a:t>
             </a:fld>
             <a:endParaRPr lang="en-US"/>
           </a:p>
@@ -3833,7 +3838,7 @@
           <a:p>
             <a:fld id="{F81EA58A-236B-4351-AA1B-97F3A2A984DC}" type="datetimeFigureOut">
               <a:rPr lang="en-US" smtClean="0"/>
-              <a:t>8/11/2023</a:t>
+              <a:t>8/15/2023</a:t>
             </a:fld>
             <a:endParaRPr lang="en-US"/>
           </a:p>
@@ -3955,7 +3960,7 @@
           <a:p>
             <a:fld id="{F81EA58A-236B-4351-AA1B-97F3A2A984DC}" type="datetimeFigureOut">
               <a:rPr lang="en-US" smtClean="0"/>
-              <a:t>8/11/2023</a:t>
+              <a:t>8/15/2023</a:t>
             </a:fld>
             <a:endParaRPr lang="en-US"/>
           </a:p>
@@ -4050,7 +4055,7 @@
           <a:p>
             <a:fld id="{F81EA58A-236B-4351-AA1B-97F3A2A984DC}" type="datetimeFigureOut">
               <a:rPr lang="en-US" smtClean="0"/>
-              <a:t>8/11/2023</a:t>
+              <a:t>8/15/2023</a:t>
             </a:fld>
             <a:endParaRPr lang="en-US"/>
           </a:p>
@@ -4303,7 +4308,7 @@
           <a:p>
             <a:fld id="{F81EA58A-236B-4351-AA1B-97F3A2A984DC}" type="datetimeFigureOut">
               <a:rPr lang="en-US" smtClean="0"/>
-              <a:t>8/11/2023</a:t>
+              <a:t>8/15/2023</a:t>
             </a:fld>
             <a:endParaRPr lang="en-US"/>
           </a:p>
@@ -4606,7 +4611,7 @@
           <a:p>
             <a:fld id="{F81EA58A-236B-4351-AA1B-97F3A2A984DC}" type="datetimeFigureOut">
               <a:rPr lang="en-US" smtClean="0"/>
-              <a:t>8/11/2023</a:t>
+              <a:t>8/15/2023</a:t>
             </a:fld>
             <a:endParaRPr lang="en-US"/>
           </a:p>
@@ -5306,7 +5311,7 @@
           <a:p>
             <a:fld id="{F81EA58A-236B-4351-AA1B-97F3A2A984DC}" type="datetimeFigureOut">
               <a:rPr lang="en-US" smtClean="0"/>
-              <a:t>8/11/2023</a:t>
+              <a:t>8/15/2023</a:t>
             </a:fld>
             <a:endParaRPr lang="en-US"/>
           </a:p>
@@ -5918,6 +5923,457 @@
           <p:cNvPr id="2" name="Title 1">
             <a:extLst>
               <a:ext uri="{FF2B5EF4-FFF2-40B4-BE49-F238E27FC236}">
+                <a16:creationId xmlns:a16="http://schemas.microsoft.com/office/drawing/2014/main" id="{49C4C1CC-14D5-F25C-2DD9-7354F8E46900}"/>
+              </a:ext>
+            </a:extLst>
+          </p:cNvPr>
+          <p:cNvSpPr>
+            <a:spLocks noGrp="1"/>
+          </p:cNvSpPr>
+          <p:nvPr>
+            <p:ph type="title"/>
+          </p:nvPr>
+        </p:nvSpPr>
+        <p:spPr/>
+        <p:txBody>
+          <a:bodyPr/>
+          <a:lstStyle/>
+          <a:p>
+            <a:endParaRPr lang="en-US"/>
+          </a:p>
+        </p:txBody>
+      </p:sp>
+      <p:sp>
+        <p:nvSpPr>
+          <p:cNvPr id="3" name="Content Placeholder 2">
+            <a:extLst>
+              <a:ext uri="{FF2B5EF4-FFF2-40B4-BE49-F238E27FC236}">
+                <a16:creationId xmlns:a16="http://schemas.microsoft.com/office/drawing/2014/main" id="{217336A4-1AAF-53E7-9ED9-CA537E5D5581}"/>
+              </a:ext>
+            </a:extLst>
+          </p:cNvPr>
+          <p:cNvSpPr>
+            <a:spLocks noGrp="1"/>
+          </p:cNvSpPr>
+          <p:nvPr>
+            <p:ph idx="1"/>
+          </p:nvPr>
+        </p:nvSpPr>
+        <p:spPr/>
+        <p:txBody>
+          <a:bodyPr/>
+          <a:lstStyle/>
+          <a:p>
+            <a:endParaRPr lang="en-US"/>
+          </a:p>
+        </p:txBody>
+      </p:sp>
+      <p:pic>
+        <p:nvPicPr>
+          <p:cNvPr id="4" name="Picture 3" descr="A graph showing a number of certifications&#10;&#10;Description automatically generated">
+            <a:extLst>
+              <a:ext uri="{FF2B5EF4-FFF2-40B4-BE49-F238E27FC236}">
+                <a16:creationId xmlns:a16="http://schemas.microsoft.com/office/drawing/2014/main" id="{4A79D93A-2456-D3FC-E7A9-292766D60B0B}"/>
+              </a:ext>
+            </a:extLst>
+          </p:cNvPr>
+          <p:cNvPicPr>
+            <a:picLocks noChangeAspect="1"/>
+          </p:cNvPicPr>
+          <p:nvPr/>
+        </p:nvPicPr>
+        <p:blipFill>
+          <a:blip r:embed="rId2">
+            <a:extLst>
+              <a:ext uri="{28A0092B-C50C-407E-A947-70E740481C1C}">
+                <a14:useLocalDpi xmlns:a14="http://schemas.microsoft.com/office/drawing/2010/main" val="0"/>
+              </a:ext>
+            </a:extLst>
+          </a:blip>
+          <a:stretch>
+            <a:fillRect/>
+          </a:stretch>
+        </p:blipFill>
+        <p:spPr>
+          <a:xfrm>
+            <a:off x="257382" y="350586"/>
+            <a:ext cx="11537913" cy="4704299"/>
+          </a:xfrm>
+          <a:prstGeom prst="rect">
+            <a:avLst/>
+          </a:prstGeom>
+        </p:spPr>
+      </p:pic>
+    </p:spTree>
+    <p:extLst>
+      <p:ext uri="{BB962C8B-B14F-4D97-AF65-F5344CB8AC3E}">
+        <p14:creationId xmlns:p14="http://schemas.microsoft.com/office/powerpoint/2010/main" val="2084203760"/>
+      </p:ext>
+    </p:extLst>
+  </p:cSld>
+  <p:clrMapOvr>
+    <a:masterClrMapping/>
+  </p:clrMapOvr>
+</p:sld>
+</file>
+
+<file path=ppt/slides/slide11.xml><?xml version="1.0" encoding="utf-8"?>
+<p:sld xmlns:a="http://schemas.openxmlformats.org/drawingml/2006/main" xmlns:r="http://schemas.openxmlformats.org/officeDocument/2006/relationships" xmlns:p="http://schemas.openxmlformats.org/presentationml/2006/main">
+  <p:cSld>
+    <p:spTree>
+      <p:nvGrpSpPr>
+        <p:cNvPr id="1" name=""/>
+        <p:cNvGrpSpPr/>
+        <p:nvPr/>
+      </p:nvGrpSpPr>
+      <p:grpSpPr>
+        <a:xfrm>
+          <a:off x="0" y="0"/>
+          <a:ext cx="0" cy="0"/>
+          <a:chOff x="0" y="0"/>
+          <a:chExt cx="0" cy="0"/>
+        </a:xfrm>
+      </p:grpSpPr>
+      <p:sp>
+        <p:nvSpPr>
+          <p:cNvPr id="2" name="Title 1">
+            <a:extLst>
+              <a:ext uri="{FF2B5EF4-FFF2-40B4-BE49-F238E27FC236}">
+                <a16:creationId xmlns:a16="http://schemas.microsoft.com/office/drawing/2014/main" id="{3584690D-4D81-045E-387A-BDDE698D06D5}"/>
+              </a:ext>
+            </a:extLst>
+          </p:cNvPr>
+          <p:cNvSpPr>
+            <a:spLocks noGrp="1"/>
+          </p:cNvSpPr>
+          <p:nvPr>
+            <p:ph type="title"/>
+          </p:nvPr>
+        </p:nvSpPr>
+        <p:spPr/>
+        <p:txBody>
+          <a:bodyPr/>
+          <a:lstStyle/>
+          <a:p>
+            <a:endParaRPr lang="en-US"/>
+          </a:p>
+        </p:txBody>
+      </p:sp>
+      <p:pic>
+        <p:nvPicPr>
+          <p:cNvPr id="5" name="Content Placeholder 4" descr="A graph of a graph showing the difference between a number of columns&#10;&#10;Description automatically generated with medium confidence">
+            <a:extLst>
+              <a:ext uri="{FF2B5EF4-FFF2-40B4-BE49-F238E27FC236}">
+                <a16:creationId xmlns:a16="http://schemas.microsoft.com/office/drawing/2014/main" id="{CA6392D0-50E3-A840-7042-F666F6CEED8B}"/>
+              </a:ext>
+            </a:extLst>
+          </p:cNvPr>
+          <p:cNvPicPr>
+            <a:picLocks noGrp="1" noChangeAspect="1"/>
+          </p:cNvPicPr>
+          <p:nvPr>
+            <p:ph idx="1"/>
+          </p:nvPr>
+        </p:nvPicPr>
+        <p:blipFill>
+          <a:blip r:embed="rId2">
+            <a:extLst>
+              <a:ext uri="{28A0092B-C50C-407E-A947-70E740481C1C}">
+                <a14:useLocalDpi xmlns:a14="http://schemas.microsoft.com/office/drawing/2010/main" val="0"/>
+              </a:ext>
+            </a:extLst>
+          </a:blip>
+          <a:stretch>
+            <a:fillRect/>
+          </a:stretch>
+        </p:blipFill>
+        <p:spPr>
+          <a:xfrm>
+            <a:off x="302430" y="276370"/>
+            <a:ext cx="10826552" cy="6115194"/>
+          </a:xfrm>
+        </p:spPr>
+      </p:pic>
+    </p:spTree>
+    <p:extLst>
+      <p:ext uri="{BB962C8B-B14F-4D97-AF65-F5344CB8AC3E}">
+        <p14:creationId xmlns:p14="http://schemas.microsoft.com/office/powerpoint/2010/main" val="177671733"/>
+      </p:ext>
+    </p:extLst>
+  </p:cSld>
+  <p:clrMapOvr>
+    <a:masterClrMapping/>
+  </p:clrMapOvr>
+</p:sld>
+</file>
+
+<file path=ppt/slides/slide12.xml><?xml version="1.0" encoding="utf-8"?>
+<p:sld xmlns:a="http://schemas.openxmlformats.org/drawingml/2006/main" xmlns:r="http://schemas.openxmlformats.org/officeDocument/2006/relationships" xmlns:p="http://schemas.openxmlformats.org/presentationml/2006/main">
+  <p:cSld>
+    <p:spTree>
+      <p:nvGrpSpPr>
+        <p:cNvPr id="1" name=""/>
+        <p:cNvGrpSpPr/>
+        <p:nvPr/>
+      </p:nvGrpSpPr>
+      <p:grpSpPr>
+        <a:xfrm>
+          <a:off x="0" y="0"/>
+          <a:ext cx="0" cy="0"/>
+          <a:chOff x="0" y="0"/>
+          <a:chExt cx="0" cy="0"/>
+        </a:xfrm>
+      </p:grpSpPr>
+      <p:pic>
+        <p:nvPicPr>
+          <p:cNvPr id="8" name="Content Placeholder 7" descr="A graph with lines and numbers&#10;&#10;Description automatically generated">
+            <a:extLst>
+              <a:ext uri="{FF2B5EF4-FFF2-40B4-BE49-F238E27FC236}">
+                <a16:creationId xmlns:a16="http://schemas.microsoft.com/office/drawing/2014/main" id="{2F0A1629-8E93-77B1-5B81-E730B2AF606A}"/>
+              </a:ext>
+            </a:extLst>
+          </p:cNvPr>
+          <p:cNvPicPr>
+            <a:picLocks noGrp="1" noChangeAspect="1"/>
+          </p:cNvPicPr>
+          <p:nvPr>
+            <p:ph idx="1"/>
+          </p:nvPr>
+        </p:nvPicPr>
+        <p:blipFill>
+          <a:blip r:embed="rId2">
+            <a:extLst>
+              <a:ext uri="{28A0092B-C50C-407E-A947-70E740481C1C}">
+                <a14:useLocalDpi xmlns:a14="http://schemas.microsoft.com/office/drawing/2010/main" val="0"/>
+              </a:ext>
+            </a:extLst>
+          </a:blip>
+          <a:stretch>
+            <a:fillRect/>
+          </a:stretch>
+        </p:blipFill>
+        <p:spPr>
+          <a:xfrm>
+            <a:off x="0" y="94044"/>
+            <a:ext cx="9363092" cy="6370764"/>
+          </a:xfrm>
+        </p:spPr>
+      </p:pic>
+    </p:spTree>
+    <p:extLst>
+      <p:ext uri="{BB962C8B-B14F-4D97-AF65-F5344CB8AC3E}">
+        <p14:creationId xmlns:p14="http://schemas.microsoft.com/office/powerpoint/2010/main" val="3440815627"/>
+      </p:ext>
+    </p:extLst>
+  </p:cSld>
+  <p:clrMapOvr>
+    <a:masterClrMapping/>
+  </p:clrMapOvr>
+</p:sld>
+</file>
+
+<file path=ppt/slides/slide13.xml><?xml version="1.0" encoding="utf-8"?>
+<p:sld xmlns:a="http://schemas.openxmlformats.org/drawingml/2006/main" xmlns:r="http://schemas.openxmlformats.org/officeDocument/2006/relationships" xmlns:p="http://schemas.openxmlformats.org/presentationml/2006/main">
+  <p:cSld>
+    <p:spTree>
+      <p:nvGrpSpPr>
+        <p:cNvPr id="1" name=""/>
+        <p:cNvGrpSpPr/>
+        <p:nvPr/>
+      </p:nvGrpSpPr>
+      <p:grpSpPr>
+        <a:xfrm>
+          <a:off x="0" y="0"/>
+          <a:ext cx="0" cy="0"/>
+          <a:chOff x="0" y="0"/>
+          <a:chExt cx="0" cy="0"/>
+        </a:xfrm>
+      </p:grpSpPr>
+      <p:sp>
+        <p:nvSpPr>
+          <p:cNvPr id="2" name="Title 1">
+            <a:extLst>
+              <a:ext uri="{FF2B5EF4-FFF2-40B4-BE49-F238E27FC236}">
+                <a16:creationId xmlns:a16="http://schemas.microsoft.com/office/drawing/2014/main" id="{DE04C1EC-3EDB-9E8F-837C-5C5ACDB195D8}"/>
+              </a:ext>
+            </a:extLst>
+          </p:cNvPr>
+          <p:cNvSpPr>
+            <a:spLocks noGrp="1"/>
+          </p:cNvSpPr>
+          <p:nvPr>
+            <p:ph type="title"/>
+          </p:nvPr>
+        </p:nvSpPr>
+        <p:spPr/>
+        <p:txBody>
+          <a:bodyPr/>
+          <a:lstStyle/>
+          <a:p>
+            <a:endParaRPr lang="en-US"/>
+          </a:p>
+        </p:txBody>
+      </p:sp>
+      <p:pic>
+        <p:nvPicPr>
+          <p:cNvPr id="6" name="Content Placeholder 5" descr="A graph with a line and dots&#10;&#10;Description automatically generated">
+            <a:extLst>
+              <a:ext uri="{FF2B5EF4-FFF2-40B4-BE49-F238E27FC236}">
+                <a16:creationId xmlns:a16="http://schemas.microsoft.com/office/drawing/2014/main" id="{71EAF9B6-4B0B-B4CB-057A-6A6B4DBDA708}"/>
+              </a:ext>
+            </a:extLst>
+          </p:cNvPr>
+          <p:cNvPicPr>
+            <a:picLocks noGrp="1" noChangeAspect="1"/>
+          </p:cNvPicPr>
+          <p:nvPr>
+            <p:ph idx="1"/>
+          </p:nvPr>
+        </p:nvPicPr>
+        <p:blipFill>
+          <a:blip r:embed="rId2">
+            <a:extLst>
+              <a:ext uri="{28A0092B-C50C-407E-A947-70E740481C1C}">
+                <a14:useLocalDpi xmlns:a14="http://schemas.microsoft.com/office/drawing/2010/main" val="0"/>
+              </a:ext>
+            </a:extLst>
+          </a:blip>
+          <a:stretch>
+            <a:fillRect/>
+          </a:stretch>
+        </p:blipFill>
+        <p:spPr>
+          <a:xfrm>
+            <a:off x="221675" y="167481"/>
+            <a:ext cx="10299828" cy="5817683"/>
+          </a:xfrm>
+        </p:spPr>
+      </p:pic>
+    </p:spTree>
+    <p:extLst>
+      <p:ext uri="{BB962C8B-B14F-4D97-AF65-F5344CB8AC3E}">
+        <p14:creationId xmlns:p14="http://schemas.microsoft.com/office/powerpoint/2010/main" val="1101351860"/>
+      </p:ext>
+    </p:extLst>
+  </p:cSld>
+  <p:clrMapOvr>
+    <a:masterClrMapping/>
+  </p:clrMapOvr>
+</p:sld>
+</file>
+
+<file path=ppt/slides/slide14.xml><?xml version="1.0" encoding="utf-8"?>
+<p:sld xmlns:a="http://schemas.openxmlformats.org/drawingml/2006/main" xmlns:r="http://schemas.openxmlformats.org/officeDocument/2006/relationships" xmlns:p="http://schemas.openxmlformats.org/presentationml/2006/main">
+  <p:cSld>
+    <p:spTree>
+      <p:nvGrpSpPr>
+        <p:cNvPr id="1" name=""/>
+        <p:cNvGrpSpPr/>
+        <p:nvPr/>
+      </p:nvGrpSpPr>
+      <p:grpSpPr>
+        <a:xfrm>
+          <a:off x="0" y="0"/>
+          <a:ext cx="0" cy="0"/>
+          <a:chOff x="0" y="0"/>
+          <a:chExt cx="0" cy="0"/>
+        </a:xfrm>
+      </p:grpSpPr>
+      <p:sp>
+        <p:nvSpPr>
+          <p:cNvPr id="2" name="Title 1">
+            <a:extLst>
+              <a:ext uri="{FF2B5EF4-FFF2-40B4-BE49-F238E27FC236}">
+                <a16:creationId xmlns:a16="http://schemas.microsoft.com/office/drawing/2014/main" id="{BA781410-7EA5-850C-2187-531EC075D04C}"/>
+              </a:ext>
+            </a:extLst>
+          </p:cNvPr>
+          <p:cNvSpPr>
+            <a:spLocks noGrp="1"/>
+          </p:cNvSpPr>
+          <p:nvPr>
+            <p:ph type="title"/>
+          </p:nvPr>
+        </p:nvSpPr>
+        <p:spPr/>
+        <p:txBody>
+          <a:bodyPr/>
+          <a:lstStyle/>
+          <a:p>
+            <a:endParaRPr lang="en-US"/>
+          </a:p>
+        </p:txBody>
+      </p:sp>
+      <p:pic>
+        <p:nvPicPr>
+          <p:cNvPr id="11" name="Content Placeholder 10" descr="A chart with text and numbers&#10;&#10;Description automatically generated">
+            <a:extLst>
+              <a:ext uri="{FF2B5EF4-FFF2-40B4-BE49-F238E27FC236}">
+                <a16:creationId xmlns:a16="http://schemas.microsoft.com/office/drawing/2014/main" id="{0F9B9D3A-C768-50CD-ABFB-A36F03099935}"/>
+              </a:ext>
+            </a:extLst>
+          </p:cNvPr>
+          <p:cNvPicPr>
+            <a:picLocks noGrp="1" noChangeAspect="1"/>
+          </p:cNvPicPr>
+          <p:nvPr>
+            <p:ph idx="1"/>
+          </p:nvPr>
+        </p:nvPicPr>
+        <p:blipFill>
+          <a:blip r:embed="rId2">
+            <a:extLst>
+              <a:ext uri="{28A0092B-C50C-407E-A947-70E740481C1C}">
+                <a14:useLocalDpi xmlns:a14="http://schemas.microsoft.com/office/drawing/2010/main" val="0"/>
+              </a:ext>
+            </a:extLst>
+          </a:blip>
+          <a:stretch>
+            <a:fillRect/>
+          </a:stretch>
+        </p:blipFill>
+        <p:spPr>
+          <a:xfrm>
+            <a:off x="294951" y="222060"/>
+            <a:ext cx="9505984" cy="6467989"/>
+          </a:xfrm>
+        </p:spPr>
+      </p:pic>
+    </p:spTree>
+    <p:extLst>
+      <p:ext uri="{BB962C8B-B14F-4D97-AF65-F5344CB8AC3E}">
+        <p14:creationId xmlns:p14="http://schemas.microsoft.com/office/powerpoint/2010/main" val="2354495484"/>
+      </p:ext>
+    </p:extLst>
+  </p:cSld>
+  <p:clrMapOvr>
+    <a:masterClrMapping/>
+  </p:clrMapOvr>
+</p:sld>
+</file>
+
+<file path=ppt/slides/slide15.xml><?xml version="1.0" encoding="utf-8"?>
+<p:sld xmlns:a="http://schemas.openxmlformats.org/drawingml/2006/main" xmlns:r="http://schemas.openxmlformats.org/officeDocument/2006/relationships" xmlns:p="http://schemas.openxmlformats.org/presentationml/2006/main">
+  <p:cSld>
+    <p:spTree>
+      <p:nvGrpSpPr>
+        <p:cNvPr id="1" name=""/>
+        <p:cNvGrpSpPr/>
+        <p:nvPr/>
+      </p:nvGrpSpPr>
+      <p:grpSpPr>
+        <a:xfrm>
+          <a:off x="0" y="0"/>
+          <a:ext cx="0" cy="0"/>
+          <a:chOff x="0" y="0"/>
+          <a:chExt cx="0" cy="0"/>
+        </a:xfrm>
+      </p:grpSpPr>
+      <p:sp>
+        <p:nvSpPr>
+          <p:cNvPr id="2" name="Title 1">
+            <a:extLst>
+              <a:ext uri="{FF2B5EF4-FFF2-40B4-BE49-F238E27FC236}">
                 <a16:creationId xmlns:a16="http://schemas.microsoft.com/office/drawing/2014/main" id="{3896878C-053E-531C-5E86-5976AF8E2F82}"/>
               </a:ext>
             </a:extLst>
@@ -6325,6 +6781,328 @@
           <p:cNvPr id="2" name="Title 1">
             <a:extLst>
               <a:ext uri="{FF2B5EF4-FFF2-40B4-BE49-F238E27FC236}">
+                <a16:creationId xmlns:a16="http://schemas.microsoft.com/office/drawing/2014/main" id="{867E5E8C-93E0-8D07-4169-D3FFE8A02549}"/>
+              </a:ext>
+            </a:extLst>
+          </p:cNvPr>
+          <p:cNvSpPr>
+            <a:spLocks noGrp="1"/>
+          </p:cNvSpPr>
+          <p:nvPr>
+            <p:ph type="title"/>
+          </p:nvPr>
+        </p:nvSpPr>
+        <p:spPr/>
+        <p:txBody>
+          <a:bodyPr/>
+          <a:lstStyle/>
+          <a:p>
+            <a:endParaRPr lang="en-US"/>
+          </a:p>
+        </p:txBody>
+      </p:sp>
+      <p:pic>
+        <p:nvPicPr>
+          <p:cNvPr id="7" name="Picture 6" descr="A graph with black dots and blue line&#10;&#10;Description automatically generated">
+            <a:extLst>
+              <a:ext uri="{FF2B5EF4-FFF2-40B4-BE49-F238E27FC236}">
+                <a16:creationId xmlns:a16="http://schemas.microsoft.com/office/drawing/2014/main" id="{8CA69FF9-D7DE-188A-CB0C-573295044504}"/>
+              </a:ext>
+            </a:extLst>
+          </p:cNvPr>
+          <p:cNvPicPr>
+            <a:picLocks noChangeAspect="1"/>
+          </p:cNvPicPr>
+          <p:nvPr/>
+        </p:nvPicPr>
+        <p:blipFill>
+          <a:blip r:embed="rId2">
+            <a:extLst>
+              <a:ext uri="{28A0092B-C50C-407E-A947-70E740481C1C}">
+                <a14:useLocalDpi xmlns:a14="http://schemas.microsoft.com/office/drawing/2010/main" val="0"/>
+              </a:ext>
+            </a:extLst>
+          </a:blip>
+          <a:stretch>
+            <a:fillRect/>
+          </a:stretch>
+        </p:blipFill>
+        <p:spPr>
+          <a:xfrm>
+            <a:off x="290056" y="480970"/>
+            <a:ext cx="11490843" cy="5077349"/>
+          </a:xfrm>
+          <a:prstGeom prst="rect">
+            <a:avLst/>
+          </a:prstGeom>
+        </p:spPr>
+      </p:pic>
+      <p:sp>
+        <p:nvSpPr>
+          <p:cNvPr id="15" name="Content Placeholder 14">
+            <a:extLst>
+              <a:ext uri="{FF2B5EF4-FFF2-40B4-BE49-F238E27FC236}">
+                <a16:creationId xmlns:a16="http://schemas.microsoft.com/office/drawing/2014/main" id="{F0BDC78D-2382-7842-1F38-180E88285EFA}"/>
+              </a:ext>
+            </a:extLst>
+          </p:cNvPr>
+          <p:cNvSpPr>
+            <a:spLocks noGrp="1"/>
+          </p:cNvSpPr>
+          <p:nvPr>
+            <p:ph idx="1"/>
+          </p:nvPr>
+        </p:nvSpPr>
+        <p:spPr/>
+        <p:txBody>
+          <a:bodyPr/>
+          <a:lstStyle/>
+          <a:p>
+            <a:endParaRPr lang="en-US" dirty="0"/>
+          </a:p>
+        </p:txBody>
+      </p:sp>
+    </p:spTree>
+    <p:extLst>
+      <p:ext uri="{BB962C8B-B14F-4D97-AF65-F5344CB8AC3E}">
+        <p14:creationId xmlns:p14="http://schemas.microsoft.com/office/powerpoint/2010/main" val="1185561612"/>
+      </p:ext>
+    </p:extLst>
+  </p:cSld>
+  <p:clrMapOvr>
+    <a:masterClrMapping/>
+  </p:clrMapOvr>
+</p:sld>
+</file>
+
+<file path=ppt/slides/slide6.xml><?xml version="1.0" encoding="utf-8"?>
+<p:sld xmlns:a="http://schemas.openxmlformats.org/drawingml/2006/main" xmlns:r="http://schemas.openxmlformats.org/officeDocument/2006/relationships" xmlns:p="http://schemas.openxmlformats.org/presentationml/2006/main">
+  <p:cSld>
+    <p:spTree>
+      <p:nvGrpSpPr>
+        <p:cNvPr id="1" name=""/>
+        <p:cNvGrpSpPr/>
+        <p:nvPr/>
+      </p:nvGrpSpPr>
+      <p:grpSpPr>
+        <a:xfrm>
+          <a:off x="0" y="0"/>
+          <a:ext cx="0" cy="0"/>
+          <a:chOff x="0" y="0"/>
+          <a:chExt cx="0" cy="0"/>
+        </a:xfrm>
+      </p:grpSpPr>
+      <p:sp>
+        <p:nvSpPr>
+          <p:cNvPr id="2" name="Title 1">
+            <a:extLst>
+              <a:ext uri="{FF2B5EF4-FFF2-40B4-BE49-F238E27FC236}">
+                <a16:creationId xmlns:a16="http://schemas.microsoft.com/office/drawing/2014/main" id="{673253D2-761F-19F0-6A95-DDA8485E05A0}"/>
+              </a:ext>
+            </a:extLst>
+          </p:cNvPr>
+          <p:cNvSpPr>
+            <a:spLocks noGrp="1"/>
+          </p:cNvSpPr>
+          <p:nvPr>
+            <p:ph type="title"/>
+          </p:nvPr>
+        </p:nvSpPr>
+        <p:spPr/>
+        <p:txBody>
+          <a:bodyPr/>
+          <a:lstStyle/>
+          <a:p>
+            <a:endParaRPr lang="en-US"/>
+          </a:p>
+        </p:txBody>
+      </p:sp>
+      <p:sp>
+        <p:nvSpPr>
+          <p:cNvPr id="3" name="Content Placeholder 2">
+            <a:extLst>
+              <a:ext uri="{FF2B5EF4-FFF2-40B4-BE49-F238E27FC236}">
+                <a16:creationId xmlns:a16="http://schemas.microsoft.com/office/drawing/2014/main" id="{4DC0BCF9-6F0E-BE70-CBB7-24A60F5AFC34}"/>
+              </a:ext>
+            </a:extLst>
+          </p:cNvPr>
+          <p:cNvSpPr>
+            <a:spLocks noGrp="1"/>
+          </p:cNvSpPr>
+          <p:nvPr>
+            <p:ph idx="1"/>
+          </p:nvPr>
+        </p:nvSpPr>
+        <p:spPr/>
+        <p:txBody>
+          <a:bodyPr/>
+          <a:lstStyle/>
+          <a:p>
+            <a:endParaRPr lang="en-US" dirty="0"/>
+          </a:p>
+        </p:txBody>
+      </p:sp>
+      <p:pic>
+        <p:nvPicPr>
+          <p:cNvPr id="4" name="Picture 3" descr="A graph showing the growth of time&#10;&#10;Description automatically generated">
+            <a:extLst>
+              <a:ext uri="{FF2B5EF4-FFF2-40B4-BE49-F238E27FC236}">
+                <a16:creationId xmlns:a16="http://schemas.microsoft.com/office/drawing/2014/main" id="{CCF1E75D-3E00-E77B-BB48-C982B6A32CD8}"/>
+              </a:ext>
+            </a:extLst>
+          </p:cNvPr>
+          <p:cNvPicPr>
+            <a:picLocks noChangeAspect="1"/>
+          </p:cNvPicPr>
+          <p:nvPr/>
+        </p:nvPicPr>
+        <p:blipFill>
+          <a:blip r:embed="rId2">
+            <a:extLst>
+              <a:ext uri="{28A0092B-C50C-407E-A947-70E740481C1C}">
+                <a14:useLocalDpi xmlns:a14="http://schemas.microsoft.com/office/drawing/2010/main" val="0"/>
+              </a:ext>
+            </a:extLst>
+          </a:blip>
+          <a:stretch>
+            <a:fillRect/>
+          </a:stretch>
+        </p:blipFill>
+        <p:spPr>
+          <a:xfrm>
+            <a:off x="306492" y="222649"/>
+            <a:ext cx="10982619" cy="4852785"/>
+          </a:xfrm>
+          <a:prstGeom prst="rect">
+            <a:avLst/>
+          </a:prstGeom>
+        </p:spPr>
+      </p:pic>
+    </p:spTree>
+    <p:extLst>
+      <p:ext uri="{BB962C8B-B14F-4D97-AF65-F5344CB8AC3E}">
+        <p14:creationId xmlns:p14="http://schemas.microsoft.com/office/powerpoint/2010/main" val="1773223509"/>
+      </p:ext>
+    </p:extLst>
+  </p:cSld>
+  <p:clrMapOvr>
+    <a:masterClrMapping/>
+  </p:clrMapOvr>
+</p:sld>
+</file>
+
+<file path=ppt/slides/slide7.xml><?xml version="1.0" encoding="utf-8"?>
+<p:sld xmlns:a="http://schemas.openxmlformats.org/drawingml/2006/main" xmlns:r="http://schemas.openxmlformats.org/officeDocument/2006/relationships" xmlns:p="http://schemas.openxmlformats.org/presentationml/2006/main">
+  <p:cSld>
+    <p:spTree>
+      <p:nvGrpSpPr>
+        <p:cNvPr id="1" name=""/>
+        <p:cNvGrpSpPr/>
+        <p:nvPr/>
+      </p:nvGrpSpPr>
+      <p:grpSpPr>
+        <a:xfrm>
+          <a:off x="0" y="0"/>
+          <a:ext cx="0" cy="0"/>
+          <a:chOff x="0" y="0"/>
+          <a:chExt cx="0" cy="0"/>
+        </a:xfrm>
+      </p:grpSpPr>
+      <p:sp>
+        <p:nvSpPr>
+          <p:cNvPr id="2" name="Title 1">
+            <a:extLst>
+              <a:ext uri="{FF2B5EF4-FFF2-40B4-BE49-F238E27FC236}">
+                <a16:creationId xmlns:a16="http://schemas.microsoft.com/office/drawing/2014/main" id="{FE809CF0-CF51-99F7-3DDE-1AB0ADFB1192}"/>
+              </a:ext>
+            </a:extLst>
+          </p:cNvPr>
+          <p:cNvSpPr>
+            <a:spLocks noGrp="1"/>
+          </p:cNvSpPr>
+          <p:nvPr>
+            <p:ph type="title"/>
+          </p:nvPr>
+        </p:nvSpPr>
+        <p:spPr/>
+        <p:txBody>
+          <a:bodyPr/>
+          <a:lstStyle/>
+          <a:p>
+            <a:endParaRPr lang="en-US"/>
+          </a:p>
+        </p:txBody>
+      </p:sp>
+      <p:pic>
+        <p:nvPicPr>
+          <p:cNvPr id="9" name="Content Placeholder 8" descr="A graph showing a number of certifications&#10;&#10;Description automatically generated">
+            <a:extLst>
+              <a:ext uri="{FF2B5EF4-FFF2-40B4-BE49-F238E27FC236}">
+                <a16:creationId xmlns:a16="http://schemas.microsoft.com/office/drawing/2014/main" id="{9BFF6637-4870-5E99-F334-1EC1859663F4}"/>
+              </a:ext>
+            </a:extLst>
+          </p:cNvPr>
+          <p:cNvPicPr>
+            <a:picLocks noGrp="1" noChangeAspect="1"/>
+          </p:cNvPicPr>
+          <p:nvPr>
+            <p:ph idx="1"/>
+          </p:nvPr>
+        </p:nvPicPr>
+        <p:blipFill>
+          <a:blip r:embed="rId2">
+            <a:extLst>
+              <a:ext uri="{28A0092B-C50C-407E-A947-70E740481C1C}">
+                <a14:useLocalDpi xmlns:a14="http://schemas.microsoft.com/office/drawing/2010/main" val="0"/>
+              </a:ext>
+            </a:extLst>
+          </a:blip>
+          <a:stretch>
+            <a:fillRect/>
+          </a:stretch>
+        </p:blipFill>
+        <p:spPr>
+          <a:xfrm>
+            <a:off x="399135" y="277570"/>
+            <a:ext cx="11375561" cy="5239652"/>
+          </a:xfrm>
+        </p:spPr>
+      </p:pic>
+    </p:spTree>
+    <p:extLst>
+      <p:ext uri="{BB962C8B-B14F-4D97-AF65-F5344CB8AC3E}">
+        <p14:creationId xmlns:p14="http://schemas.microsoft.com/office/powerpoint/2010/main" val="426527598"/>
+      </p:ext>
+    </p:extLst>
+  </p:cSld>
+  <p:clrMapOvr>
+    <a:masterClrMapping/>
+  </p:clrMapOvr>
+</p:sld>
+</file>
+
+<file path=ppt/slides/slide8.xml><?xml version="1.0" encoding="utf-8"?>
+<p:sld xmlns:a="http://schemas.openxmlformats.org/drawingml/2006/main" xmlns:r="http://schemas.openxmlformats.org/officeDocument/2006/relationships" xmlns:p="http://schemas.openxmlformats.org/presentationml/2006/main">
+  <p:cSld>
+    <p:spTree>
+      <p:nvGrpSpPr>
+        <p:cNvPr id="1" name=""/>
+        <p:cNvGrpSpPr/>
+        <p:nvPr/>
+      </p:nvGrpSpPr>
+      <p:grpSpPr>
+        <a:xfrm>
+          <a:off x="0" y="0"/>
+          <a:ext cx="0" cy="0"/>
+          <a:chOff x="0" y="0"/>
+          <a:chExt cx="0" cy="0"/>
+        </a:xfrm>
+      </p:grpSpPr>
+      <p:sp>
+        <p:nvSpPr>
+          <p:cNvPr id="2" name="Title 1">
+            <a:extLst>
+              <a:ext uri="{FF2B5EF4-FFF2-40B4-BE49-F238E27FC236}">
                 <a16:creationId xmlns:a16="http://schemas.microsoft.com/office/drawing/2014/main" id="{6554C54F-F04E-E56C-90A9-9867D62D1C63}"/>
               </a:ext>
             </a:extLst>
@@ -6393,251 +7171,6 @@
 </p:sld>
 </file>
 
-<file path=ppt/slides/slide6.xml><?xml version="1.0" encoding="utf-8"?>
-<p:sld xmlns:a="http://schemas.openxmlformats.org/drawingml/2006/main" xmlns:r="http://schemas.openxmlformats.org/officeDocument/2006/relationships" xmlns:p="http://schemas.openxmlformats.org/presentationml/2006/main">
-  <p:cSld>
-    <p:spTree>
-      <p:nvGrpSpPr>
-        <p:cNvPr id="1" name=""/>
-        <p:cNvGrpSpPr/>
-        <p:nvPr/>
-      </p:nvGrpSpPr>
-      <p:grpSpPr>
-        <a:xfrm>
-          <a:off x="0" y="0"/>
-          <a:ext cx="0" cy="0"/>
-          <a:chOff x="0" y="0"/>
-          <a:chExt cx="0" cy="0"/>
-        </a:xfrm>
-      </p:grpSpPr>
-      <p:sp>
-        <p:nvSpPr>
-          <p:cNvPr id="2" name="Title 1">
-            <a:extLst>
-              <a:ext uri="{FF2B5EF4-FFF2-40B4-BE49-F238E27FC236}">
-                <a16:creationId xmlns:a16="http://schemas.microsoft.com/office/drawing/2014/main" id="{3584690D-4D81-045E-387A-BDDE698D06D5}"/>
-              </a:ext>
-            </a:extLst>
-          </p:cNvPr>
-          <p:cNvSpPr>
-            <a:spLocks noGrp="1"/>
-          </p:cNvSpPr>
-          <p:nvPr>
-            <p:ph type="title"/>
-          </p:nvPr>
-        </p:nvSpPr>
-        <p:spPr/>
-        <p:txBody>
-          <a:bodyPr/>
-          <a:lstStyle/>
-          <a:p>
-            <a:endParaRPr lang="en-US"/>
-          </a:p>
-        </p:txBody>
-      </p:sp>
-      <p:pic>
-        <p:nvPicPr>
-          <p:cNvPr id="5" name="Content Placeholder 4" descr="A graph of a graph showing the difference between a number of columns&#10;&#10;Description automatically generated with medium confidence">
-            <a:extLst>
-              <a:ext uri="{FF2B5EF4-FFF2-40B4-BE49-F238E27FC236}">
-                <a16:creationId xmlns:a16="http://schemas.microsoft.com/office/drawing/2014/main" id="{CA6392D0-50E3-A840-7042-F666F6CEED8B}"/>
-              </a:ext>
-            </a:extLst>
-          </p:cNvPr>
-          <p:cNvPicPr>
-            <a:picLocks noGrp="1" noChangeAspect="1"/>
-          </p:cNvPicPr>
-          <p:nvPr>
-            <p:ph idx="1"/>
-          </p:nvPr>
-        </p:nvPicPr>
-        <p:blipFill>
-          <a:blip r:embed="rId2">
-            <a:extLst>
-              <a:ext uri="{28A0092B-C50C-407E-A947-70E740481C1C}">
-                <a14:useLocalDpi xmlns:a14="http://schemas.microsoft.com/office/drawing/2010/main" val="0"/>
-              </a:ext>
-            </a:extLst>
-          </a:blip>
-          <a:stretch>
-            <a:fillRect/>
-          </a:stretch>
-        </p:blipFill>
-        <p:spPr>
-          <a:xfrm>
-            <a:off x="302430" y="276370"/>
-            <a:ext cx="10826552" cy="6115194"/>
-          </a:xfrm>
-        </p:spPr>
-      </p:pic>
-    </p:spTree>
-    <p:extLst>
-      <p:ext uri="{BB962C8B-B14F-4D97-AF65-F5344CB8AC3E}">
-        <p14:creationId xmlns:p14="http://schemas.microsoft.com/office/powerpoint/2010/main" val="177671733"/>
-      </p:ext>
-    </p:extLst>
-  </p:cSld>
-  <p:clrMapOvr>
-    <a:masterClrMapping/>
-  </p:clrMapOvr>
-</p:sld>
-</file>
-
-<file path=ppt/slides/slide7.xml><?xml version="1.0" encoding="utf-8"?>
-<p:sld xmlns:a="http://schemas.openxmlformats.org/drawingml/2006/main" xmlns:r="http://schemas.openxmlformats.org/officeDocument/2006/relationships" xmlns:p="http://schemas.openxmlformats.org/presentationml/2006/main">
-  <p:cSld>
-    <p:spTree>
-      <p:nvGrpSpPr>
-        <p:cNvPr id="1" name=""/>
-        <p:cNvGrpSpPr/>
-        <p:nvPr/>
-      </p:nvGrpSpPr>
-      <p:grpSpPr>
-        <a:xfrm>
-          <a:off x="0" y="0"/>
-          <a:ext cx="0" cy="0"/>
-          <a:chOff x="0" y="0"/>
-          <a:chExt cx="0" cy="0"/>
-        </a:xfrm>
-      </p:grpSpPr>
-      <p:pic>
-        <p:nvPicPr>
-          <p:cNvPr id="8" name="Content Placeholder 7" descr="A graph with lines and numbers&#10;&#10;Description automatically generated">
-            <a:extLst>
-              <a:ext uri="{FF2B5EF4-FFF2-40B4-BE49-F238E27FC236}">
-                <a16:creationId xmlns:a16="http://schemas.microsoft.com/office/drawing/2014/main" id="{2F0A1629-8E93-77B1-5B81-E730B2AF606A}"/>
-              </a:ext>
-            </a:extLst>
-          </p:cNvPr>
-          <p:cNvPicPr>
-            <a:picLocks noGrp="1" noChangeAspect="1"/>
-          </p:cNvPicPr>
-          <p:nvPr>
-            <p:ph idx="1"/>
-          </p:nvPr>
-        </p:nvPicPr>
-        <p:blipFill>
-          <a:blip r:embed="rId2">
-            <a:extLst>
-              <a:ext uri="{28A0092B-C50C-407E-A947-70E740481C1C}">
-                <a14:useLocalDpi xmlns:a14="http://schemas.microsoft.com/office/drawing/2010/main" val="0"/>
-              </a:ext>
-            </a:extLst>
-          </a:blip>
-          <a:stretch>
-            <a:fillRect/>
-          </a:stretch>
-        </p:blipFill>
-        <p:spPr>
-          <a:xfrm>
-            <a:off x="0" y="94044"/>
-            <a:ext cx="9363092" cy="6370764"/>
-          </a:xfrm>
-        </p:spPr>
-      </p:pic>
-    </p:spTree>
-    <p:extLst>
-      <p:ext uri="{BB962C8B-B14F-4D97-AF65-F5344CB8AC3E}">
-        <p14:creationId xmlns:p14="http://schemas.microsoft.com/office/powerpoint/2010/main" val="3440815627"/>
-      </p:ext>
-    </p:extLst>
-  </p:cSld>
-  <p:clrMapOvr>
-    <a:masterClrMapping/>
-  </p:clrMapOvr>
-</p:sld>
-</file>
-
-<file path=ppt/slides/slide8.xml><?xml version="1.0" encoding="utf-8"?>
-<p:sld xmlns:a="http://schemas.openxmlformats.org/drawingml/2006/main" xmlns:r="http://schemas.openxmlformats.org/officeDocument/2006/relationships" xmlns:p="http://schemas.openxmlformats.org/presentationml/2006/main">
-  <p:cSld>
-    <p:spTree>
-      <p:nvGrpSpPr>
-        <p:cNvPr id="1" name=""/>
-        <p:cNvGrpSpPr/>
-        <p:nvPr/>
-      </p:nvGrpSpPr>
-      <p:grpSpPr>
-        <a:xfrm>
-          <a:off x="0" y="0"/>
-          <a:ext cx="0" cy="0"/>
-          <a:chOff x="0" y="0"/>
-          <a:chExt cx="0" cy="0"/>
-        </a:xfrm>
-      </p:grpSpPr>
-      <p:sp>
-        <p:nvSpPr>
-          <p:cNvPr id="2" name="Title 1">
-            <a:extLst>
-              <a:ext uri="{FF2B5EF4-FFF2-40B4-BE49-F238E27FC236}">
-                <a16:creationId xmlns:a16="http://schemas.microsoft.com/office/drawing/2014/main" id="{DE04C1EC-3EDB-9E8F-837C-5C5ACDB195D8}"/>
-              </a:ext>
-            </a:extLst>
-          </p:cNvPr>
-          <p:cNvSpPr>
-            <a:spLocks noGrp="1"/>
-          </p:cNvSpPr>
-          <p:nvPr>
-            <p:ph type="title"/>
-          </p:nvPr>
-        </p:nvSpPr>
-        <p:spPr/>
-        <p:txBody>
-          <a:bodyPr/>
-          <a:lstStyle/>
-          <a:p>
-            <a:endParaRPr lang="en-US"/>
-          </a:p>
-        </p:txBody>
-      </p:sp>
-      <p:pic>
-        <p:nvPicPr>
-          <p:cNvPr id="6" name="Content Placeholder 5" descr="A graph with a line and dots&#10;&#10;Description automatically generated">
-            <a:extLst>
-              <a:ext uri="{FF2B5EF4-FFF2-40B4-BE49-F238E27FC236}">
-                <a16:creationId xmlns:a16="http://schemas.microsoft.com/office/drawing/2014/main" id="{71EAF9B6-4B0B-B4CB-057A-6A6B4DBDA708}"/>
-              </a:ext>
-            </a:extLst>
-          </p:cNvPr>
-          <p:cNvPicPr>
-            <a:picLocks noGrp="1" noChangeAspect="1"/>
-          </p:cNvPicPr>
-          <p:nvPr>
-            <p:ph idx="1"/>
-          </p:nvPr>
-        </p:nvPicPr>
-        <p:blipFill>
-          <a:blip r:embed="rId2">
-            <a:extLst>
-              <a:ext uri="{28A0092B-C50C-407E-A947-70E740481C1C}">
-                <a14:useLocalDpi xmlns:a14="http://schemas.microsoft.com/office/drawing/2010/main" val="0"/>
-              </a:ext>
-            </a:extLst>
-          </a:blip>
-          <a:stretch>
-            <a:fillRect/>
-          </a:stretch>
-        </p:blipFill>
-        <p:spPr>
-          <a:xfrm>
-            <a:off x="221675" y="167481"/>
-            <a:ext cx="10299828" cy="5817683"/>
-          </a:xfrm>
-        </p:spPr>
-      </p:pic>
-    </p:spTree>
-    <p:extLst>
-      <p:ext uri="{BB962C8B-B14F-4D97-AF65-F5344CB8AC3E}">
-        <p14:creationId xmlns:p14="http://schemas.microsoft.com/office/powerpoint/2010/main" val="1101351860"/>
-      </p:ext>
-    </p:extLst>
-  </p:cSld>
-  <p:clrMapOvr>
-    <a:masterClrMapping/>
-  </p:clrMapOvr>
-</p:sld>
-</file>
-
 <file path=ppt/slides/slide9.xml><?xml version="1.0" encoding="utf-8"?>
 <p:sld xmlns:a="http://schemas.openxmlformats.org/drawingml/2006/main" xmlns:r="http://schemas.openxmlformats.org/officeDocument/2006/relationships" xmlns:p="http://schemas.openxmlformats.org/presentationml/2006/main">
   <p:cSld>
@@ -6660,7 +7193,7 @@
           <p:cNvPr id="2" name="Title 1">
             <a:extLst>
               <a:ext uri="{FF2B5EF4-FFF2-40B4-BE49-F238E27FC236}">
-                <a16:creationId xmlns:a16="http://schemas.microsoft.com/office/drawing/2014/main" id="{BA781410-7EA5-850C-2187-531EC075D04C}"/>
+                <a16:creationId xmlns:a16="http://schemas.microsoft.com/office/drawing/2014/main" id="{B420D005-088A-69CE-454A-968DA69426CF}"/>
               </a:ext>
             </a:extLst>
           </p:cNvPr>
@@ -6680,21 +7213,44 @@
           </a:p>
         </p:txBody>
       </p:sp>
+      <p:sp>
+        <p:nvSpPr>
+          <p:cNvPr id="3" name="Content Placeholder 2">
+            <a:extLst>
+              <a:ext uri="{FF2B5EF4-FFF2-40B4-BE49-F238E27FC236}">
+                <a16:creationId xmlns:a16="http://schemas.microsoft.com/office/drawing/2014/main" id="{A6468B46-5CBA-3189-7B95-F48D806C0288}"/>
+              </a:ext>
+            </a:extLst>
+          </p:cNvPr>
+          <p:cNvSpPr>
+            <a:spLocks noGrp="1"/>
+          </p:cNvSpPr>
+          <p:nvPr>
+            <p:ph idx="1"/>
+          </p:nvPr>
+        </p:nvSpPr>
+        <p:spPr/>
+        <p:txBody>
+          <a:bodyPr/>
+          <a:lstStyle/>
+          <a:p>
+            <a:endParaRPr lang="en-US"/>
+          </a:p>
+        </p:txBody>
+      </p:sp>
       <p:pic>
         <p:nvPicPr>
-          <p:cNvPr id="11" name="Content Placeholder 10" descr="A chart with text and numbers&#10;&#10;Description automatically generated">
+          <p:cNvPr id="4" name="Picture 3" descr="A graph of a graph showing the difference between a line and a line&#10;&#10;Description automatically generated with medium confidence">
             <a:extLst>
               <a:ext uri="{FF2B5EF4-FFF2-40B4-BE49-F238E27FC236}">
-                <a16:creationId xmlns:a16="http://schemas.microsoft.com/office/drawing/2014/main" id="{0F9B9D3A-C768-50CD-ABFB-A36F03099935}"/>
+                <a16:creationId xmlns:a16="http://schemas.microsoft.com/office/drawing/2014/main" id="{EDF1D591-EFE3-BD13-ACFC-058358A37EC8}"/>
               </a:ext>
             </a:extLst>
           </p:cNvPr>
           <p:cNvPicPr>
-            <a:picLocks noGrp="1" noChangeAspect="1"/>
+            <a:picLocks noChangeAspect="1"/>
           </p:cNvPicPr>
-          <p:nvPr>
-            <p:ph idx="1"/>
-          </p:nvPr>
+          <p:nvPr/>
         </p:nvPicPr>
         <p:blipFill>
           <a:blip r:embed="rId2">
@@ -6710,15 +7266,18 @@
         </p:blipFill>
         <p:spPr>
           <a:xfrm>
-            <a:off x="294951" y="222060"/>
-            <a:ext cx="9505984" cy="6467989"/>
+            <a:off x="212173" y="350586"/>
+            <a:ext cx="11840298" cy="4827589"/>
           </a:xfrm>
+          <a:prstGeom prst="rect">
+            <a:avLst/>
+          </a:prstGeom>
         </p:spPr>
       </p:pic>
     </p:spTree>
     <p:extLst>
       <p:ext uri="{BB962C8B-B14F-4D97-AF65-F5344CB8AC3E}">
-        <p14:creationId xmlns:p14="http://schemas.microsoft.com/office/powerpoint/2010/main" val="2354495484"/>
+        <p14:creationId xmlns:p14="http://schemas.microsoft.com/office/powerpoint/2010/main" val="2762488910"/>
       </p:ext>
     </p:extLst>
   </p:cSld>

</xml_diff>

<commit_message>
add dot to figs
</commit_message>
<xml_diff>
--- a/GSRExploratory.pptx
+++ b/GSRExploratory.pptx
@@ -14,8 +14,8 @@
     <p:sldId id="282" r:id="rId8"/>
     <p:sldId id="280" r:id="rId9"/>
     <p:sldId id="284" r:id="rId10"/>
-    <p:sldId id="283" r:id="rId11"/>
-    <p:sldId id="281" r:id="rId12"/>
+    <p:sldId id="281" r:id="rId11"/>
+    <p:sldId id="283" r:id="rId12"/>
     <p:sldId id="265" r:id="rId13"/>
     <p:sldId id="273" r:id="rId14"/>
     <p:sldId id="271" r:id="rId15"/>
@@ -5923,6 +5923,148 @@
           <p:cNvPr id="2" name="Title 1">
             <a:extLst>
               <a:ext uri="{FF2B5EF4-FFF2-40B4-BE49-F238E27FC236}">
+                <a16:creationId xmlns:a16="http://schemas.microsoft.com/office/drawing/2014/main" id="{3584690D-4D81-045E-387A-BDDE698D06D5}"/>
+              </a:ext>
+            </a:extLst>
+          </p:cNvPr>
+          <p:cNvSpPr>
+            <a:spLocks noGrp="1"/>
+          </p:cNvSpPr>
+          <p:nvPr>
+            <p:ph type="title"/>
+          </p:nvPr>
+        </p:nvSpPr>
+        <p:spPr/>
+        <p:txBody>
+          <a:bodyPr/>
+          <a:lstStyle/>
+          <a:p>
+            <a:endParaRPr lang="en-US"/>
+          </a:p>
+        </p:txBody>
+      </p:sp>
+      <p:pic>
+        <p:nvPicPr>
+          <p:cNvPr id="5" name="Content Placeholder 4" descr="A graph of a graph showing the difference between a number of columns&#10;&#10;Description automatically generated with medium confidence">
+            <a:extLst>
+              <a:ext uri="{FF2B5EF4-FFF2-40B4-BE49-F238E27FC236}">
+                <a16:creationId xmlns:a16="http://schemas.microsoft.com/office/drawing/2014/main" id="{CA6392D0-50E3-A840-7042-F666F6CEED8B}"/>
+              </a:ext>
+            </a:extLst>
+          </p:cNvPr>
+          <p:cNvPicPr>
+            <a:picLocks noGrp="1" noChangeAspect="1"/>
+          </p:cNvPicPr>
+          <p:nvPr>
+            <p:ph idx="1"/>
+          </p:nvPr>
+        </p:nvPicPr>
+        <p:blipFill>
+          <a:blip r:embed="rId2">
+            <a:extLst>
+              <a:ext uri="{28A0092B-C50C-407E-A947-70E740481C1C}">
+                <a14:useLocalDpi xmlns:a14="http://schemas.microsoft.com/office/drawing/2010/main" val="0"/>
+              </a:ext>
+            </a:extLst>
+          </a:blip>
+          <a:stretch>
+            <a:fillRect/>
+          </a:stretch>
+        </p:blipFill>
+        <p:spPr>
+          <a:xfrm>
+            <a:off x="302430" y="276370"/>
+            <a:ext cx="10826552" cy="6115194"/>
+          </a:xfrm>
+        </p:spPr>
+      </p:pic>
+      <p:sp>
+        <p:nvSpPr>
+          <p:cNvPr id="3" name="Oval 2">
+            <a:extLst>
+              <a:ext uri="{FF2B5EF4-FFF2-40B4-BE49-F238E27FC236}">
+                <a16:creationId xmlns:a16="http://schemas.microsoft.com/office/drawing/2014/main" id="{DEACAA62-C1BC-4E83-BC1F-F9C505D8EF0F}"/>
+              </a:ext>
+            </a:extLst>
+          </p:cNvPr>
+          <p:cNvSpPr/>
+          <p:nvPr/>
+        </p:nvSpPr>
+        <p:spPr>
+          <a:xfrm>
+            <a:off x="10130319" y="609600"/>
+            <a:ext cx="842481" cy="934948"/>
+          </a:xfrm>
+          <a:prstGeom prst="ellipse">
+            <a:avLst/>
+          </a:prstGeom>
+          <a:solidFill>
+            <a:schemeClr val="accent4">
+              <a:lumMod val="60000"/>
+              <a:lumOff val="40000"/>
+            </a:schemeClr>
+          </a:solidFill>
+        </p:spPr>
+        <p:style>
+          <a:lnRef idx="2">
+            <a:schemeClr val="accent1">
+              <a:shade val="15000"/>
+            </a:schemeClr>
+          </a:lnRef>
+          <a:fillRef idx="1">
+            <a:schemeClr val="accent1"/>
+          </a:fillRef>
+          <a:effectRef idx="0">
+            <a:schemeClr val="accent1"/>
+          </a:effectRef>
+          <a:fontRef idx="minor">
+            <a:schemeClr val="lt1"/>
+          </a:fontRef>
+        </p:style>
+        <p:txBody>
+          <a:bodyPr rtlCol="0" anchor="ctr"/>
+          <a:lstStyle/>
+          <a:p>
+            <a:pPr algn="ctr"/>
+            <a:endParaRPr lang="en-US"/>
+          </a:p>
+        </p:txBody>
+      </p:sp>
+    </p:spTree>
+    <p:extLst>
+      <p:ext uri="{BB962C8B-B14F-4D97-AF65-F5344CB8AC3E}">
+        <p14:creationId xmlns:p14="http://schemas.microsoft.com/office/powerpoint/2010/main" val="177671733"/>
+      </p:ext>
+    </p:extLst>
+  </p:cSld>
+  <p:clrMapOvr>
+    <a:masterClrMapping/>
+  </p:clrMapOvr>
+</p:sld>
+</file>
+
+<file path=ppt/slides/slide11.xml><?xml version="1.0" encoding="utf-8"?>
+<p:sld xmlns:a="http://schemas.openxmlformats.org/drawingml/2006/main" xmlns:r="http://schemas.openxmlformats.org/officeDocument/2006/relationships" xmlns:p="http://schemas.openxmlformats.org/presentationml/2006/main">
+  <p:cSld>
+    <p:spTree>
+      <p:nvGrpSpPr>
+        <p:cNvPr id="1" name=""/>
+        <p:cNvGrpSpPr/>
+        <p:nvPr/>
+      </p:nvGrpSpPr>
+      <p:grpSpPr>
+        <a:xfrm>
+          <a:off x="0" y="0"/>
+          <a:ext cx="0" cy="0"/>
+          <a:chOff x="0" y="0"/>
+          <a:chExt cx="0" cy="0"/>
+        </a:xfrm>
+      </p:grpSpPr>
+      <p:sp>
+        <p:nvSpPr>
+          <p:cNvPr id="2" name="Title 1">
+            <a:extLst>
+              <a:ext uri="{FF2B5EF4-FFF2-40B4-BE49-F238E27FC236}">
                 <a16:creationId xmlns:a16="http://schemas.microsoft.com/office/drawing/2014/main" id="{49C4C1CC-14D5-F25C-2DD9-7354F8E46900}"/>
               </a:ext>
             </a:extLst>
@@ -6004,100 +6146,62 @@
           </a:prstGeom>
         </p:spPr>
       </p:pic>
+      <p:sp>
+        <p:nvSpPr>
+          <p:cNvPr id="5" name="Oval 4">
+            <a:extLst>
+              <a:ext uri="{FF2B5EF4-FFF2-40B4-BE49-F238E27FC236}">
+                <a16:creationId xmlns:a16="http://schemas.microsoft.com/office/drawing/2014/main" id="{1B8A20A3-F1DA-74D5-95CB-644FEE2B3FCD}"/>
+              </a:ext>
+            </a:extLst>
+          </p:cNvPr>
+          <p:cNvSpPr/>
+          <p:nvPr/>
+        </p:nvSpPr>
+        <p:spPr>
+          <a:xfrm>
+            <a:off x="10828962" y="821933"/>
+            <a:ext cx="842481" cy="934948"/>
+          </a:xfrm>
+          <a:prstGeom prst="ellipse">
+            <a:avLst/>
+          </a:prstGeom>
+          <a:solidFill>
+            <a:schemeClr val="accent4">
+              <a:lumMod val="60000"/>
+              <a:lumOff val="40000"/>
+            </a:schemeClr>
+          </a:solidFill>
+        </p:spPr>
+        <p:style>
+          <a:lnRef idx="2">
+            <a:schemeClr val="accent1">
+              <a:shade val="15000"/>
+            </a:schemeClr>
+          </a:lnRef>
+          <a:fillRef idx="1">
+            <a:schemeClr val="accent1"/>
+          </a:fillRef>
+          <a:effectRef idx="0">
+            <a:schemeClr val="accent1"/>
+          </a:effectRef>
+          <a:fontRef idx="minor">
+            <a:schemeClr val="lt1"/>
+          </a:fontRef>
+        </p:style>
+        <p:txBody>
+          <a:bodyPr rtlCol="0" anchor="ctr"/>
+          <a:lstStyle/>
+          <a:p>
+            <a:pPr algn="ctr"/>
+            <a:endParaRPr lang="en-US"/>
+          </a:p>
+        </p:txBody>
+      </p:sp>
     </p:spTree>
     <p:extLst>
       <p:ext uri="{BB962C8B-B14F-4D97-AF65-F5344CB8AC3E}">
         <p14:creationId xmlns:p14="http://schemas.microsoft.com/office/powerpoint/2010/main" val="2084203760"/>
-      </p:ext>
-    </p:extLst>
-  </p:cSld>
-  <p:clrMapOvr>
-    <a:masterClrMapping/>
-  </p:clrMapOvr>
-</p:sld>
-</file>
-
-<file path=ppt/slides/slide11.xml><?xml version="1.0" encoding="utf-8"?>
-<p:sld xmlns:a="http://schemas.openxmlformats.org/drawingml/2006/main" xmlns:r="http://schemas.openxmlformats.org/officeDocument/2006/relationships" xmlns:p="http://schemas.openxmlformats.org/presentationml/2006/main">
-  <p:cSld>
-    <p:spTree>
-      <p:nvGrpSpPr>
-        <p:cNvPr id="1" name=""/>
-        <p:cNvGrpSpPr/>
-        <p:nvPr/>
-      </p:nvGrpSpPr>
-      <p:grpSpPr>
-        <a:xfrm>
-          <a:off x="0" y="0"/>
-          <a:ext cx="0" cy="0"/>
-          <a:chOff x="0" y="0"/>
-          <a:chExt cx="0" cy="0"/>
-        </a:xfrm>
-      </p:grpSpPr>
-      <p:sp>
-        <p:nvSpPr>
-          <p:cNvPr id="2" name="Title 1">
-            <a:extLst>
-              <a:ext uri="{FF2B5EF4-FFF2-40B4-BE49-F238E27FC236}">
-                <a16:creationId xmlns:a16="http://schemas.microsoft.com/office/drawing/2014/main" id="{3584690D-4D81-045E-387A-BDDE698D06D5}"/>
-              </a:ext>
-            </a:extLst>
-          </p:cNvPr>
-          <p:cNvSpPr>
-            <a:spLocks noGrp="1"/>
-          </p:cNvSpPr>
-          <p:nvPr>
-            <p:ph type="title"/>
-          </p:nvPr>
-        </p:nvSpPr>
-        <p:spPr/>
-        <p:txBody>
-          <a:bodyPr/>
-          <a:lstStyle/>
-          <a:p>
-            <a:endParaRPr lang="en-US"/>
-          </a:p>
-        </p:txBody>
-      </p:sp>
-      <p:pic>
-        <p:nvPicPr>
-          <p:cNvPr id="5" name="Content Placeholder 4" descr="A graph of a graph showing the difference between a number of columns&#10;&#10;Description automatically generated with medium confidence">
-            <a:extLst>
-              <a:ext uri="{FF2B5EF4-FFF2-40B4-BE49-F238E27FC236}">
-                <a16:creationId xmlns:a16="http://schemas.microsoft.com/office/drawing/2014/main" id="{CA6392D0-50E3-A840-7042-F666F6CEED8B}"/>
-              </a:ext>
-            </a:extLst>
-          </p:cNvPr>
-          <p:cNvPicPr>
-            <a:picLocks noGrp="1" noChangeAspect="1"/>
-          </p:cNvPicPr>
-          <p:nvPr>
-            <p:ph idx="1"/>
-          </p:nvPr>
-        </p:nvPicPr>
-        <p:blipFill>
-          <a:blip r:embed="rId2">
-            <a:extLst>
-              <a:ext uri="{28A0092B-C50C-407E-A947-70E740481C1C}">
-                <a14:useLocalDpi xmlns:a14="http://schemas.microsoft.com/office/drawing/2010/main" val="0"/>
-              </a:ext>
-            </a:extLst>
-          </a:blip>
-          <a:stretch>
-            <a:fillRect/>
-          </a:stretch>
-        </p:blipFill>
-        <p:spPr>
-          <a:xfrm>
-            <a:off x="302430" y="276370"/>
-            <a:ext cx="10826552" cy="6115194"/>
-          </a:xfrm>
-        </p:spPr>
-      </p:pic>
-    </p:spTree>
-    <p:extLst>
-      <p:ext uri="{BB962C8B-B14F-4D97-AF65-F5344CB8AC3E}">
-        <p14:creationId xmlns:p14="http://schemas.microsoft.com/office/powerpoint/2010/main" val="177671733"/>
       </p:ext>
     </p:extLst>
   </p:cSld>
@@ -6746,6 +6850,58 @@
           </a:p>
         </p:txBody>
       </p:sp>
+      <p:sp>
+        <p:nvSpPr>
+          <p:cNvPr id="3" name="Oval 2">
+            <a:extLst>
+              <a:ext uri="{FF2B5EF4-FFF2-40B4-BE49-F238E27FC236}">
+                <a16:creationId xmlns:a16="http://schemas.microsoft.com/office/drawing/2014/main" id="{23735CDA-006D-83B0-3E89-A8DBC4C4B044}"/>
+              </a:ext>
+            </a:extLst>
+          </p:cNvPr>
+          <p:cNvSpPr/>
+          <p:nvPr/>
+        </p:nvSpPr>
+        <p:spPr>
+          <a:xfrm>
+            <a:off x="8107602" y="414375"/>
+            <a:ext cx="842481" cy="934948"/>
+          </a:xfrm>
+          <a:prstGeom prst="ellipse">
+            <a:avLst/>
+          </a:prstGeom>
+          <a:solidFill>
+            <a:schemeClr val="accent4">
+              <a:lumMod val="60000"/>
+              <a:lumOff val="40000"/>
+            </a:schemeClr>
+          </a:solidFill>
+        </p:spPr>
+        <p:style>
+          <a:lnRef idx="2">
+            <a:schemeClr val="accent1">
+              <a:shade val="15000"/>
+            </a:schemeClr>
+          </a:lnRef>
+          <a:fillRef idx="1">
+            <a:schemeClr val="accent1"/>
+          </a:fillRef>
+          <a:effectRef idx="0">
+            <a:schemeClr val="accent1"/>
+          </a:effectRef>
+          <a:fontRef idx="minor">
+            <a:schemeClr val="lt1"/>
+          </a:fontRef>
+        </p:style>
+        <p:txBody>
+          <a:bodyPr rtlCol="0" anchor="ctr"/>
+          <a:lstStyle/>
+          <a:p>
+            <a:pPr algn="ctr"/>
+            <a:endParaRPr lang="en-US"/>
+          </a:p>
+        </p:txBody>
+      </p:sp>
     </p:spTree>
     <p:extLst>
       <p:ext uri="{BB962C8B-B14F-4D97-AF65-F5344CB8AC3E}">
@@ -6862,6 +7018,58 @@
           </a:p>
         </p:txBody>
       </p:sp>
+      <p:sp>
+        <p:nvSpPr>
+          <p:cNvPr id="16" name="Oval 15">
+            <a:extLst>
+              <a:ext uri="{FF2B5EF4-FFF2-40B4-BE49-F238E27FC236}">
+                <a16:creationId xmlns:a16="http://schemas.microsoft.com/office/drawing/2014/main" id="{E06B41FB-32EC-1218-3385-6FA4DA5964A0}"/>
+              </a:ext>
+            </a:extLst>
+          </p:cNvPr>
+          <p:cNvSpPr/>
+          <p:nvPr/>
+        </p:nvSpPr>
+        <p:spPr>
+          <a:xfrm>
+            <a:off x="10828962" y="821933"/>
+            <a:ext cx="842481" cy="934948"/>
+          </a:xfrm>
+          <a:prstGeom prst="ellipse">
+            <a:avLst/>
+          </a:prstGeom>
+          <a:solidFill>
+            <a:schemeClr val="accent4">
+              <a:lumMod val="60000"/>
+              <a:lumOff val="40000"/>
+            </a:schemeClr>
+          </a:solidFill>
+        </p:spPr>
+        <p:style>
+          <a:lnRef idx="2">
+            <a:schemeClr val="accent1">
+              <a:shade val="15000"/>
+            </a:schemeClr>
+          </a:lnRef>
+          <a:fillRef idx="1">
+            <a:schemeClr val="accent1"/>
+          </a:fillRef>
+          <a:effectRef idx="0">
+            <a:schemeClr val="accent1"/>
+          </a:effectRef>
+          <a:fontRef idx="minor">
+            <a:schemeClr val="lt1"/>
+          </a:fontRef>
+        </p:style>
+        <p:txBody>
+          <a:bodyPr rtlCol="0" anchor="ctr"/>
+          <a:lstStyle/>
+          <a:p>
+            <a:pPr algn="ctr"/>
+            <a:endParaRPr lang="en-US"/>
+          </a:p>
+        </p:txBody>
+      </p:sp>
     </p:spTree>
     <p:extLst>
       <p:ext uri="{BB962C8B-B14F-4D97-AF65-F5344CB8AC3E}">
@@ -6978,6 +7186,58 @@
           </a:prstGeom>
         </p:spPr>
       </p:pic>
+      <p:sp>
+        <p:nvSpPr>
+          <p:cNvPr id="5" name="Oval 4">
+            <a:extLst>
+              <a:ext uri="{FF2B5EF4-FFF2-40B4-BE49-F238E27FC236}">
+                <a16:creationId xmlns:a16="http://schemas.microsoft.com/office/drawing/2014/main" id="{D98D32E5-30B8-D8D0-424B-7EBE58408A82}"/>
+              </a:ext>
+            </a:extLst>
+          </p:cNvPr>
+          <p:cNvSpPr/>
+          <p:nvPr/>
+        </p:nvSpPr>
+        <p:spPr>
+          <a:xfrm>
+            <a:off x="10294706" y="609600"/>
+            <a:ext cx="842481" cy="934948"/>
+          </a:xfrm>
+          <a:prstGeom prst="ellipse">
+            <a:avLst/>
+          </a:prstGeom>
+          <a:solidFill>
+            <a:schemeClr val="accent4">
+              <a:lumMod val="60000"/>
+              <a:lumOff val="40000"/>
+            </a:schemeClr>
+          </a:solidFill>
+        </p:spPr>
+        <p:style>
+          <a:lnRef idx="2">
+            <a:schemeClr val="accent1">
+              <a:shade val="15000"/>
+            </a:schemeClr>
+          </a:lnRef>
+          <a:fillRef idx="1">
+            <a:schemeClr val="accent1"/>
+          </a:fillRef>
+          <a:effectRef idx="0">
+            <a:schemeClr val="accent1"/>
+          </a:effectRef>
+          <a:fontRef idx="minor">
+            <a:schemeClr val="lt1"/>
+          </a:fontRef>
+        </p:style>
+        <p:txBody>
+          <a:bodyPr rtlCol="0" anchor="ctr"/>
+          <a:lstStyle/>
+          <a:p>
+            <a:pPr algn="ctr"/>
+            <a:endParaRPr lang="en-US"/>
+          </a:p>
+        </p:txBody>
+      </p:sp>
     </p:spTree>
     <p:extLst>
       <p:ext uri="{BB962C8B-B14F-4D97-AF65-F5344CB8AC3E}">
@@ -7068,6 +7328,58 @@
           </a:xfrm>
         </p:spPr>
       </p:pic>
+      <p:sp>
+        <p:nvSpPr>
+          <p:cNvPr id="10" name="Oval 9">
+            <a:extLst>
+              <a:ext uri="{FF2B5EF4-FFF2-40B4-BE49-F238E27FC236}">
+                <a16:creationId xmlns:a16="http://schemas.microsoft.com/office/drawing/2014/main" id="{78181738-3DDD-9780-EC0F-5198A3CAE2D5}"/>
+              </a:ext>
+            </a:extLst>
+          </p:cNvPr>
+          <p:cNvSpPr/>
+          <p:nvPr/>
+        </p:nvSpPr>
+        <p:spPr>
+          <a:xfrm>
+            <a:off x="10798139" y="405830"/>
+            <a:ext cx="842481" cy="934948"/>
+          </a:xfrm>
+          <a:prstGeom prst="ellipse">
+            <a:avLst/>
+          </a:prstGeom>
+          <a:solidFill>
+            <a:schemeClr val="accent4">
+              <a:lumMod val="60000"/>
+              <a:lumOff val="40000"/>
+            </a:schemeClr>
+          </a:solidFill>
+        </p:spPr>
+        <p:style>
+          <a:lnRef idx="2">
+            <a:schemeClr val="accent1">
+              <a:shade val="15000"/>
+            </a:schemeClr>
+          </a:lnRef>
+          <a:fillRef idx="1">
+            <a:schemeClr val="accent1"/>
+          </a:fillRef>
+          <a:effectRef idx="0">
+            <a:schemeClr val="accent1"/>
+          </a:effectRef>
+          <a:fontRef idx="minor">
+            <a:schemeClr val="lt1"/>
+          </a:fontRef>
+        </p:style>
+        <p:txBody>
+          <a:bodyPr rtlCol="0" anchor="ctr"/>
+          <a:lstStyle/>
+          <a:p>
+            <a:pPr algn="ctr"/>
+            <a:endParaRPr lang="en-US"/>
+          </a:p>
+        </p:txBody>
+      </p:sp>
     </p:spTree>
     <p:extLst>
       <p:ext uri="{BB962C8B-B14F-4D97-AF65-F5344CB8AC3E}">
@@ -7158,6 +7470,58 @@
           </a:xfrm>
         </p:spPr>
       </p:pic>
+      <p:sp>
+        <p:nvSpPr>
+          <p:cNvPr id="3" name="Oval 2">
+            <a:extLst>
+              <a:ext uri="{FF2B5EF4-FFF2-40B4-BE49-F238E27FC236}">
+                <a16:creationId xmlns:a16="http://schemas.microsoft.com/office/drawing/2014/main" id="{749ED22B-6ACA-C3BC-A4E2-E8CDE15F285D}"/>
+              </a:ext>
+            </a:extLst>
+          </p:cNvPr>
+          <p:cNvSpPr/>
+          <p:nvPr/>
+        </p:nvSpPr>
+        <p:spPr>
+          <a:xfrm>
+            <a:off x="9976207" y="609600"/>
+            <a:ext cx="842481" cy="934948"/>
+          </a:xfrm>
+          <a:prstGeom prst="ellipse">
+            <a:avLst/>
+          </a:prstGeom>
+          <a:solidFill>
+            <a:schemeClr val="accent4">
+              <a:lumMod val="60000"/>
+              <a:lumOff val="40000"/>
+            </a:schemeClr>
+          </a:solidFill>
+        </p:spPr>
+        <p:style>
+          <a:lnRef idx="2">
+            <a:schemeClr val="accent1">
+              <a:shade val="15000"/>
+            </a:schemeClr>
+          </a:lnRef>
+          <a:fillRef idx="1">
+            <a:schemeClr val="accent1"/>
+          </a:fillRef>
+          <a:effectRef idx="0">
+            <a:schemeClr val="accent1"/>
+          </a:effectRef>
+          <a:fontRef idx="minor">
+            <a:schemeClr val="lt1"/>
+          </a:fontRef>
+        </p:style>
+        <p:txBody>
+          <a:bodyPr rtlCol="0" anchor="ctr"/>
+          <a:lstStyle/>
+          <a:p>
+            <a:pPr algn="ctr"/>
+            <a:endParaRPr lang="en-US"/>
+          </a:p>
+        </p:txBody>
+      </p:sp>
     </p:spTree>
     <p:extLst>
       <p:ext uri="{BB962C8B-B14F-4D97-AF65-F5344CB8AC3E}">
@@ -7274,6 +7638,58 @@
           </a:prstGeom>
         </p:spPr>
       </p:pic>
+      <p:sp>
+        <p:nvSpPr>
+          <p:cNvPr id="5" name="Oval 4">
+            <a:extLst>
+              <a:ext uri="{FF2B5EF4-FFF2-40B4-BE49-F238E27FC236}">
+                <a16:creationId xmlns:a16="http://schemas.microsoft.com/office/drawing/2014/main" id="{6A8D9CB8-B003-2C5C-16A1-C0247ABEAED8}"/>
+              </a:ext>
+            </a:extLst>
+          </p:cNvPr>
+          <p:cNvSpPr/>
+          <p:nvPr/>
+        </p:nvSpPr>
+        <p:spPr>
+          <a:xfrm>
+            <a:off x="10828962" y="821933"/>
+            <a:ext cx="842481" cy="934948"/>
+          </a:xfrm>
+          <a:prstGeom prst="ellipse">
+            <a:avLst/>
+          </a:prstGeom>
+          <a:solidFill>
+            <a:schemeClr val="accent4">
+              <a:lumMod val="60000"/>
+              <a:lumOff val="40000"/>
+            </a:schemeClr>
+          </a:solidFill>
+        </p:spPr>
+        <p:style>
+          <a:lnRef idx="2">
+            <a:schemeClr val="accent1">
+              <a:shade val="15000"/>
+            </a:schemeClr>
+          </a:lnRef>
+          <a:fillRef idx="1">
+            <a:schemeClr val="accent1"/>
+          </a:fillRef>
+          <a:effectRef idx="0">
+            <a:schemeClr val="accent1"/>
+          </a:effectRef>
+          <a:fontRef idx="minor">
+            <a:schemeClr val="lt1"/>
+          </a:fontRef>
+        </p:style>
+        <p:txBody>
+          <a:bodyPr rtlCol="0" anchor="ctr"/>
+          <a:lstStyle/>
+          <a:p>
+            <a:pPr algn="ctr"/>
+            <a:endParaRPr lang="en-US"/>
+          </a:p>
+        </p:txBody>
+      </p:sp>
     </p:spTree>
     <p:extLst>
       <p:ext uri="{BB962C8B-B14F-4D97-AF65-F5344CB8AC3E}">

</xml_diff>